<commit_message>
Gatti changes for presentation
</commit_message>
<xml_diff>
--- a/RASD/Presentiation/RASD presentation.pptx
+++ b/RASD/Presentiation/RASD presentation.pptx
@@ -2,32 +2,32 @@
 <file path=ppt/presentation.xml><?xml version="1.0" encoding="utf-8"?>
 <p:presentation xmlns:a="http://schemas.openxmlformats.org/drawingml/2006/main" xmlns:r="http://schemas.openxmlformats.org/officeDocument/2006/relationships" xmlns:p="http://schemas.openxmlformats.org/presentationml/2006/main">
   <p:sldMasterIdLst>
-    <p:sldMasterId id="2147483648" r:id="rId5"/>
+    <p:sldMasterId id="2147483648" r:id="rId1"/>
   </p:sldMasterIdLst>
   <p:notesMasterIdLst>
-    <p:notesMasterId r:id="rId7"/>
+    <p:notesMasterId r:id="rId22"/>
   </p:notesMasterIdLst>
   <p:sldIdLst>
-    <p:sldId id="256" r:id="rId8"/>
-    <p:sldId id="257" r:id="rId9"/>
-    <p:sldId id="258" r:id="rId10"/>
-    <p:sldId id="259" r:id="rId11"/>
-    <p:sldId id="260" r:id="rId12"/>
-    <p:sldId id="261" r:id="rId13"/>
-    <p:sldId id="262" r:id="rId14"/>
-    <p:sldId id="263" r:id="rId15"/>
-    <p:sldId id="264" r:id="rId16"/>
-    <p:sldId id="265" r:id="rId17"/>
-    <p:sldId id="266" r:id="rId18"/>
-    <p:sldId id="267" r:id="rId19"/>
-    <p:sldId id="268" r:id="rId20"/>
-    <p:sldId id="269" r:id="rId21"/>
-    <p:sldId id="270" r:id="rId22"/>
-    <p:sldId id="271" r:id="rId23"/>
-    <p:sldId id="272" r:id="rId24"/>
-    <p:sldId id="273" r:id="rId25"/>
-    <p:sldId id="274" r:id="rId26"/>
-    <p:sldId id="275" r:id="rId27"/>
+    <p:sldId id="256" r:id="rId2"/>
+    <p:sldId id="257" r:id="rId3"/>
+    <p:sldId id="258" r:id="rId4"/>
+    <p:sldId id="259" r:id="rId5"/>
+    <p:sldId id="260" r:id="rId6"/>
+    <p:sldId id="261" r:id="rId7"/>
+    <p:sldId id="262" r:id="rId8"/>
+    <p:sldId id="263" r:id="rId9"/>
+    <p:sldId id="264" r:id="rId10"/>
+    <p:sldId id="265" r:id="rId11"/>
+    <p:sldId id="266" r:id="rId12"/>
+    <p:sldId id="267" r:id="rId13"/>
+    <p:sldId id="268" r:id="rId14"/>
+    <p:sldId id="269" r:id="rId15"/>
+    <p:sldId id="270" r:id="rId16"/>
+    <p:sldId id="271" r:id="rId17"/>
+    <p:sldId id="272" r:id="rId18"/>
+    <p:sldId id="273" r:id="rId19"/>
+    <p:sldId id="274" r:id="rId20"/>
+    <p:sldId id="275" r:id="rId21"/>
   </p:sldIdLst>
   <p:sldSz cx="13004800" cy="9753600"/>
   <p:notesSz cx="6858000" cy="9144000"/>
@@ -47,7 +47,7 @@
       <a:buFontTx/>
       <a:buNone/>
       <a:tabLst/>
-      <a:defRPr b="0" baseline="0" cap="none" i="0" spc="0" strike="noStrike" sz="1800" u="none" kumimoji="0" normalizeH="0">
+      <a:defRPr kumimoji="0" sz="1800" b="0" i="0" u="none" strike="noStrike" cap="none" spc="0" normalizeH="0" baseline="0">
         <a:ln>
           <a:noFill/>
         </a:ln>
@@ -73,7 +73,7 @@
       <a:buFontTx/>
       <a:buNone/>
       <a:tabLst/>
-      <a:defRPr b="0" baseline="0" cap="none" i="0" spc="28" strike="noStrike" sz="2800" u="none" kumimoji="0" normalizeH="0">
+      <a:defRPr kumimoji="0" sz="2800" b="0" i="0" u="none" strike="noStrike" cap="none" spc="28" normalizeH="0" baseline="0">
         <a:ln>
           <a:noFill/>
         </a:ln>
@@ -103,7 +103,7 @@
       <a:buFontTx/>
       <a:buNone/>
       <a:tabLst/>
-      <a:defRPr b="0" baseline="0" cap="none" i="0" spc="28" strike="noStrike" sz="2800" u="none" kumimoji="0" normalizeH="0">
+      <a:defRPr kumimoji="0" sz="2800" b="0" i="0" u="none" strike="noStrike" cap="none" spc="28" normalizeH="0" baseline="0">
         <a:ln>
           <a:noFill/>
         </a:ln>
@@ -133,7 +133,7 @@
       <a:buFontTx/>
       <a:buNone/>
       <a:tabLst/>
-      <a:defRPr b="0" baseline="0" cap="none" i="0" spc="28" strike="noStrike" sz="2800" u="none" kumimoji="0" normalizeH="0">
+      <a:defRPr kumimoji="0" sz="2800" b="0" i="0" u="none" strike="noStrike" cap="none" spc="28" normalizeH="0" baseline="0">
         <a:ln>
           <a:noFill/>
         </a:ln>
@@ -163,7 +163,7 @@
       <a:buFontTx/>
       <a:buNone/>
       <a:tabLst/>
-      <a:defRPr b="0" baseline="0" cap="none" i="0" spc="28" strike="noStrike" sz="2800" u="none" kumimoji="0" normalizeH="0">
+      <a:defRPr kumimoji="0" sz="2800" b="0" i="0" u="none" strike="noStrike" cap="none" spc="28" normalizeH="0" baseline="0">
         <a:ln>
           <a:noFill/>
         </a:ln>
@@ -193,7 +193,7 @@
       <a:buFontTx/>
       <a:buNone/>
       <a:tabLst/>
-      <a:defRPr b="0" baseline="0" cap="none" i="0" spc="28" strike="noStrike" sz="2800" u="none" kumimoji="0" normalizeH="0">
+      <a:defRPr kumimoji="0" sz="2800" b="0" i="0" u="none" strike="noStrike" cap="none" spc="28" normalizeH="0" baseline="0">
         <a:ln>
           <a:noFill/>
         </a:ln>
@@ -223,7 +223,7 @@
       <a:buFontTx/>
       <a:buNone/>
       <a:tabLst/>
-      <a:defRPr b="0" baseline="0" cap="none" i="0" spc="28" strike="noStrike" sz="2800" u="none" kumimoji="0" normalizeH="0">
+      <a:defRPr kumimoji="0" sz="2800" b="0" i="0" u="none" strike="noStrike" cap="none" spc="28" normalizeH="0" baseline="0">
         <a:ln>
           <a:noFill/>
         </a:ln>
@@ -253,7 +253,7 @@
       <a:buFontTx/>
       <a:buNone/>
       <a:tabLst/>
-      <a:defRPr b="0" baseline="0" cap="none" i="0" spc="28" strike="noStrike" sz="2800" u="none" kumimoji="0" normalizeH="0">
+      <a:defRPr kumimoji="0" sz="2800" b="0" i="0" u="none" strike="noStrike" cap="none" spc="28" normalizeH="0" baseline="0">
         <a:ln>
           <a:noFill/>
         </a:ln>
@@ -283,7 +283,7 @@
       <a:buFontTx/>
       <a:buNone/>
       <a:tabLst/>
-      <a:defRPr b="0" baseline="0" cap="none" i="0" spc="28" strike="noStrike" sz="2800" u="none" kumimoji="0" normalizeH="0">
+      <a:defRPr kumimoji="0" sz="2800" b="0" i="0" u="none" strike="noStrike" cap="none" spc="28" normalizeH="0" baseline="0">
         <a:ln>
           <a:noFill/>
         </a:ln>
@@ -313,7 +313,7 @@
       <a:buFontTx/>
       <a:buNone/>
       <a:tabLst/>
-      <a:defRPr b="0" baseline="0" cap="none" i="0" spc="28" strike="noStrike" sz="2800" u="none" kumimoji="0" normalizeH="0">
+      <a:defRPr kumimoji="0" sz="2800" b="0" i="0" u="none" strike="noStrike" cap="none" spc="28" normalizeH="0" baseline="0">
         <a:ln>
           <a:noFill/>
         </a:ln>
@@ -332,13 +332,14 @@
 </p:presentation>
 </file>
 
-<file path=ppt/commentAuthors.xml><?xml version="1.0" encoding="utf-8"?>
-<p:cmAuthorLst xmlns:a="http://schemas.openxmlformats.org/drawingml/2006/main" xmlns:r="http://schemas.openxmlformats.org/officeDocument/2006/relationships" xmlns:p="http://schemas.openxmlformats.org/presentationml/2006/main"/>
-</file>
-
 <file path=ppt/notesMasters/notesMaster1.xml><?xml version="1.0" encoding="utf-8"?>
 <p:notesMaster xmlns:a="http://schemas.openxmlformats.org/drawingml/2006/main" xmlns:r="http://schemas.openxmlformats.org/officeDocument/2006/relationships" xmlns:p="http://schemas.openxmlformats.org/presentationml/2006/main">
   <p:cSld>
+    <p:bg>
+      <p:bgRef idx="1001">
+        <a:schemeClr val="bg1"/>
+      </p:bgRef>
+    </p:bg>
     <p:spTree>
       <p:nvGrpSpPr>
         <p:cNvPr id="1" name=""/>
@@ -356,7 +357,9 @@
       <p:sp>
         <p:nvSpPr>
           <p:cNvPr id="125" name="Shape 125"/>
-          <p:cNvSpPr/>
+          <p:cNvSpPr>
+            <a:spLocks noGrp="1" noRot="1" noChangeAspect="1"/>
+          </p:cNvSpPr>
           <p:nvPr>
             <p:ph type="sldImg"/>
           </p:nvPr>
@@ -374,14 +377,16 @@
           <a:bodyPr/>
           <a:lstStyle/>
           <a:p>
-            <a:pPr/>
+            <a:endParaRPr/>
           </a:p>
         </p:txBody>
       </p:sp>
       <p:sp>
         <p:nvSpPr>
           <p:cNvPr id="126" name="Shape 126"/>
-          <p:cNvSpPr/>
+          <p:cNvSpPr>
+            <a:spLocks noGrp="1"/>
+          </p:cNvSpPr>
           <p:nvPr>
             <p:ph type="body" sz="quarter" idx="1"/>
           </p:nvPr>
@@ -399,7 +404,7 @@
           <a:bodyPr/>
           <a:lstStyle/>
           <a:p>
-            <a:pPr/>
+            <a:endParaRPr/>
           </a:p>
         </p:txBody>
       </p:sp>
@@ -511,7 +516,7 @@
 </file>
 
 <file path=ppt/slideLayouts/slideLayout1.xml><?xml version="1.0" encoding="utf-8"?>
-<p:sldLayout xmlns:a="http://schemas.openxmlformats.org/drawingml/2006/main" xmlns:r="http://schemas.openxmlformats.org/officeDocument/2006/relationships" xmlns:p="http://schemas.openxmlformats.org/presentationml/2006/main" type="title" showMasterSp="1" showMasterPhAnim="1">
+<p:sldLayout xmlns:a="http://schemas.openxmlformats.org/drawingml/2006/main" xmlns:r="http://schemas.openxmlformats.org/officeDocument/2006/relationships" xmlns:p="http://schemas.openxmlformats.org/presentationml/2006/main" type="title">
   <p:cSld name="Titolo e sottotitolo">
     <p:spTree>
       <p:nvGrpSpPr>
@@ -530,7 +535,9 @@
       <p:sp>
         <p:nvSpPr>
           <p:cNvPr id="11" name="Shape 11"/>
-          <p:cNvSpPr/>
+          <p:cNvSpPr>
+            <a:spLocks noGrp="1"/>
+          </p:cNvSpPr>
           <p:nvPr>
             <p:ph type="body" sz="quarter" idx="13"/>
           </p:nvPr>
@@ -576,13 +583,16 @@
                 <a:sym typeface="Helvetica"/>
               </a:defRPr>
             </a:pPr>
+            <a:endParaRPr/>
           </a:p>
         </p:txBody>
       </p:sp>
       <p:sp>
         <p:nvSpPr>
           <p:cNvPr id="12" name="Shape 12"/>
-          <p:cNvSpPr/>
+          <p:cNvSpPr>
+            <a:spLocks noGrp="1"/>
+          </p:cNvSpPr>
           <p:nvPr>
             <p:ph type="title"/>
           </p:nvPr>
@@ -614,7 +624,6 @@
             </a:lvl1pPr>
           </a:lstStyle>
           <a:p>
-            <a:pPr/>
             <a:r>
               <a:t>Titolo Testo</a:t>
             </a:r>
@@ -624,7 +633,9 @@
       <p:sp>
         <p:nvSpPr>
           <p:cNvPr id="13" name="Shape 13"/>
-          <p:cNvSpPr/>
+          <p:cNvSpPr>
+            <a:spLocks noGrp="1"/>
+          </p:cNvSpPr>
           <p:nvPr>
             <p:ph type="body" sz="half" idx="1"/>
           </p:nvPr>
@@ -743,7 +754,6 @@
             </a:lvl5pPr>
           </a:lstStyle>
           <a:p>
-            <a:pPr/>
             <a:r>
               <a:t>Corpo livello uno</a:t>
             </a:r>
@@ -777,7 +787,9 @@
       <p:sp>
         <p:nvSpPr>
           <p:cNvPr id="14" name="Shape 14"/>
-          <p:cNvSpPr/>
+          <p:cNvSpPr>
+            <a:spLocks noGrp="1"/>
+          </p:cNvSpPr>
           <p:nvPr>
             <p:ph type="sldNum" sz="quarter" idx="2"/>
           </p:nvPr>
@@ -795,8 +807,10 @@
           <a:bodyPr/>
           <a:lstStyle/>
           <a:p>
-            <a:pPr/>
-            <a:fld id="{86CB4B4D-7CA3-9044-876B-883B54F8677D}" type="slidenum"/>
+            <a:fld id="{86CB4B4D-7CA3-9044-876B-883B54F8677D}" type="slidenum">
+              <a:t>‹N›</a:t>
+            </a:fld>
+            <a:endParaRPr/>
           </a:p>
         </p:txBody>
       </p:sp>
@@ -805,12 +819,12 @@
   <p:clrMapOvr>
     <a:masterClrMapping/>
   </p:clrMapOvr>
-  <p:transition xmlns:p14="http://schemas.microsoft.com/office/powerpoint/2010/main" spd="med" advClick="1"/>
+  <p:transition spd="med"/>
 </p:sldLayout>
 </file>
 
 <file path=ppt/slideLayouts/slideLayout10.xml><?xml version="1.0" encoding="utf-8"?>
-<p:sldLayout xmlns:a="http://schemas.openxmlformats.org/drawingml/2006/main" xmlns:r="http://schemas.openxmlformats.org/officeDocument/2006/relationships" xmlns:p="http://schemas.openxmlformats.org/presentationml/2006/main" type="tx" showMasterSp="1" showMasterPhAnim="1">
+<p:sldLayout xmlns:a="http://schemas.openxmlformats.org/drawingml/2006/main" xmlns:r="http://schemas.openxmlformats.org/officeDocument/2006/relationships" xmlns:p="http://schemas.openxmlformats.org/presentationml/2006/main" type="tx">
   <p:cSld name="Citazione">
     <p:spTree>
       <p:nvGrpSpPr>
@@ -845,7 +859,7 @@
           </a:ln>
           <a:extLst>
             <a:ext uri="{C572A759-6A51-4108-AA02-DFA0A04FC94B}">
-              <ma14:wrappingTextBoxFlag xmlns:ma14="http://schemas.microsoft.com/office/mac/drawingml/2011/main" val="1"/>
+              <ma14:wrappingTextBoxFlag xmlns:ma14="http://schemas.microsoft.com/office/mac/drawingml/2011/main" xmlns="" val="1"/>
             </a:ext>
           </a:extLst>
         </p:spPr>
@@ -875,7 +889,7 @@
                 <a:tab pos="3911600" algn="l"/>
                 <a:tab pos="4267200" algn="l"/>
               </a:tabLst>
-              <a:defRPr spc="0" sz="21000">
+              <a:defRPr sz="21000" spc="0">
                 <a:solidFill>
                   <a:srgbClr val="E4E4E4"/>
                 </a:solidFill>
@@ -887,7 +901,6 @@
             </a:lvl1pPr>
           </a:lstStyle>
           <a:p>
-            <a:pPr/>
             <a:r>
               <a:t>“</a:t>
             </a:r>
@@ -897,7 +910,9 @@
       <p:sp>
         <p:nvSpPr>
           <p:cNvPr id="102" name="Shape 102"/>
-          <p:cNvSpPr/>
+          <p:cNvSpPr>
+            <a:spLocks noGrp="1"/>
+          </p:cNvSpPr>
           <p:nvPr>
             <p:ph type="body" sz="quarter" idx="13"/>
           </p:nvPr>
@@ -931,7 +946,6 @@
             </a:lvl1pPr>
           </a:lstStyle>
           <a:p>
-            <a:pPr/>
             <a:r>
               <a:t>Inserisci qui una citazione.</a:t>
             </a:r>
@@ -941,7 +955,9 @@
       <p:sp>
         <p:nvSpPr>
           <p:cNvPr id="103" name="Shape 103"/>
-          <p:cNvSpPr/>
+          <p:cNvSpPr>
+            <a:spLocks noGrp="1"/>
+          </p:cNvSpPr>
           <p:nvPr>
             <p:ph type="body" sz="quarter" idx="14"/>
           </p:nvPr>
@@ -982,7 +998,6 @@
             </a:lvl1pPr>
           </a:lstStyle>
           <a:p>
-            <a:pPr/>
             <a:r>
               <a:t>–Giovanni Mela</a:t>
             </a:r>
@@ -992,7 +1007,9 @@
       <p:sp>
         <p:nvSpPr>
           <p:cNvPr id="104" name="Shape 104"/>
-          <p:cNvSpPr/>
+          <p:cNvSpPr>
+            <a:spLocks noGrp="1"/>
+          </p:cNvSpPr>
           <p:nvPr>
             <p:ph type="sldNum" sz="quarter" idx="2"/>
           </p:nvPr>
@@ -1006,8 +1023,10 @@
           <a:bodyPr/>
           <a:lstStyle/>
           <a:p>
-            <a:pPr/>
-            <a:fld id="{86CB4B4D-7CA3-9044-876B-883B54F8677D}" type="slidenum"/>
+            <a:fld id="{86CB4B4D-7CA3-9044-876B-883B54F8677D}" type="slidenum">
+              <a:t>‹N›</a:t>
+            </a:fld>
+            <a:endParaRPr/>
           </a:p>
         </p:txBody>
       </p:sp>
@@ -1016,12 +1035,12 @@
   <p:clrMapOvr>
     <a:masterClrMapping/>
   </p:clrMapOvr>
-  <p:transition xmlns:p14="http://schemas.microsoft.com/office/powerpoint/2010/main" spd="med" advClick="1"/>
+  <p:transition spd="med"/>
 </p:sldLayout>
 </file>
 
 <file path=ppt/slideLayouts/slideLayout11.xml><?xml version="1.0" encoding="utf-8"?>
-<p:sldLayout xmlns:a="http://schemas.openxmlformats.org/drawingml/2006/main" xmlns:r="http://schemas.openxmlformats.org/officeDocument/2006/relationships" xmlns:p="http://schemas.openxmlformats.org/presentationml/2006/main" type="tx" showMasterSp="1" showMasterPhAnim="1">
+<p:sldLayout xmlns:a="http://schemas.openxmlformats.org/drawingml/2006/main" xmlns:r="http://schemas.openxmlformats.org/officeDocument/2006/relationships" xmlns:p="http://schemas.openxmlformats.org/presentationml/2006/main" type="tx">
   <p:cSld name="Foto">
     <p:spTree>
       <p:nvGrpSpPr>
@@ -1040,7 +1059,9 @@
       <p:sp>
         <p:nvSpPr>
           <p:cNvPr id="111" name="Shape 111"/>
-          <p:cNvSpPr/>
+          <p:cNvSpPr>
+            <a:spLocks noGrp="1"/>
+          </p:cNvSpPr>
           <p:nvPr>
             <p:ph type="pic" idx="13"/>
           </p:nvPr>
@@ -1060,14 +1081,16 @@
           </a:bodyPr>
           <a:lstStyle/>
           <a:p>
-            <a:pPr/>
+            <a:endParaRPr/>
           </a:p>
         </p:txBody>
       </p:sp>
       <p:sp>
         <p:nvSpPr>
           <p:cNvPr id="112" name="Shape 112"/>
-          <p:cNvSpPr/>
+          <p:cNvSpPr>
+            <a:spLocks noGrp="1"/>
+          </p:cNvSpPr>
           <p:nvPr>
             <p:ph type="sldNum" sz="quarter" idx="2"/>
           </p:nvPr>
@@ -1089,8 +1112,10 @@
             </a:lvl1pPr>
           </a:lstStyle>
           <a:p>
-            <a:pPr/>
-            <a:fld id="{86CB4B4D-7CA3-9044-876B-883B54F8677D}" type="slidenum"/>
+            <a:fld id="{86CB4B4D-7CA3-9044-876B-883B54F8677D}" type="slidenum">
+              <a:t>‹N›</a:t>
+            </a:fld>
+            <a:endParaRPr/>
           </a:p>
         </p:txBody>
       </p:sp>
@@ -1099,12 +1124,12 @@
   <p:clrMapOvr>
     <a:masterClrMapping/>
   </p:clrMapOvr>
-  <p:transition xmlns:p14="http://schemas.microsoft.com/office/powerpoint/2010/main" spd="med" advClick="1"/>
+  <p:transition spd="med"/>
 </p:sldLayout>
 </file>
 
 <file path=ppt/slideLayouts/slideLayout12.xml><?xml version="1.0" encoding="utf-8"?>
-<p:sldLayout xmlns:a="http://schemas.openxmlformats.org/drawingml/2006/main" xmlns:r="http://schemas.openxmlformats.org/officeDocument/2006/relationships" xmlns:p="http://schemas.openxmlformats.org/presentationml/2006/main" type="tx" showMasterSp="1" showMasterPhAnim="1">
+<p:sldLayout xmlns:a="http://schemas.openxmlformats.org/drawingml/2006/main" xmlns:r="http://schemas.openxmlformats.org/officeDocument/2006/relationships" xmlns:p="http://schemas.openxmlformats.org/presentationml/2006/main" type="tx">
   <p:cSld name="Vuoto">
     <p:spTree>
       <p:nvGrpSpPr>
@@ -1123,7 +1148,9 @@
       <p:sp>
         <p:nvSpPr>
           <p:cNvPr id="119" name="Shape 119"/>
-          <p:cNvSpPr/>
+          <p:cNvSpPr>
+            <a:spLocks noGrp="1"/>
+          </p:cNvSpPr>
           <p:nvPr>
             <p:ph type="sldNum" sz="quarter" idx="2"/>
           </p:nvPr>
@@ -1137,8 +1164,10 @@
           <a:bodyPr/>
           <a:lstStyle/>
           <a:p>
-            <a:pPr/>
-            <a:fld id="{86CB4B4D-7CA3-9044-876B-883B54F8677D}" type="slidenum"/>
+            <a:fld id="{86CB4B4D-7CA3-9044-876B-883B54F8677D}" type="slidenum">
+              <a:t>‹N›</a:t>
+            </a:fld>
+            <a:endParaRPr/>
           </a:p>
         </p:txBody>
       </p:sp>
@@ -1147,12 +1176,12 @@
   <p:clrMapOvr>
     <a:masterClrMapping/>
   </p:clrMapOvr>
-  <p:transition xmlns:p14="http://schemas.microsoft.com/office/powerpoint/2010/main" spd="med" advClick="1"/>
+  <p:transition spd="med"/>
 </p:sldLayout>
 </file>
 
 <file path=ppt/slideLayouts/slideLayout2.xml><?xml version="1.0" encoding="utf-8"?>
-<p:sldLayout xmlns:a="http://schemas.openxmlformats.org/drawingml/2006/main" xmlns:r="http://schemas.openxmlformats.org/officeDocument/2006/relationships" xmlns:p="http://schemas.openxmlformats.org/presentationml/2006/main" type="tx" showMasterSp="1" showMasterPhAnim="1">
+<p:sldLayout xmlns:a="http://schemas.openxmlformats.org/drawingml/2006/main" xmlns:r="http://schemas.openxmlformats.org/officeDocument/2006/relationships" xmlns:p="http://schemas.openxmlformats.org/presentationml/2006/main" type="tx">
   <p:cSld name="Foto - Orizzontale">
     <p:spTree>
       <p:nvGrpSpPr>
@@ -1171,7 +1200,9 @@
       <p:sp>
         <p:nvSpPr>
           <p:cNvPr id="21" name="Shape 21"/>
-          <p:cNvSpPr/>
+          <p:cNvSpPr>
+            <a:spLocks noGrp="1"/>
+          </p:cNvSpPr>
           <p:nvPr>
             <p:ph type="pic" idx="13"/>
           </p:nvPr>
@@ -1191,14 +1222,16 @@
           </a:bodyPr>
           <a:lstStyle/>
           <a:p>
-            <a:pPr/>
+            <a:endParaRPr/>
           </a:p>
         </p:txBody>
       </p:sp>
       <p:sp>
         <p:nvSpPr>
           <p:cNvPr id="22" name="Shape 22"/>
-          <p:cNvSpPr/>
+          <p:cNvSpPr>
+            <a:spLocks noGrp="1"/>
+          </p:cNvSpPr>
           <p:nvPr>
             <p:ph type="body" sz="half" idx="14"/>
           </p:nvPr>
@@ -1235,13 +1268,16 @@
                 <a:sym typeface="DIN Alternate"/>
               </a:defRPr>
             </a:pPr>
+            <a:endParaRPr/>
           </a:p>
         </p:txBody>
       </p:sp>
       <p:sp>
         <p:nvSpPr>
           <p:cNvPr id="23" name="Shape 23"/>
-          <p:cNvSpPr/>
+          <p:cNvSpPr>
+            <a:spLocks noGrp="1"/>
+          </p:cNvSpPr>
           <p:nvPr>
             <p:ph type="body" sz="quarter" idx="15"/>
           </p:nvPr>
@@ -1287,13 +1323,16 @@
                 <a:sym typeface="Helvetica"/>
               </a:defRPr>
             </a:pPr>
+            <a:endParaRPr/>
           </a:p>
         </p:txBody>
       </p:sp>
       <p:sp>
         <p:nvSpPr>
           <p:cNvPr id="24" name="Shape 24"/>
-          <p:cNvSpPr/>
+          <p:cNvSpPr>
+            <a:spLocks noGrp="1"/>
+          </p:cNvSpPr>
           <p:nvPr>
             <p:ph type="title"/>
           </p:nvPr>
@@ -1325,7 +1364,6 @@
             </a:lvl1pPr>
           </a:lstStyle>
           <a:p>
-            <a:pPr/>
             <a:r>
               <a:t>Titolo Testo</a:t>
             </a:r>
@@ -1335,7 +1373,9 @@
       <p:sp>
         <p:nvSpPr>
           <p:cNvPr id="25" name="Shape 25"/>
-          <p:cNvSpPr/>
+          <p:cNvSpPr>
+            <a:spLocks noGrp="1"/>
+          </p:cNvSpPr>
           <p:nvPr>
             <p:ph type="body" sz="quarter" idx="1"/>
           </p:nvPr>
@@ -1454,7 +1494,6 @@
             </a:lvl5pPr>
           </a:lstStyle>
           <a:p>
-            <a:pPr/>
             <a:r>
               <a:t>Corpo livello uno</a:t>
             </a:r>
@@ -1488,7 +1527,9 @@
       <p:sp>
         <p:nvSpPr>
           <p:cNvPr id="26" name="Shape 26"/>
-          <p:cNvSpPr/>
+          <p:cNvSpPr>
+            <a:spLocks noGrp="1"/>
+          </p:cNvSpPr>
           <p:nvPr>
             <p:ph type="sldNum" sz="quarter" idx="2"/>
           </p:nvPr>
@@ -1514,8 +1555,10 @@
             </a:lvl1pPr>
           </a:lstStyle>
           <a:p>
-            <a:pPr/>
-            <a:fld id="{86CB4B4D-7CA3-9044-876B-883B54F8677D}" type="slidenum"/>
+            <a:fld id="{86CB4B4D-7CA3-9044-876B-883B54F8677D}" type="slidenum">
+              <a:t>‹N›</a:t>
+            </a:fld>
+            <a:endParaRPr/>
           </a:p>
         </p:txBody>
       </p:sp>
@@ -1524,12 +1567,12 @@
   <p:clrMapOvr>
     <a:masterClrMapping/>
   </p:clrMapOvr>
-  <p:transition xmlns:p14="http://schemas.microsoft.com/office/powerpoint/2010/main" spd="med" advClick="1"/>
+  <p:transition spd="med"/>
 </p:sldLayout>
 </file>
 
 <file path=ppt/slideLayouts/slideLayout3.xml><?xml version="1.0" encoding="utf-8"?>
-<p:sldLayout xmlns:a="http://schemas.openxmlformats.org/drawingml/2006/main" xmlns:r="http://schemas.openxmlformats.org/officeDocument/2006/relationships" xmlns:p="http://schemas.openxmlformats.org/presentationml/2006/main" type="tx" showMasterSp="1" showMasterPhAnim="1">
+<p:sldLayout xmlns:a="http://schemas.openxmlformats.org/drawingml/2006/main" xmlns:r="http://schemas.openxmlformats.org/officeDocument/2006/relationships" xmlns:p="http://schemas.openxmlformats.org/presentationml/2006/main" type="tx">
   <p:cSld name="Titolo - Centrato">
     <p:spTree>
       <p:nvGrpSpPr>
@@ -1548,7 +1591,9 @@
       <p:sp>
         <p:nvSpPr>
           <p:cNvPr id="33" name="Shape 33"/>
-          <p:cNvSpPr/>
+          <p:cNvSpPr>
+            <a:spLocks noGrp="1"/>
+          </p:cNvSpPr>
           <p:nvPr>
             <p:ph type="title"/>
           </p:nvPr>
@@ -1580,7 +1625,6 @@
             </a:lvl1pPr>
           </a:lstStyle>
           <a:p>
-            <a:pPr/>
             <a:r>
               <a:t>Titolo Testo</a:t>
             </a:r>
@@ -1590,7 +1634,9 @@
       <p:sp>
         <p:nvSpPr>
           <p:cNvPr id="34" name="Shape 34"/>
-          <p:cNvSpPr/>
+          <p:cNvSpPr>
+            <a:spLocks noGrp="1"/>
+          </p:cNvSpPr>
           <p:nvPr>
             <p:ph type="sldNum" sz="quarter" idx="2"/>
           </p:nvPr>
@@ -1608,8 +1654,10 @@
           <a:bodyPr/>
           <a:lstStyle/>
           <a:p>
-            <a:pPr/>
-            <a:fld id="{86CB4B4D-7CA3-9044-876B-883B54F8677D}" type="slidenum"/>
+            <a:fld id="{86CB4B4D-7CA3-9044-876B-883B54F8677D}" type="slidenum">
+              <a:t>‹N›</a:t>
+            </a:fld>
+            <a:endParaRPr/>
           </a:p>
         </p:txBody>
       </p:sp>
@@ -1618,12 +1666,12 @@
   <p:clrMapOvr>
     <a:masterClrMapping/>
   </p:clrMapOvr>
-  <p:transition xmlns:p14="http://schemas.microsoft.com/office/powerpoint/2010/main" spd="med" advClick="1"/>
+  <p:transition spd="med"/>
 </p:sldLayout>
 </file>
 
 <file path=ppt/slideLayouts/slideLayout4.xml><?xml version="1.0" encoding="utf-8"?>
-<p:sldLayout xmlns:a="http://schemas.openxmlformats.org/drawingml/2006/main" xmlns:r="http://schemas.openxmlformats.org/officeDocument/2006/relationships" xmlns:p="http://schemas.openxmlformats.org/presentationml/2006/main" type="tx" showMasterSp="1" showMasterPhAnim="1">
+<p:sldLayout xmlns:a="http://schemas.openxmlformats.org/drawingml/2006/main" xmlns:r="http://schemas.openxmlformats.org/officeDocument/2006/relationships" xmlns:p="http://schemas.openxmlformats.org/presentationml/2006/main" type="tx">
   <p:cSld name="Foto - Verticale">
     <p:spTree>
       <p:nvGrpSpPr>
@@ -1642,7 +1690,9 @@
       <p:sp>
         <p:nvSpPr>
           <p:cNvPr id="41" name="Shape 41"/>
-          <p:cNvSpPr/>
+          <p:cNvSpPr>
+            <a:spLocks noGrp="1"/>
+          </p:cNvSpPr>
           <p:nvPr>
             <p:ph type="pic" idx="13"/>
           </p:nvPr>
@@ -1662,14 +1712,16 @@
           </a:bodyPr>
           <a:lstStyle/>
           <a:p>
-            <a:pPr/>
+            <a:endParaRPr/>
           </a:p>
         </p:txBody>
       </p:sp>
       <p:sp>
         <p:nvSpPr>
           <p:cNvPr id="42" name="Shape 42"/>
-          <p:cNvSpPr/>
+          <p:cNvSpPr>
+            <a:spLocks noGrp="1"/>
+          </p:cNvSpPr>
           <p:nvPr>
             <p:ph type="body" sz="quarter" idx="14"/>
           </p:nvPr>
@@ -1715,13 +1767,16 @@
                 <a:sym typeface="Helvetica"/>
               </a:defRPr>
             </a:pPr>
+            <a:endParaRPr/>
           </a:p>
         </p:txBody>
       </p:sp>
       <p:sp>
         <p:nvSpPr>
           <p:cNvPr id="43" name="Shape 43"/>
-          <p:cNvSpPr/>
+          <p:cNvSpPr>
+            <a:spLocks noGrp="1"/>
+          </p:cNvSpPr>
           <p:nvPr>
             <p:ph type="title"/>
           </p:nvPr>
@@ -1753,7 +1808,6 @@
             </a:lvl1pPr>
           </a:lstStyle>
           <a:p>
-            <a:pPr/>
             <a:r>
               <a:t>Titolo Testo</a:t>
             </a:r>
@@ -1763,7 +1817,9 @@
       <p:sp>
         <p:nvSpPr>
           <p:cNvPr id="44" name="Shape 44"/>
-          <p:cNvSpPr/>
+          <p:cNvSpPr>
+            <a:spLocks noGrp="1"/>
+          </p:cNvSpPr>
           <p:nvPr>
             <p:ph type="body" sz="quarter" idx="1"/>
           </p:nvPr>
@@ -1882,7 +1938,6 @@
             </a:lvl5pPr>
           </a:lstStyle>
           <a:p>
-            <a:pPr/>
             <a:r>
               <a:t>Corpo livello uno</a:t>
             </a:r>
@@ -1916,7 +1971,9 @@
       <p:sp>
         <p:nvSpPr>
           <p:cNvPr id="45" name="Shape 45"/>
-          <p:cNvSpPr/>
+          <p:cNvSpPr>
+            <a:spLocks noGrp="1"/>
+          </p:cNvSpPr>
           <p:nvPr>
             <p:ph type="sldNum" sz="quarter" idx="2"/>
           </p:nvPr>
@@ -1942,8 +1999,10 @@
             </a:lvl1pPr>
           </a:lstStyle>
           <a:p>
-            <a:pPr/>
-            <a:fld id="{86CB4B4D-7CA3-9044-876B-883B54F8677D}" type="slidenum"/>
+            <a:fld id="{86CB4B4D-7CA3-9044-876B-883B54F8677D}" type="slidenum">
+              <a:t>‹N›</a:t>
+            </a:fld>
+            <a:endParaRPr/>
           </a:p>
         </p:txBody>
       </p:sp>
@@ -1952,12 +2011,12 @@
   <p:clrMapOvr>
     <a:masterClrMapping/>
   </p:clrMapOvr>
-  <p:transition xmlns:p14="http://schemas.microsoft.com/office/powerpoint/2010/main" spd="med" advClick="1"/>
+  <p:transition spd="med"/>
 </p:sldLayout>
 </file>
 
 <file path=ppt/slideLayouts/slideLayout5.xml><?xml version="1.0" encoding="utf-8"?>
-<p:sldLayout xmlns:a="http://schemas.openxmlformats.org/drawingml/2006/main" xmlns:r="http://schemas.openxmlformats.org/officeDocument/2006/relationships" xmlns:p="http://schemas.openxmlformats.org/presentationml/2006/main" type="tx" showMasterSp="1" showMasterPhAnim="1">
+<p:sldLayout xmlns:a="http://schemas.openxmlformats.org/drawingml/2006/main" xmlns:r="http://schemas.openxmlformats.org/officeDocument/2006/relationships" xmlns:p="http://schemas.openxmlformats.org/presentationml/2006/main" type="tx">
   <p:cSld name="Titolo - In alto">
     <p:spTree>
       <p:nvGrpSpPr>
@@ -1976,7 +2035,9 @@
       <p:sp>
         <p:nvSpPr>
           <p:cNvPr id="52" name="Shape 52"/>
-          <p:cNvSpPr/>
+          <p:cNvSpPr>
+            <a:spLocks noGrp="1"/>
+          </p:cNvSpPr>
           <p:nvPr>
             <p:ph type="body" sz="quarter" idx="13"/>
           </p:nvPr>
@@ -2022,13 +2083,16 @@
                 <a:sym typeface="Helvetica"/>
               </a:defRPr>
             </a:pPr>
+            <a:endParaRPr/>
           </a:p>
         </p:txBody>
       </p:sp>
       <p:sp>
         <p:nvSpPr>
           <p:cNvPr id="53" name="Shape 53"/>
-          <p:cNvSpPr/>
+          <p:cNvSpPr>
+            <a:spLocks noGrp="1"/>
+          </p:cNvSpPr>
           <p:nvPr>
             <p:ph type="title"/>
           </p:nvPr>
@@ -2042,7 +2106,6 @@
           <a:bodyPr/>
           <a:lstStyle/>
           <a:p>
-            <a:pPr/>
             <a:r>
               <a:t>Titolo Testo</a:t>
             </a:r>
@@ -2052,7 +2115,9 @@
       <p:sp>
         <p:nvSpPr>
           <p:cNvPr id="54" name="Shape 54"/>
-          <p:cNvSpPr/>
+          <p:cNvSpPr>
+            <a:spLocks noGrp="1"/>
+          </p:cNvSpPr>
           <p:nvPr>
             <p:ph type="sldNum" sz="quarter" idx="2"/>
           </p:nvPr>
@@ -2066,8 +2131,10 @@
           <a:bodyPr/>
           <a:lstStyle/>
           <a:p>
-            <a:pPr/>
-            <a:fld id="{86CB4B4D-7CA3-9044-876B-883B54F8677D}" type="slidenum"/>
+            <a:fld id="{86CB4B4D-7CA3-9044-876B-883B54F8677D}" type="slidenum">
+              <a:t>‹N›</a:t>
+            </a:fld>
+            <a:endParaRPr/>
           </a:p>
         </p:txBody>
       </p:sp>
@@ -2076,12 +2143,12 @@
   <p:clrMapOvr>
     <a:masterClrMapping/>
   </p:clrMapOvr>
-  <p:transition xmlns:p14="http://schemas.microsoft.com/office/powerpoint/2010/main" spd="med" advClick="1"/>
+  <p:transition spd="med"/>
 </p:sldLayout>
 </file>
 
 <file path=ppt/slideLayouts/slideLayout6.xml><?xml version="1.0" encoding="utf-8"?>
-<p:sldLayout xmlns:a="http://schemas.openxmlformats.org/drawingml/2006/main" xmlns:r="http://schemas.openxmlformats.org/officeDocument/2006/relationships" xmlns:p="http://schemas.openxmlformats.org/presentationml/2006/main" type="tx" showMasterSp="1" showMasterPhAnim="1">
+<p:sldLayout xmlns:a="http://schemas.openxmlformats.org/drawingml/2006/main" xmlns:r="http://schemas.openxmlformats.org/officeDocument/2006/relationships" xmlns:p="http://schemas.openxmlformats.org/presentationml/2006/main" type="tx">
   <p:cSld name="Titolo e punti elenco">
     <p:spTree>
       <p:nvGrpSpPr>
@@ -2100,7 +2167,9 @@
       <p:sp>
         <p:nvSpPr>
           <p:cNvPr id="61" name="Shape 61"/>
-          <p:cNvSpPr/>
+          <p:cNvSpPr>
+            <a:spLocks noGrp="1"/>
+          </p:cNvSpPr>
           <p:nvPr>
             <p:ph type="body" sz="quarter" idx="13"/>
           </p:nvPr>
@@ -2146,13 +2215,16 @@
                 <a:sym typeface="Helvetica"/>
               </a:defRPr>
             </a:pPr>
+            <a:endParaRPr/>
           </a:p>
         </p:txBody>
       </p:sp>
       <p:sp>
         <p:nvSpPr>
           <p:cNvPr id="62" name="Shape 62"/>
-          <p:cNvSpPr/>
+          <p:cNvSpPr>
+            <a:spLocks noGrp="1"/>
+          </p:cNvSpPr>
           <p:nvPr>
             <p:ph type="title"/>
           </p:nvPr>
@@ -2166,7 +2238,6 @@
           <a:bodyPr/>
           <a:lstStyle/>
           <a:p>
-            <a:pPr/>
             <a:r>
               <a:t>Titolo Testo</a:t>
             </a:r>
@@ -2176,7 +2247,9 @@
       <p:sp>
         <p:nvSpPr>
           <p:cNvPr id="63" name="Shape 63"/>
-          <p:cNvSpPr/>
+          <p:cNvSpPr>
+            <a:spLocks noGrp="1"/>
+          </p:cNvSpPr>
           <p:nvPr>
             <p:ph type="body" idx="1"/>
           </p:nvPr>
@@ -2190,7 +2263,6 @@
           <a:bodyPr/>
           <a:lstStyle/>
           <a:p>
-            <a:pPr/>
             <a:r>
               <a:t>Corpo livello uno</a:t>
             </a:r>
@@ -2224,7 +2296,9 @@
       <p:sp>
         <p:nvSpPr>
           <p:cNvPr id="64" name="Shape 64"/>
-          <p:cNvSpPr/>
+          <p:cNvSpPr>
+            <a:spLocks noGrp="1"/>
+          </p:cNvSpPr>
           <p:nvPr>
             <p:ph type="sldNum" sz="quarter" idx="2"/>
           </p:nvPr>
@@ -2238,8 +2312,10 @@
           <a:bodyPr/>
           <a:lstStyle/>
           <a:p>
-            <a:pPr/>
-            <a:fld id="{86CB4B4D-7CA3-9044-876B-883B54F8677D}" type="slidenum"/>
+            <a:fld id="{86CB4B4D-7CA3-9044-876B-883B54F8677D}" type="slidenum">
+              <a:t>‹N›</a:t>
+            </a:fld>
+            <a:endParaRPr/>
           </a:p>
         </p:txBody>
       </p:sp>
@@ -2248,12 +2324,12 @@
   <p:clrMapOvr>
     <a:masterClrMapping/>
   </p:clrMapOvr>
-  <p:transition xmlns:p14="http://schemas.microsoft.com/office/powerpoint/2010/main" spd="med" advClick="1"/>
+  <p:transition spd="med"/>
 </p:sldLayout>
 </file>
 
 <file path=ppt/slideLayouts/slideLayout7.xml><?xml version="1.0" encoding="utf-8"?>
-<p:sldLayout xmlns:a="http://schemas.openxmlformats.org/drawingml/2006/main" xmlns:r="http://schemas.openxmlformats.org/officeDocument/2006/relationships" xmlns:p="http://schemas.openxmlformats.org/presentationml/2006/main" type="tx" showMasterSp="1" showMasterPhAnim="1">
+<p:sldLayout xmlns:a="http://schemas.openxmlformats.org/drawingml/2006/main" xmlns:r="http://schemas.openxmlformats.org/officeDocument/2006/relationships" xmlns:p="http://schemas.openxmlformats.org/presentationml/2006/main" type="tx">
   <p:cSld name="Titolo, punti elenco e foto">
     <p:spTree>
       <p:nvGrpSpPr>
@@ -2272,7 +2348,9 @@
       <p:sp>
         <p:nvSpPr>
           <p:cNvPr id="71" name="Shape 71"/>
-          <p:cNvSpPr/>
+          <p:cNvSpPr>
+            <a:spLocks noGrp="1"/>
+          </p:cNvSpPr>
           <p:nvPr>
             <p:ph type="pic" idx="13"/>
           </p:nvPr>
@@ -2292,14 +2370,16 @@
           </a:bodyPr>
           <a:lstStyle/>
           <a:p>
-            <a:pPr/>
+            <a:endParaRPr/>
           </a:p>
         </p:txBody>
       </p:sp>
       <p:sp>
         <p:nvSpPr>
           <p:cNvPr id="72" name="Shape 72"/>
-          <p:cNvSpPr/>
+          <p:cNvSpPr>
+            <a:spLocks noGrp="1"/>
+          </p:cNvSpPr>
           <p:nvPr>
             <p:ph type="body" sz="quarter" idx="14"/>
           </p:nvPr>
@@ -2345,13 +2425,16 @@
                 <a:sym typeface="Helvetica"/>
               </a:defRPr>
             </a:pPr>
+            <a:endParaRPr/>
           </a:p>
         </p:txBody>
       </p:sp>
       <p:sp>
         <p:nvSpPr>
           <p:cNvPr id="73" name="Shape 73"/>
-          <p:cNvSpPr/>
+          <p:cNvSpPr>
+            <a:spLocks noGrp="1"/>
+          </p:cNvSpPr>
           <p:nvPr>
             <p:ph type="title"/>
           </p:nvPr>
@@ -2369,7 +2452,6 @@
           <a:bodyPr/>
           <a:lstStyle/>
           <a:p>
-            <a:pPr/>
             <a:r>
               <a:t>Titolo Testo</a:t>
             </a:r>
@@ -2379,7 +2461,9 @@
       <p:sp>
         <p:nvSpPr>
           <p:cNvPr id="74" name="Shape 74"/>
-          <p:cNvSpPr/>
+          <p:cNvSpPr>
+            <a:spLocks noGrp="1"/>
+          </p:cNvSpPr>
           <p:nvPr>
             <p:ph type="body" sz="half" idx="1"/>
           </p:nvPr>
@@ -2413,7 +2497,6 @@
             </a:lvl5pPr>
           </a:lstStyle>
           <a:p>
-            <a:pPr/>
             <a:r>
               <a:t>Corpo livello uno</a:t>
             </a:r>
@@ -2447,7 +2530,9 @@
       <p:sp>
         <p:nvSpPr>
           <p:cNvPr id="75" name="Shape 75"/>
-          <p:cNvSpPr/>
+          <p:cNvSpPr>
+            <a:spLocks noGrp="1"/>
+          </p:cNvSpPr>
           <p:nvPr>
             <p:ph type="sldNum" sz="quarter" idx="2"/>
           </p:nvPr>
@@ -2461,8 +2546,10 @@
           <a:bodyPr/>
           <a:lstStyle/>
           <a:p>
-            <a:pPr/>
-            <a:fld id="{86CB4B4D-7CA3-9044-876B-883B54F8677D}" type="slidenum"/>
+            <a:fld id="{86CB4B4D-7CA3-9044-876B-883B54F8677D}" type="slidenum">
+              <a:t>‹N›</a:t>
+            </a:fld>
+            <a:endParaRPr/>
           </a:p>
         </p:txBody>
       </p:sp>
@@ -2471,12 +2558,12 @@
   <p:clrMapOvr>
     <a:masterClrMapping/>
   </p:clrMapOvr>
-  <p:transition xmlns:p14="http://schemas.microsoft.com/office/powerpoint/2010/main" spd="med" advClick="1"/>
+  <p:transition spd="med"/>
 </p:sldLayout>
 </file>
 
 <file path=ppt/slideLayouts/slideLayout8.xml><?xml version="1.0" encoding="utf-8"?>
-<p:sldLayout xmlns:a="http://schemas.openxmlformats.org/drawingml/2006/main" xmlns:r="http://schemas.openxmlformats.org/officeDocument/2006/relationships" xmlns:p="http://schemas.openxmlformats.org/presentationml/2006/main" type="tx" showMasterSp="1" showMasterPhAnim="1">
+<p:sldLayout xmlns:a="http://schemas.openxmlformats.org/drawingml/2006/main" xmlns:r="http://schemas.openxmlformats.org/officeDocument/2006/relationships" xmlns:p="http://schemas.openxmlformats.org/presentationml/2006/main" type="tx">
   <p:cSld name="Punti elenco">
     <p:spTree>
       <p:nvGrpSpPr>
@@ -2495,7 +2582,9 @@
       <p:sp>
         <p:nvSpPr>
           <p:cNvPr id="82" name="Shape 82"/>
-          <p:cNvSpPr/>
+          <p:cNvSpPr>
+            <a:spLocks noGrp="1"/>
+          </p:cNvSpPr>
           <p:nvPr>
             <p:ph type="body" idx="1"/>
           </p:nvPr>
@@ -2509,7 +2598,6 @@
           <a:bodyPr/>
           <a:lstStyle/>
           <a:p>
-            <a:pPr/>
             <a:r>
               <a:t>Corpo livello uno</a:t>
             </a:r>
@@ -2543,7 +2631,9 @@
       <p:sp>
         <p:nvSpPr>
           <p:cNvPr id="83" name="Shape 83"/>
-          <p:cNvSpPr/>
+          <p:cNvSpPr>
+            <a:spLocks noGrp="1"/>
+          </p:cNvSpPr>
           <p:nvPr>
             <p:ph type="sldNum" sz="quarter" idx="2"/>
           </p:nvPr>
@@ -2557,8 +2647,10 @@
           <a:bodyPr/>
           <a:lstStyle/>
           <a:p>
-            <a:pPr/>
-            <a:fld id="{86CB4B4D-7CA3-9044-876B-883B54F8677D}" type="slidenum"/>
+            <a:fld id="{86CB4B4D-7CA3-9044-876B-883B54F8677D}" type="slidenum">
+              <a:t>‹N›</a:t>
+            </a:fld>
+            <a:endParaRPr/>
           </a:p>
         </p:txBody>
       </p:sp>
@@ -2567,12 +2659,12 @@
   <p:clrMapOvr>
     <a:masterClrMapping/>
   </p:clrMapOvr>
-  <p:transition xmlns:p14="http://schemas.microsoft.com/office/powerpoint/2010/main" spd="med" advClick="1"/>
+  <p:transition spd="med"/>
 </p:sldLayout>
 </file>
 
 <file path=ppt/slideLayouts/slideLayout9.xml><?xml version="1.0" encoding="utf-8"?>
-<p:sldLayout xmlns:a="http://schemas.openxmlformats.org/drawingml/2006/main" xmlns:r="http://schemas.openxmlformats.org/officeDocument/2006/relationships" xmlns:p="http://schemas.openxmlformats.org/presentationml/2006/main" type="tx" showMasterSp="1" showMasterPhAnim="1">
+<p:sldLayout xmlns:a="http://schemas.openxmlformats.org/drawingml/2006/main" xmlns:r="http://schemas.openxmlformats.org/officeDocument/2006/relationships" xmlns:p="http://schemas.openxmlformats.org/presentationml/2006/main" type="tx">
   <p:cSld name="Foto - 3 per pagina">
     <p:spTree>
       <p:nvGrpSpPr>
@@ -2591,7 +2683,9 @@
       <p:sp>
         <p:nvSpPr>
           <p:cNvPr id="90" name="Shape 90"/>
-          <p:cNvSpPr/>
+          <p:cNvSpPr>
+            <a:spLocks noGrp="1"/>
+          </p:cNvSpPr>
           <p:nvPr>
             <p:ph type="pic" idx="13"/>
           </p:nvPr>
@@ -2611,14 +2705,16 @@
           </a:bodyPr>
           <a:lstStyle/>
           <a:p>
-            <a:pPr/>
+            <a:endParaRPr/>
           </a:p>
         </p:txBody>
       </p:sp>
       <p:sp>
         <p:nvSpPr>
           <p:cNvPr id="91" name="Shape 91"/>
-          <p:cNvSpPr/>
+          <p:cNvSpPr>
+            <a:spLocks noGrp="1"/>
+          </p:cNvSpPr>
           <p:nvPr>
             <p:ph type="pic" sz="quarter" idx="14"/>
           </p:nvPr>
@@ -2638,14 +2734,16 @@
           </a:bodyPr>
           <a:lstStyle/>
           <a:p>
-            <a:pPr/>
+            <a:endParaRPr/>
           </a:p>
         </p:txBody>
       </p:sp>
       <p:sp>
         <p:nvSpPr>
           <p:cNvPr id="92" name="Shape 92"/>
-          <p:cNvSpPr/>
+          <p:cNvSpPr>
+            <a:spLocks noGrp="1"/>
+          </p:cNvSpPr>
           <p:nvPr>
             <p:ph type="pic" sz="quarter" idx="15"/>
           </p:nvPr>
@@ -2665,14 +2763,16 @@
           </a:bodyPr>
           <a:lstStyle/>
           <a:p>
-            <a:pPr/>
+            <a:endParaRPr/>
           </a:p>
         </p:txBody>
       </p:sp>
       <p:sp>
         <p:nvSpPr>
           <p:cNvPr id="93" name="Shape 93"/>
-          <p:cNvSpPr/>
+          <p:cNvSpPr>
+            <a:spLocks noGrp="1"/>
+          </p:cNvSpPr>
           <p:nvPr>
             <p:ph type="body" sz="quarter" idx="1"/>
           </p:nvPr>
@@ -2696,7 +2796,7 @@
               <a:buSzTx/>
               <a:buFontTx/>
               <a:buNone/>
-              <a:defRPr spc="28" sz="2800">
+              <a:defRPr sz="2800" spc="28">
                 <a:latin typeface="Iowan Old Style Italic"/>
                 <a:ea typeface="Iowan Old Style Italic"/>
                 <a:cs typeface="Iowan Old Style Italic"/>
@@ -2710,7 +2810,7 @@
               <a:buSzTx/>
               <a:buFontTx/>
               <a:buNone/>
-              <a:defRPr spc="28" sz="2800">
+              <a:defRPr sz="2800" spc="28">
                 <a:latin typeface="Iowan Old Style Italic"/>
                 <a:ea typeface="Iowan Old Style Italic"/>
                 <a:cs typeface="Iowan Old Style Italic"/>
@@ -2724,7 +2824,7 @@
               <a:buSzTx/>
               <a:buFontTx/>
               <a:buNone/>
-              <a:defRPr spc="28" sz="2800">
+              <a:defRPr sz="2800" spc="28">
                 <a:latin typeface="Iowan Old Style Italic"/>
                 <a:ea typeface="Iowan Old Style Italic"/>
                 <a:cs typeface="Iowan Old Style Italic"/>
@@ -2738,7 +2838,7 @@
               <a:buSzTx/>
               <a:buFontTx/>
               <a:buNone/>
-              <a:defRPr spc="28" sz="2800">
+              <a:defRPr sz="2800" spc="28">
                 <a:latin typeface="Iowan Old Style Italic"/>
                 <a:ea typeface="Iowan Old Style Italic"/>
                 <a:cs typeface="Iowan Old Style Italic"/>
@@ -2752,7 +2852,7 @@
               <a:buSzTx/>
               <a:buFontTx/>
               <a:buNone/>
-              <a:defRPr spc="28" sz="2800">
+              <a:defRPr sz="2800" spc="28">
                 <a:latin typeface="Iowan Old Style Italic"/>
                 <a:ea typeface="Iowan Old Style Italic"/>
                 <a:cs typeface="Iowan Old Style Italic"/>
@@ -2761,7 +2861,6 @@
             </a:lvl5pPr>
           </a:lstStyle>
           <a:p>
-            <a:pPr/>
             <a:r>
               <a:t>Corpo livello uno</a:t>
             </a:r>
@@ -2795,7 +2894,9 @@
       <p:sp>
         <p:nvSpPr>
           <p:cNvPr id="94" name="Shape 94"/>
-          <p:cNvSpPr/>
+          <p:cNvSpPr>
+            <a:spLocks noGrp="1"/>
+          </p:cNvSpPr>
           <p:nvPr>
             <p:ph type="sldNum" sz="quarter" idx="2"/>
           </p:nvPr>
@@ -2809,8 +2910,10 @@
           <a:bodyPr/>
           <a:lstStyle/>
           <a:p>
-            <a:pPr/>
-            <a:fld id="{86CB4B4D-7CA3-9044-876B-883B54F8677D}" type="slidenum"/>
+            <a:fld id="{86CB4B4D-7CA3-9044-876B-883B54F8677D}" type="slidenum">
+              <a:t>‹N›</a:t>
+            </a:fld>
+            <a:endParaRPr/>
           </a:p>
         </p:txBody>
       </p:sp>
@@ -2819,7 +2922,7 @@
   <p:clrMapOvr>
     <a:masterClrMapping/>
   </p:clrMapOvr>
-  <p:transition xmlns:p14="http://schemas.microsoft.com/office/powerpoint/2010/main" spd="med" advClick="1"/>
+  <p:transition spd="med"/>
 </p:sldLayout>
 </file>
 
@@ -2831,6 +2934,7 @@
         <a:solidFill>
           <a:srgbClr val="FFFFFF"/>
         </a:solidFill>
+        <a:effectLst/>
       </p:bgPr>
     </p:bg>
     <p:spTree>
@@ -2850,7 +2954,9 @@
       <p:sp>
         <p:nvSpPr>
           <p:cNvPr id="2" name="Shape 2"/>
-          <p:cNvSpPr/>
+          <p:cNvSpPr>
+            <a:spLocks noGrp="1"/>
+          </p:cNvSpPr>
           <p:nvPr>
             <p:ph type="title"/>
           </p:nvPr>
@@ -2868,17 +2974,16 @@
           </a:ln>
           <a:extLst>
             <a:ext uri="{C572A759-6A51-4108-AA02-DFA0A04FC94B}">
-              <ma14:wrappingTextBoxFlag xmlns:ma14="http://schemas.microsoft.com/office/mac/drawingml/2011/main" val="1"/>
+              <ma14:wrappingTextBoxFlag xmlns:ma14="http://schemas.microsoft.com/office/mac/drawingml/2011/main" xmlns="" val="1"/>
             </a:ext>
           </a:extLst>
         </p:spPr>
         <p:txBody>
           <a:bodyPr lIns="50800" tIns="50800" rIns="50800" bIns="50800">
-            <a:normAutofit fontScale="100000" lnSpcReduction="0"/>
+            <a:normAutofit/>
           </a:bodyPr>
           <a:lstStyle/>
           <a:p>
-            <a:pPr/>
             <a:r>
               <a:t>Titolo Testo</a:t>
             </a:r>
@@ -2888,7 +2993,9 @@
       <p:sp>
         <p:nvSpPr>
           <p:cNvPr id="3" name="Shape 3"/>
-          <p:cNvSpPr/>
+          <p:cNvSpPr>
+            <a:spLocks noGrp="1"/>
+          </p:cNvSpPr>
           <p:nvPr>
             <p:ph type="body" idx="1"/>
           </p:nvPr>
@@ -2906,17 +3013,16 @@
           </a:ln>
           <a:extLst>
             <a:ext uri="{C572A759-6A51-4108-AA02-DFA0A04FC94B}">
-              <ma14:wrappingTextBoxFlag xmlns:ma14="http://schemas.microsoft.com/office/mac/drawingml/2011/main" val="1"/>
+              <ma14:wrappingTextBoxFlag xmlns:ma14="http://schemas.microsoft.com/office/mac/drawingml/2011/main" xmlns="" val="1"/>
             </a:ext>
           </a:extLst>
         </p:spPr>
         <p:txBody>
           <a:bodyPr lIns="50800" tIns="50800" rIns="50800" bIns="50800">
-            <a:normAutofit fontScale="100000" lnSpcReduction="0"/>
+            <a:normAutofit/>
           </a:bodyPr>
           <a:lstStyle/>
           <a:p>
-            <a:pPr/>
             <a:r>
               <a:t>Corpo livello uno</a:t>
             </a:r>
@@ -2950,7 +3056,9 @@
       <p:sp>
         <p:nvSpPr>
           <p:cNvPr id="4" name="Shape 4"/>
-          <p:cNvSpPr/>
+          <p:cNvSpPr>
+            <a:spLocks noGrp="1"/>
+          </p:cNvSpPr>
           <p:nvPr>
             <p:ph type="sldNum" sz="quarter" idx="2"/>
           </p:nvPr>
@@ -2976,7 +3084,7 @@
               <a:spcBef>
                 <a:spcPts val="0"/>
               </a:spcBef>
-              <a:defRPr spc="0" sz="1600">
+              <a:defRPr sz="1600" spc="0">
                 <a:solidFill>
                   <a:srgbClr val="747676"/>
                 </a:solidFill>
@@ -2988,8 +3096,10 @@
             </a:lvl1pPr>
           </a:lstStyle>
           <a:p>
-            <a:pPr/>
-            <a:fld id="{86CB4B4D-7CA3-9044-876B-883B54F8677D}" type="slidenum"/>
+            <a:fld id="{86CB4B4D-7CA3-9044-876B-883B54F8677D}" type="slidenum">
+              <a:t>‹N›</a:t>
+            </a:fld>
+            <a:endParaRPr/>
           </a:p>
         </p:txBody>
       </p:sp>
@@ -2997,20 +3107,20 @@
   </p:cSld>
   <p:clrMap bg1="lt1" tx1="dk1" bg2="lt2" tx2="dk2" accent1="accent1" accent2="accent2" accent3="accent3" accent4="accent4" accent5="accent5" accent6="accent6" hlink="hlink" folHlink="folHlink"/>
   <p:sldLayoutIdLst>
-    <p:sldLayoutId id="2147483649" r:id="rId2"/>
-    <p:sldLayoutId id="2147483650" r:id="rId3"/>
-    <p:sldLayoutId id="2147483651" r:id="rId4"/>
-    <p:sldLayoutId id="2147483652" r:id="rId5"/>
-    <p:sldLayoutId id="2147483653" r:id="rId6"/>
-    <p:sldLayoutId id="2147483654" r:id="rId7"/>
-    <p:sldLayoutId id="2147483655" r:id="rId8"/>
-    <p:sldLayoutId id="2147483656" r:id="rId9"/>
-    <p:sldLayoutId id="2147483657" r:id="rId10"/>
-    <p:sldLayoutId id="2147483658" r:id="rId11"/>
-    <p:sldLayoutId id="2147483659" r:id="rId12"/>
-    <p:sldLayoutId id="2147483660" r:id="rId13"/>
+    <p:sldLayoutId id="2147483649" r:id="rId1"/>
+    <p:sldLayoutId id="2147483650" r:id="rId2"/>
+    <p:sldLayoutId id="2147483651" r:id="rId3"/>
+    <p:sldLayoutId id="2147483652" r:id="rId4"/>
+    <p:sldLayoutId id="2147483653" r:id="rId5"/>
+    <p:sldLayoutId id="2147483654" r:id="rId6"/>
+    <p:sldLayoutId id="2147483655" r:id="rId7"/>
+    <p:sldLayoutId id="2147483656" r:id="rId8"/>
+    <p:sldLayoutId id="2147483657" r:id="rId9"/>
+    <p:sldLayoutId id="2147483658" r:id="rId10"/>
+    <p:sldLayoutId id="2147483659" r:id="rId11"/>
+    <p:sldLayoutId id="2147483660" r:id="rId12"/>
   </p:sldLayoutIdLst>
-  <p:transition xmlns:p14="http://schemas.microsoft.com/office/powerpoint/2010/main" spd="med" advClick="1"/>
+  <p:transition spd="med"/>
   <p:txStyles>
     <p:titleStyle>
       <a:lvl1pPr marL="0" marR="0" indent="0" algn="l" defTabSz="584200" rtl="0" latinLnBrk="0">
@@ -3028,7 +3138,7 @@
         <a:buFontTx/>
         <a:buNone/>
         <a:tabLst/>
-        <a:defRPr b="0" baseline="0" cap="all" i="0" spc="0" strike="noStrike" sz="5200" u="none">
+        <a:defRPr sz="5200" b="0" i="0" u="none" strike="noStrike" cap="all" spc="0" baseline="0">
           <a:ln>
             <a:noFill/>
           </a:ln>
@@ -3057,7 +3167,7 @@
         <a:buFontTx/>
         <a:buNone/>
         <a:tabLst/>
-        <a:defRPr b="0" baseline="0" cap="all" i="0" spc="0" strike="noStrike" sz="5200" u="none">
+        <a:defRPr sz="5200" b="0" i="0" u="none" strike="noStrike" cap="all" spc="0" baseline="0">
           <a:ln>
             <a:noFill/>
           </a:ln>
@@ -3086,7 +3196,7 @@
         <a:buFontTx/>
         <a:buNone/>
         <a:tabLst/>
-        <a:defRPr b="0" baseline="0" cap="all" i="0" spc="0" strike="noStrike" sz="5200" u="none">
+        <a:defRPr sz="5200" b="0" i="0" u="none" strike="noStrike" cap="all" spc="0" baseline="0">
           <a:ln>
             <a:noFill/>
           </a:ln>
@@ -3115,7 +3225,7 @@
         <a:buFontTx/>
         <a:buNone/>
         <a:tabLst/>
-        <a:defRPr b="0" baseline="0" cap="all" i="0" spc="0" strike="noStrike" sz="5200" u="none">
+        <a:defRPr sz="5200" b="0" i="0" u="none" strike="noStrike" cap="all" spc="0" baseline="0">
           <a:ln>
             <a:noFill/>
           </a:ln>
@@ -3144,7 +3254,7 @@
         <a:buFontTx/>
         <a:buNone/>
         <a:tabLst/>
-        <a:defRPr b="0" baseline="0" cap="all" i="0" spc="0" strike="noStrike" sz="5200" u="none">
+        <a:defRPr sz="5200" b="0" i="0" u="none" strike="noStrike" cap="all" spc="0" baseline="0">
           <a:ln>
             <a:noFill/>
           </a:ln>
@@ -3173,7 +3283,7 @@
         <a:buFontTx/>
         <a:buNone/>
         <a:tabLst/>
-        <a:defRPr b="0" baseline="0" cap="all" i="0" spc="0" strike="noStrike" sz="5200" u="none">
+        <a:defRPr sz="5200" b="0" i="0" u="none" strike="noStrike" cap="all" spc="0" baseline="0">
           <a:ln>
             <a:noFill/>
           </a:ln>
@@ -3202,7 +3312,7 @@
         <a:buFontTx/>
         <a:buNone/>
         <a:tabLst/>
-        <a:defRPr b="0" baseline="0" cap="all" i="0" spc="0" strike="noStrike" sz="5200" u="none">
+        <a:defRPr sz="5200" b="0" i="0" u="none" strike="noStrike" cap="all" spc="0" baseline="0">
           <a:ln>
             <a:noFill/>
           </a:ln>
@@ -3231,7 +3341,7 @@
         <a:buFontTx/>
         <a:buNone/>
         <a:tabLst/>
-        <a:defRPr b="0" baseline="0" cap="all" i="0" spc="0" strike="noStrike" sz="5200" u="none">
+        <a:defRPr sz="5200" b="0" i="0" u="none" strike="noStrike" cap="all" spc="0" baseline="0">
           <a:ln>
             <a:noFill/>
           </a:ln>
@@ -3260,7 +3370,7 @@
         <a:buFontTx/>
         <a:buNone/>
         <a:tabLst/>
-        <a:defRPr b="0" baseline="0" cap="all" i="0" spc="0" strike="noStrike" sz="5200" u="none">
+        <a:defRPr sz="5200" b="0" i="0" u="none" strike="noStrike" cap="all" spc="0" baseline="0">
           <a:ln>
             <a:noFill/>
           </a:ln>
@@ -3291,7 +3401,7 @@
         <a:buFont typeface="Zapf Dingbats"/>
         <a:buChar char="➤"/>
         <a:tabLst/>
-        <a:defRPr b="0" baseline="0" cap="none" i="0" spc="0" strike="noStrike" sz="3200" u="none">
+        <a:defRPr sz="3200" b="0" i="0" u="none" strike="noStrike" cap="none" spc="0" baseline="0">
           <a:ln>
             <a:noFill/>
           </a:ln>
@@ -3320,7 +3430,7 @@
         <a:buFont typeface="Zapf Dingbats"/>
         <a:buChar char="➤"/>
         <a:tabLst/>
-        <a:defRPr b="0" baseline="0" cap="none" i="0" spc="0" strike="noStrike" sz="3200" u="none">
+        <a:defRPr sz="3200" b="0" i="0" u="none" strike="noStrike" cap="none" spc="0" baseline="0">
           <a:ln>
             <a:noFill/>
           </a:ln>
@@ -3349,7 +3459,7 @@
         <a:buFont typeface="Zapf Dingbats"/>
         <a:buChar char="➤"/>
         <a:tabLst/>
-        <a:defRPr b="0" baseline="0" cap="none" i="0" spc="0" strike="noStrike" sz="3200" u="none">
+        <a:defRPr sz="3200" b="0" i="0" u="none" strike="noStrike" cap="none" spc="0" baseline="0">
           <a:ln>
             <a:noFill/>
           </a:ln>
@@ -3378,7 +3488,7 @@
         <a:buFont typeface="Zapf Dingbats"/>
         <a:buChar char="➤"/>
         <a:tabLst/>
-        <a:defRPr b="0" baseline="0" cap="none" i="0" spc="0" strike="noStrike" sz="3200" u="none">
+        <a:defRPr sz="3200" b="0" i="0" u="none" strike="noStrike" cap="none" spc="0" baseline="0">
           <a:ln>
             <a:noFill/>
           </a:ln>
@@ -3407,7 +3517,7 @@
         <a:buFont typeface="Zapf Dingbats"/>
         <a:buChar char="➤"/>
         <a:tabLst/>
-        <a:defRPr b="0" baseline="0" cap="none" i="0" spc="0" strike="noStrike" sz="3200" u="none">
+        <a:defRPr sz="3200" b="0" i="0" u="none" strike="noStrike" cap="none" spc="0" baseline="0">
           <a:ln>
             <a:noFill/>
           </a:ln>
@@ -3436,7 +3546,7 @@
         <a:buFont typeface="Zapf Dingbats"/>
         <a:buChar char="➤"/>
         <a:tabLst/>
-        <a:defRPr b="0" baseline="0" cap="none" i="0" spc="0" strike="noStrike" sz="3200" u="none">
+        <a:defRPr sz="3200" b="0" i="0" u="none" strike="noStrike" cap="none" spc="0" baseline="0">
           <a:ln>
             <a:noFill/>
           </a:ln>
@@ -3465,7 +3575,7 @@
         <a:buFont typeface="Zapf Dingbats"/>
         <a:buChar char="➤"/>
         <a:tabLst/>
-        <a:defRPr b="0" baseline="0" cap="none" i="0" spc="0" strike="noStrike" sz="3200" u="none">
+        <a:defRPr sz="3200" b="0" i="0" u="none" strike="noStrike" cap="none" spc="0" baseline="0">
           <a:ln>
             <a:noFill/>
           </a:ln>
@@ -3494,7 +3604,7 @@
         <a:buFont typeface="Zapf Dingbats"/>
         <a:buChar char="➤"/>
         <a:tabLst/>
-        <a:defRPr b="0" baseline="0" cap="none" i="0" spc="0" strike="noStrike" sz="3200" u="none">
+        <a:defRPr sz="3200" b="0" i="0" u="none" strike="noStrike" cap="none" spc="0" baseline="0">
           <a:ln>
             <a:noFill/>
           </a:ln>
@@ -3523,7 +3633,7 @@
         <a:buFont typeface="Zapf Dingbats"/>
         <a:buChar char="➤"/>
         <a:tabLst/>
-        <a:defRPr b="0" baseline="0" cap="none" i="0" spc="0" strike="noStrike" sz="3200" u="none">
+        <a:defRPr sz="3200" b="0" i="0" u="none" strike="noStrike" cap="none" spc="0" baseline="0">
           <a:ln>
             <a:noFill/>
           </a:ln>
@@ -3554,7 +3664,7 @@
         <a:buFontTx/>
         <a:buNone/>
         <a:tabLst/>
-        <a:defRPr b="0" baseline="0" cap="none" i="0" spc="0" strike="noStrike" sz="1600" u="none">
+        <a:defRPr sz="1600" b="0" i="0" u="none" strike="noStrike" cap="none" spc="0" baseline="0">
           <a:ln>
             <a:noFill/>
           </a:ln>
@@ -3583,7 +3693,7 @@
         <a:buFontTx/>
         <a:buNone/>
         <a:tabLst/>
-        <a:defRPr b="0" baseline="0" cap="none" i="0" spc="0" strike="noStrike" sz="1600" u="none">
+        <a:defRPr sz="1600" b="0" i="0" u="none" strike="noStrike" cap="none" spc="0" baseline="0">
           <a:ln>
             <a:noFill/>
           </a:ln>
@@ -3612,7 +3722,7 @@
         <a:buFontTx/>
         <a:buNone/>
         <a:tabLst/>
-        <a:defRPr b="0" baseline="0" cap="none" i="0" spc="0" strike="noStrike" sz="1600" u="none">
+        <a:defRPr sz="1600" b="0" i="0" u="none" strike="noStrike" cap="none" spc="0" baseline="0">
           <a:ln>
             <a:noFill/>
           </a:ln>
@@ -3641,7 +3751,7 @@
         <a:buFontTx/>
         <a:buNone/>
         <a:tabLst/>
-        <a:defRPr b="0" baseline="0" cap="none" i="0" spc="0" strike="noStrike" sz="1600" u="none">
+        <a:defRPr sz="1600" b="0" i="0" u="none" strike="noStrike" cap="none" spc="0" baseline="0">
           <a:ln>
             <a:noFill/>
           </a:ln>
@@ -3670,7 +3780,7 @@
         <a:buFontTx/>
         <a:buNone/>
         <a:tabLst/>
-        <a:defRPr b="0" baseline="0" cap="none" i="0" spc="0" strike="noStrike" sz="1600" u="none">
+        <a:defRPr sz="1600" b="0" i="0" u="none" strike="noStrike" cap="none" spc="0" baseline="0">
           <a:ln>
             <a:noFill/>
           </a:ln>
@@ -3699,7 +3809,7 @@
         <a:buFontTx/>
         <a:buNone/>
         <a:tabLst/>
-        <a:defRPr b="0" baseline="0" cap="none" i="0" spc="0" strike="noStrike" sz="1600" u="none">
+        <a:defRPr sz="1600" b="0" i="0" u="none" strike="noStrike" cap="none" spc="0" baseline="0">
           <a:ln>
             <a:noFill/>
           </a:ln>
@@ -3728,7 +3838,7 @@
         <a:buFontTx/>
         <a:buNone/>
         <a:tabLst/>
-        <a:defRPr b="0" baseline="0" cap="none" i="0" spc="0" strike="noStrike" sz="1600" u="none">
+        <a:defRPr sz="1600" b="0" i="0" u="none" strike="noStrike" cap="none" spc="0" baseline="0">
           <a:ln>
             <a:noFill/>
           </a:ln>
@@ -3757,7 +3867,7 @@
         <a:buFontTx/>
         <a:buNone/>
         <a:tabLst/>
-        <a:defRPr b="0" baseline="0" cap="none" i="0" spc="0" strike="noStrike" sz="1600" u="none">
+        <a:defRPr sz="1600" b="0" i="0" u="none" strike="noStrike" cap="none" spc="0" baseline="0">
           <a:ln>
             <a:noFill/>
           </a:ln>
@@ -3786,7 +3896,7 @@
         <a:buFontTx/>
         <a:buNone/>
         <a:tabLst/>
-        <a:defRPr b="0" baseline="0" cap="none" i="0" spc="0" strike="noStrike" sz="1600" u="none">
+        <a:defRPr sz="1600" b="0" i="0" u="none" strike="noStrike" cap="none" spc="0" baseline="0">
           <a:ln>
             <a:noFill/>
           </a:ln>
@@ -3806,7 +3916,7 @@
 </file>
 
 <file path=ppt/slides/slide1.xml><?xml version="1.0" encoding="utf-8"?>
-<p:sld xmlns:a="http://schemas.openxmlformats.org/drawingml/2006/main" xmlns:r="http://schemas.openxmlformats.org/officeDocument/2006/relationships" xmlns:p="http://schemas.openxmlformats.org/presentationml/2006/main" showMasterSp="1" showMasterPhAnim="1">
+<p:sld xmlns:a="http://schemas.openxmlformats.org/drawingml/2006/main" xmlns:r="http://schemas.openxmlformats.org/officeDocument/2006/relationships" xmlns:p="http://schemas.openxmlformats.org/presentationml/2006/main">
   <p:cSld>
     <p:spTree>
       <p:nvGrpSpPr>
@@ -3855,7 +3965,9 @@
       <p:sp>
         <p:nvSpPr>
           <p:cNvPr id="129" name="Shape 129"/>
-          <p:cNvSpPr/>
+          <p:cNvSpPr>
+            <a:spLocks noGrp="1"/>
+          </p:cNvSpPr>
           <p:nvPr>
             <p:ph type="body" idx="13"/>
           </p:nvPr>
@@ -3890,13 +4002,16 @@
                 <a:sym typeface="Helvetica"/>
               </a:defRPr>
             </a:pPr>
+            <a:endParaRPr/>
           </a:p>
         </p:txBody>
       </p:sp>
       <p:sp>
         <p:nvSpPr>
           <p:cNvPr id="130" name="Shape 130"/>
-          <p:cNvSpPr/>
+          <p:cNvSpPr>
+            <a:spLocks noGrp="1"/>
+          </p:cNvSpPr>
           <p:nvPr>
             <p:ph type="ctrTitle"/>
           </p:nvPr>
@@ -3918,7 +4033,6 @@
             </a:lvl1pPr>
           </a:lstStyle>
           <a:p>
-            <a:pPr/>
             <a:r>
               <a:t>Power Enjoy</a:t>
             </a:r>
@@ -3928,7 +4042,9 @@
       <p:sp>
         <p:nvSpPr>
           <p:cNvPr id="131" name="Shape 131"/>
-          <p:cNvSpPr/>
+          <p:cNvSpPr>
+            <a:spLocks noGrp="1"/>
+          </p:cNvSpPr>
           <p:nvPr>
             <p:ph type="subTitle" sz="half" idx="1"/>
           </p:nvPr>
@@ -4005,7 +4121,7 @@
           </a:ln>
           <a:extLst>
             <a:ext uri="{C572A759-6A51-4108-AA02-DFA0A04FC94B}">
-              <ma14:wrappingTextBoxFlag xmlns:ma14="http://schemas.microsoft.com/office/mac/drawingml/2011/main" val="1"/>
+              <ma14:wrappingTextBoxFlag xmlns:ma14="http://schemas.microsoft.com/office/mac/drawingml/2011/main" xmlns="" val="1"/>
             </a:ext>
           </a:extLst>
         </p:spPr>
@@ -4024,7 +4140,6 @@
             </a:lvl1pPr>
           </a:lstStyle>
           <a:p>
-            <a:pPr/>
             <a:r>
               <a:t>Accademic Year 2016/2017</a:t>
             </a:r>
@@ -4050,7 +4165,7 @@
           </a:ln>
           <a:extLst>
             <a:ext uri="{C572A759-6A51-4108-AA02-DFA0A04FC94B}">
-              <ma14:wrappingTextBoxFlag xmlns:ma14="http://schemas.microsoft.com/office/mac/drawingml/2011/main" val="1"/>
+              <ma14:wrappingTextBoxFlag xmlns:ma14="http://schemas.microsoft.com/office/mac/drawingml/2011/main" xmlns="" val="1"/>
             </a:ext>
           </a:extLst>
         </p:spPr>
@@ -4084,12 +4199,12 @@
   <p:clrMapOvr>
     <a:masterClrMapping/>
   </p:clrMapOvr>
-  <p:transition xmlns:p14="http://schemas.microsoft.com/office/powerpoint/2010/main" spd="med" advClick="1"/>
+  <p:transition spd="med"/>
 </p:sld>
 </file>
 
 <file path=ppt/slides/slide10.xml><?xml version="1.0" encoding="utf-8"?>
-<p:sld xmlns:a="http://schemas.openxmlformats.org/drawingml/2006/main" xmlns:r="http://schemas.openxmlformats.org/officeDocument/2006/relationships" xmlns:p="http://schemas.openxmlformats.org/presentationml/2006/main" showMasterSp="1" showMasterPhAnim="1">
+<p:sld xmlns:a="http://schemas.openxmlformats.org/drawingml/2006/main" xmlns:r="http://schemas.openxmlformats.org/officeDocument/2006/relationships" xmlns:p="http://schemas.openxmlformats.org/presentationml/2006/main">
   <p:cSld>
     <p:spTree>
       <p:nvGrpSpPr>
@@ -4108,7 +4223,9 @@
       <p:sp>
         <p:nvSpPr>
           <p:cNvPr id="171" name="Shape 171"/>
-          <p:cNvSpPr/>
+          <p:cNvSpPr>
+            <a:spLocks noGrp="1"/>
+          </p:cNvSpPr>
           <p:nvPr>
             <p:ph type="body" idx="13"/>
           </p:nvPr>
@@ -4139,13 +4256,16 @@
                 <a:sym typeface="Helvetica"/>
               </a:defRPr>
             </a:pPr>
+            <a:endParaRPr/>
           </a:p>
         </p:txBody>
       </p:sp>
       <p:sp>
         <p:nvSpPr>
           <p:cNvPr id="172" name="Shape 172"/>
-          <p:cNvSpPr/>
+          <p:cNvSpPr>
+            <a:spLocks noGrp="1"/>
+          </p:cNvSpPr>
           <p:nvPr>
             <p:ph type="title"/>
           </p:nvPr>
@@ -4156,7 +4276,9 @@
           </a:prstGeom>
         </p:spPr>
         <p:txBody>
-          <a:bodyPr/>
+          <a:bodyPr>
+            <a:normAutofit fontScale="90000"/>
+          </a:bodyPr>
           <a:lstStyle>
             <a:lvl1pPr defTabSz="543305">
               <a:spcBef>
@@ -4166,7 +4288,6 @@
             </a:lvl1pPr>
           </a:lstStyle>
           <a:p>
-            <a:pPr/>
             <a:r>
               <a:t>Mockups</a:t>
             </a:r>
@@ -4176,7 +4297,9 @@
       <p:sp>
         <p:nvSpPr>
           <p:cNvPr id="173" name="Shape 173"/>
-          <p:cNvSpPr/>
+          <p:cNvSpPr>
+            <a:spLocks noGrp="1"/>
+          </p:cNvSpPr>
           <p:nvPr>
             <p:ph type="body" idx="1"/>
           </p:nvPr>
@@ -4190,7 +4313,6 @@
           <a:bodyPr/>
           <a:lstStyle/>
           <a:p>
-            <a:pPr/>
             <a:r>
               <a:t>Unlock the car</a:t>
             </a:r>
@@ -4231,12 +4353,12 @@
   <p:clrMapOvr>
     <a:masterClrMapping/>
   </p:clrMapOvr>
-  <p:transition xmlns:p14="http://schemas.microsoft.com/office/powerpoint/2010/main" spd="med" advClick="1" p14:dur="1000"/>
+  <p:transition spd="slow"/>
 </p:sld>
 </file>
 
 <file path=ppt/slides/slide11.xml><?xml version="1.0" encoding="utf-8"?>
-<p:sld xmlns:a="http://schemas.openxmlformats.org/drawingml/2006/main" xmlns:r="http://schemas.openxmlformats.org/officeDocument/2006/relationships" xmlns:p="http://schemas.openxmlformats.org/presentationml/2006/main" showMasterSp="1" showMasterPhAnim="1">
+<p:sld xmlns:a="http://schemas.openxmlformats.org/drawingml/2006/main" xmlns:r="http://schemas.openxmlformats.org/officeDocument/2006/relationships" xmlns:p="http://schemas.openxmlformats.org/presentationml/2006/main">
   <p:cSld>
     <p:spTree>
       <p:nvGrpSpPr>
@@ -4255,7 +4377,9 @@
       <p:sp>
         <p:nvSpPr>
           <p:cNvPr id="176" name="Shape 176"/>
-          <p:cNvSpPr/>
+          <p:cNvSpPr>
+            <a:spLocks noGrp="1"/>
+          </p:cNvSpPr>
           <p:nvPr>
             <p:ph type="body" idx="13"/>
           </p:nvPr>
@@ -4286,13 +4410,16 @@
                 <a:sym typeface="Helvetica"/>
               </a:defRPr>
             </a:pPr>
+            <a:endParaRPr/>
           </a:p>
         </p:txBody>
       </p:sp>
       <p:sp>
         <p:nvSpPr>
           <p:cNvPr id="177" name="Shape 177"/>
-          <p:cNvSpPr/>
+          <p:cNvSpPr>
+            <a:spLocks noGrp="1"/>
+          </p:cNvSpPr>
           <p:nvPr>
             <p:ph type="title"/>
           </p:nvPr>
@@ -4303,7 +4430,9 @@
           </a:prstGeom>
         </p:spPr>
         <p:txBody>
-          <a:bodyPr/>
+          <a:bodyPr>
+            <a:normAutofit fontScale="90000"/>
+          </a:bodyPr>
           <a:lstStyle>
             <a:lvl1pPr defTabSz="543305">
               <a:spcBef>
@@ -4313,7 +4442,6 @@
             </a:lvl1pPr>
           </a:lstStyle>
           <a:p>
-            <a:pPr/>
             <a:r>
               <a:t>Mockups</a:t>
             </a:r>
@@ -4323,7 +4451,9 @@
       <p:sp>
         <p:nvSpPr>
           <p:cNvPr id="178" name="Shape 178"/>
-          <p:cNvSpPr/>
+          <p:cNvSpPr>
+            <a:spLocks noGrp="1"/>
+          </p:cNvSpPr>
           <p:nvPr>
             <p:ph type="body" idx="1"/>
           </p:nvPr>
@@ -4337,7 +4467,6 @@
           <a:bodyPr/>
           <a:lstStyle/>
           <a:p>
-            <a:pPr/>
             <a:r>
               <a:t>View charge during the trip</a:t>
             </a:r>
@@ -4378,12 +4507,12 @@
   <p:clrMapOvr>
     <a:masterClrMapping/>
   </p:clrMapOvr>
-  <p:transition xmlns:p14="http://schemas.microsoft.com/office/powerpoint/2010/main" spd="med" advClick="1" p14:dur="1000"/>
+  <p:transition spd="slow"/>
 </p:sld>
 </file>
 
 <file path=ppt/slides/slide12.xml><?xml version="1.0" encoding="utf-8"?>
-<p:sld xmlns:a="http://schemas.openxmlformats.org/drawingml/2006/main" xmlns:r="http://schemas.openxmlformats.org/officeDocument/2006/relationships" xmlns:p="http://schemas.openxmlformats.org/presentationml/2006/main" showMasterSp="1" showMasterPhAnim="1">
+<p:sld xmlns:a="http://schemas.openxmlformats.org/drawingml/2006/main" xmlns:r="http://schemas.openxmlformats.org/officeDocument/2006/relationships" xmlns:p="http://schemas.openxmlformats.org/presentationml/2006/main">
   <p:cSld>
     <p:spTree>
       <p:nvGrpSpPr>
@@ -4402,7 +4531,9 @@
       <p:sp>
         <p:nvSpPr>
           <p:cNvPr id="181" name="Shape 181"/>
-          <p:cNvSpPr/>
+          <p:cNvSpPr>
+            <a:spLocks noGrp="1"/>
+          </p:cNvSpPr>
           <p:nvPr>
             <p:ph type="body" idx="13"/>
           </p:nvPr>
@@ -4433,13 +4564,16 @@
                 <a:sym typeface="Helvetica"/>
               </a:defRPr>
             </a:pPr>
+            <a:endParaRPr/>
           </a:p>
         </p:txBody>
       </p:sp>
       <p:sp>
         <p:nvSpPr>
           <p:cNvPr id="182" name="Shape 182"/>
-          <p:cNvSpPr/>
+          <p:cNvSpPr>
+            <a:spLocks noGrp="1"/>
+          </p:cNvSpPr>
           <p:nvPr>
             <p:ph type="title"/>
           </p:nvPr>
@@ -4450,7 +4584,9 @@
           </a:prstGeom>
         </p:spPr>
         <p:txBody>
-          <a:bodyPr/>
+          <a:bodyPr>
+            <a:normAutofit fontScale="90000"/>
+          </a:bodyPr>
           <a:lstStyle>
             <a:lvl1pPr defTabSz="543305">
               <a:spcBef>
@@ -4460,7 +4596,6 @@
             </a:lvl1pPr>
           </a:lstStyle>
           <a:p>
-            <a:pPr/>
             <a:r>
               <a:t>Mockups</a:t>
             </a:r>
@@ -4470,7 +4605,9 @@
       <p:sp>
         <p:nvSpPr>
           <p:cNvPr id="183" name="Shape 183"/>
-          <p:cNvSpPr/>
+          <p:cNvSpPr>
+            <a:spLocks noGrp="1"/>
+          </p:cNvSpPr>
           <p:nvPr>
             <p:ph type="body" idx="1"/>
           </p:nvPr>
@@ -4484,7 +4621,6 @@
           <a:bodyPr/>
           <a:lstStyle/>
           <a:p>
-            <a:pPr/>
             <a:r>
               <a:t>Enable “money saving” option</a:t>
             </a:r>
@@ -4583,12 +4719,12 @@
   <p:clrMapOvr>
     <a:masterClrMapping/>
   </p:clrMapOvr>
-  <p:transition xmlns:p14="http://schemas.microsoft.com/office/powerpoint/2010/main" spd="med" advClick="1" p14:dur="1000"/>
+  <p:transition spd="slow"/>
 </p:sld>
 </file>
 
 <file path=ppt/slides/slide13.xml><?xml version="1.0" encoding="utf-8"?>
-<p:sld xmlns:a="http://schemas.openxmlformats.org/drawingml/2006/main" xmlns:r="http://schemas.openxmlformats.org/officeDocument/2006/relationships" xmlns:p="http://schemas.openxmlformats.org/presentationml/2006/main" showMasterSp="1" showMasterPhAnim="1">
+<p:sld xmlns:a="http://schemas.openxmlformats.org/drawingml/2006/main" xmlns:r="http://schemas.openxmlformats.org/officeDocument/2006/relationships" xmlns:p="http://schemas.openxmlformats.org/presentationml/2006/main">
   <p:cSld>
     <p:spTree>
       <p:nvGrpSpPr>
@@ -4607,7 +4743,9 @@
       <p:sp>
         <p:nvSpPr>
           <p:cNvPr id="188" name="Shape 188"/>
-          <p:cNvSpPr/>
+          <p:cNvSpPr>
+            <a:spLocks noGrp="1"/>
+          </p:cNvSpPr>
           <p:nvPr>
             <p:ph type="body" idx="13"/>
           </p:nvPr>
@@ -4638,13 +4776,16 @@
                 <a:sym typeface="Helvetica"/>
               </a:defRPr>
             </a:pPr>
+            <a:endParaRPr/>
           </a:p>
         </p:txBody>
       </p:sp>
       <p:sp>
         <p:nvSpPr>
           <p:cNvPr id="189" name="Shape 189"/>
-          <p:cNvSpPr/>
+          <p:cNvSpPr>
+            <a:spLocks noGrp="1"/>
+          </p:cNvSpPr>
           <p:nvPr>
             <p:ph type="title"/>
           </p:nvPr>
@@ -4655,7 +4796,9 @@
           </a:prstGeom>
         </p:spPr>
         <p:txBody>
-          <a:bodyPr/>
+          <a:bodyPr>
+            <a:normAutofit fontScale="90000"/>
+          </a:bodyPr>
           <a:lstStyle>
             <a:lvl1pPr defTabSz="543305">
               <a:spcBef>
@@ -4665,7 +4808,6 @@
             </a:lvl1pPr>
           </a:lstStyle>
           <a:p>
-            <a:pPr/>
             <a:r>
               <a:t>Mockups</a:t>
             </a:r>
@@ -4675,7 +4817,9 @@
       <p:sp>
         <p:nvSpPr>
           <p:cNvPr id="190" name="Shape 190"/>
-          <p:cNvSpPr/>
+          <p:cNvSpPr>
+            <a:spLocks noGrp="1"/>
+          </p:cNvSpPr>
           <p:nvPr>
             <p:ph type="body" idx="1"/>
           </p:nvPr>
@@ -4689,7 +4833,6 @@
           <a:bodyPr/>
           <a:lstStyle/>
           <a:p>
-            <a:pPr/>
             <a:r>
               <a:t>Conclude the rent and pay</a:t>
             </a:r>
@@ -4730,12 +4873,12 @@
   <p:clrMapOvr>
     <a:masterClrMapping/>
   </p:clrMapOvr>
-  <p:transition xmlns:p14="http://schemas.microsoft.com/office/powerpoint/2010/main" spd="med" advClick="1" p14:dur="1000"/>
+  <p:transition spd="slow"/>
 </p:sld>
 </file>
 
 <file path=ppt/slides/slide14.xml><?xml version="1.0" encoding="utf-8"?>
-<p:sld xmlns:a="http://schemas.openxmlformats.org/drawingml/2006/main" xmlns:r="http://schemas.openxmlformats.org/officeDocument/2006/relationships" xmlns:p="http://schemas.openxmlformats.org/presentationml/2006/main" showMasterSp="1" showMasterPhAnim="1">
+<p:sld xmlns:a="http://schemas.openxmlformats.org/drawingml/2006/main" xmlns:r="http://schemas.openxmlformats.org/officeDocument/2006/relationships" xmlns:p="http://schemas.openxmlformats.org/presentationml/2006/main">
   <p:cSld>
     <p:spTree>
       <p:nvGrpSpPr>
@@ -4754,7 +4897,9 @@
       <p:sp>
         <p:nvSpPr>
           <p:cNvPr id="193" name="Shape 193"/>
-          <p:cNvSpPr/>
+          <p:cNvSpPr>
+            <a:spLocks noGrp="1"/>
+          </p:cNvSpPr>
           <p:nvPr>
             <p:ph type="body" idx="13"/>
           </p:nvPr>
@@ -4789,13 +4934,16 @@
                 <a:sym typeface="Helvetica"/>
               </a:defRPr>
             </a:pPr>
+            <a:endParaRPr/>
           </a:p>
         </p:txBody>
       </p:sp>
       <p:sp>
         <p:nvSpPr>
           <p:cNvPr id="194" name="Shape 194"/>
-          <p:cNvSpPr/>
+          <p:cNvSpPr>
+            <a:spLocks noGrp="1"/>
+          </p:cNvSpPr>
           <p:nvPr>
             <p:ph type="title"/>
           </p:nvPr>
@@ -4934,6 +5082,7 @@
               </a:spcBef>
               <a:defRPr sz="5148"/>
             </a:pPr>
+            <a:endParaRPr/>
           </a:p>
           <a:p>
             <a:pPr algn="ctr" defTabSz="578358">
@@ -5069,12 +5218,12 @@
   <p:clrMapOvr>
     <a:masterClrMapping/>
   </p:clrMapOvr>
-  <p:transition xmlns:p14="http://schemas.microsoft.com/office/powerpoint/2010/main" spd="med" advClick="1" p14:dur="1000"/>
+  <p:transition spd="slow"/>
 </p:sld>
 </file>
 
 <file path=ppt/slides/slide15.xml><?xml version="1.0" encoding="utf-8"?>
-<p:sld xmlns:a="http://schemas.openxmlformats.org/drawingml/2006/main" xmlns:r="http://schemas.openxmlformats.org/officeDocument/2006/relationships" xmlns:p="http://schemas.openxmlformats.org/presentationml/2006/main" showMasterSp="1" showMasterPhAnim="1">
+<p:sld xmlns:a="http://schemas.openxmlformats.org/drawingml/2006/main" xmlns:r="http://schemas.openxmlformats.org/officeDocument/2006/relationships" xmlns:p="http://schemas.openxmlformats.org/presentationml/2006/main">
   <p:cSld>
     <p:spTree>
       <p:nvGrpSpPr>
@@ -5093,7 +5242,9 @@
       <p:sp>
         <p:nvSpPr>
           <p:cNvPr id="197" name="Shape 197"/>
-          <p:cNvSpPr/>
+          <p:cNvSpPr>
+            <a:spLocks noGrp="1"/>
+          </p:cNvSpPr>
           <p:nvPr>
             <p:ph type="body" idx="13"/>
           </p:nvPr>
@@ -5124,13 +5275,16 @@
                 <a:sym typeface="Helvetica"/>
               </a:defRPr>
             </a:pPr>
+            <a:endParaRPr/>
           </a:p>
         </p:txBody>
       </p:sp>
       <p:sp>
         <p:nvSpPr>
           <p:cNvPr id="198" name="Shape 198"/>
-          <p:cNvSpPr/>
+          <p:cNvSpPr>
+            <a:spLocks noGrp="1"/>
+          </p:cNvSpPr>
           <p:nvPr>
             <p:ph type="title"/>
           </p:nvPr>
@@ -5141,7 +5295,9 @@
           </a:prstGeom>
         </p:spPr>
         <p:txBody>
-          <a:bodyPr/>
+          <a:bodyPr>
+            <a:normAutofit fontScale="90000"/>
+          </a:bodyPr>
           <a:lstStyle>
             <a:lvl1pPr defTabSz="543305">
               <a:spcBef>
@@ -5151,7 +5307,6 @@
             </a:lvl1pPr>
           </a:lstStyle>
           <a:p>
-            <a:pPr/>
             <a:r>
               <a:t>activity diagram</a:t>
             </a:r>
@@ -5192,12 +5347,12 @@
   <p:clrMapOvr>
     <a:masterClrMapping/>
   </p:clrMapOvr>
-  <p:transition xmlns:p14="http://schemas.microsoft.com/office/powerpoint/2010/main" spd="med" advClick="1" p14:dur="1000"/>
+  <p:transition spd="slow"/>
 </p:sld>
 </file>
 
 <file path=ppt/slides/slide16.xml><?xml version="1.0" encoding="utf-8"?>
-<p:sld xmlns:a="http://schemas.openxmlformats.org/drawingml/2006/main" xmlns:r="http://schemas.openxmlformats.org/officeDocument/2006/relationships" xmlns:p="http://schemas.openxmlformats.org/presentationml/2006/main" showMasterSp="1" showMasterPhAnim="1">
+<p:sld xmlns:a="http://schemas.openxmlformats.org/drawingml/2006/main" xmlns:r="http://schemas.openxmlformats.org/officeDocument/2006/relationships" xmlns:p="http://schemas.openxmlformats.org/presentationml/2006/main">
   <p:cSld>
     <p:spTree>
       <p:nvGrpSpPr>
@@ -5216,7 +5371,9 @@
       <p:sp>
         <p:nvSpPr>
           <p:cNvPr id="201" name="Shape 201"/>
-          <p:cNvSpPr/>
+          <p:cNvSpPr>
+            <a:spLocks noGrp="1"/>
+          </p:cNvSpPr>
           <p:nvPr>
             <p:ph type="body" idx="13"/>
           </p:nvPr>
@@ -5247,13 +5404,16 @@
                 <a:sym typeface="Helvetica"/>
               </a:defRPr>
             </a:pPr>
+            <a:endParaRPr/>
           </a:p>
         </p:txBody>
       </p:sp>
       <p:sp>
         <p:nvSpPr>
           <p:cNvPr id="202" name="Shape 202"/>
-          <p:cNvSpPr/>
+          <p:cNvSpPr>
+            <a:spLocks noGrp="1"/>
+          </p:cNvSpPr>
           <p:nvPr>
             <p:ph type="title"/>
           </p:nvPr>
@@ -5264,7 +5424,9 @@
           </a:prstGeom>
         </p:spPr>
         <p:txBody>
-          <a:bodyPr/>
+          <a:bodyPr>
+            <a:normAutofit fontScale="90000"/>
+          </a:bodyPr>
           <a:lstStyle>
             <a:lvl1pPr defTabSz="543305">
               <a:spcBef>
@@ -5274,7 +5436,6 @@
             </a:lvl1pPr>
           </a:lstStyle>
           <a:p>
-            <a:pPr/>
             <a:r>
               <a:t>State diagram</a:t>
             </a:r>
@@ -5315,12 +5476,12 @@
   <p:clrMapOvr>
     <a:masterClrMapping/>
   </p:clrMapOvr>
-  <p:transition xmlns:p14="http://schemas.microsoft.com/office/powerpoint/2010/main" spd="med" advClick="1" p14:dur="1000"/>
+  <p:transition spd="slow"/>
 </p:sld>
 </file>
 
 <file path=ppt/slides/slide17.xml><?xml version="1.0" encoding="utf-8"?>
-<p:sld xmlns:a="http://schemas.openxmlformats.org/drawingml/2006/main" xmlns:r="http://schemas.openxmlformats.org/officeDocument/2006/relationships" xmlns:p="http://schemas.openxmlformats.org/presentationml/2006/main" showMasterSp="1" showMasterPhAnim="1">
+<p:sld xmlns:a="http://schemas.openxmlformats.org/drawingml/2006/main" xmlns:r="http://schemas.openxmlformats.org/officeDocument/2006/relationships" xmlns:p="http://schemas.openxmlformats.org/presentationml/2006/main">
   <p:cSld>
     <p:spTree>
       <p:nvGrpSpPr>
@@ -5339,7 +5500,9 @@
       <p:sp>
         <p:nvSpPr>
           <p:cNvPr id="205" name="Shape 205"/>
-          <p:cNvSpPr/>
+          <p:cNvSpPr>
+            <a:spLocks noGrp="1"/>
+          </p:cNvSpPr>
           <p:nvPr>
             <p:ph type="body" idx="13"/>
           </p:nvPr>
@@ -5370,13 +5533,16 @@
                 <a:sym typeface="Helvetica"/>
               </a:defRPr>
             </a:pPr>
+            <a:endParaRPr/>
           </a:p>
         </p:txBody>
       </p:sp>
       <p:sp>
         <p:nvSpPr>
           <p:cNvPr id="206" name="Shape 206"/>
-          <p:cNvSpPr/>
+          <p:cNvSpPr>
+            <a:spLocks noGrp="1"/>
+          </p:cNvSpPr>
           <p:nvPr>
             <p:ph type="title"/>
           </p:nvPr>
@@ -5387,7 +5553,9 @@
           </a:prstGeom>
         </p:spPr>
         <p:txBody>
-          <a:bodyPr/>
+          <a:bodyPr>
+            <a:normAutofit fontScale="90000"/>
+          </a:bodyPr>
           <a:lstStyle>
             <a:lvl1pPr defTabSz="543305">
               <a:spcBef>
@@ -5397,7 +5565,6 @@
             </a:lvl1pPr>
           </a:lstStyle>
           <a:p>
-            <a:pPr/>
             <a:r>
               <a:t>use case diagram</a:t>
             </a:r>
@@ -5438,12 +5605,12 @@
   <p:clrMapOvr>
     <a:masterClrMapping/>
   </p:clrMapOvr>
-  <p:transition xmlns:p14="http://schemas.microsoft.com/office/powerpoint/2010/main" spd="med" advClick="1" p14:dur="1000"/>
+  <p:transition spd="slow"/>
 </p:sld>
 </file>
 
 <file path=ppt/slides/slide18.xml><?xml version="1.0" encoding="utf-8"?>
-<p:sld xmlns:a="http://schemas.openxmlformats.org/drawingml/2006/main" xmlns:r="http://schemas.openxmlformats.org/officeDocument/2006/relationships" xmlns:p="http://schemas.openxmlformats.org/presentationml/2006/main" showMasterSp="1" showMasterPhAnim="1">
+<p:sld xmlns:a="http://schemas.openxmlformats.org/drawingml/2006/main" xmlns:r="http://schemas.openxmlformats.org/officeDocument/2006/relationships" xmlns:p="http://schemas.openxmlformats.org/presentationml/2006/main">
   <p:cSld>
     <p:spTree>
       <p:nvGrpSpPr>
@@ -5462,7 +5629,9 @@
       <p:sp>
         <p:nvSpPr>
           <p:cNvPr id="209" name="Shape 209"/>
-          <p:cNvSpPr/>
+          <p:cNvSpPr>
+            <a:spLocks noGrp="1"/>
+          </p:cNvSpPr>
           <p:nvPr>
             <p:ph type="body" idx="13"/>
           </p:nvPr>
@@ -5493,13 +5662,16 @@
                 <a:sym typeface="Helvetica"/>
               </a:defRPr>
             </a:pPr>
+            <a:endParaRPr/>
           </a:p>
         </p:txBody>
       </p:sp>
       <p:sp>
         <p:nvSpPr>
           <p:cNvPr id="210" name="Shape 210"/>
-          <p:cNvSpPr/>
+          <p:cNvSpPr>
+            <a:spLocks noGrp="1"/>
+          </p:cNvSpPr>
           <p:nvPr>
             <p:ph type="title"/>
           </p:nvPr>
@@ -5510,7 +5682,9 @@
           </a:prstGeom>
         </p:spPr>
         <p:txBody>
-          <a:bodyPr/>
+          <a:bodyPr>
+            <a:normAutofit fontScale="90000"/>
+          </a:bodyPr>
           <a:lstStyle>
             <a:lvl1pPr defTabSz="543305">
               <a:spcBef>
@@ -5520,7 +5694,6 @@
             </a:lvl1pPr>
           </a:lstStyle>
           <a:p>
-            <a:pPr/>
             <a:r>
               <a:t>class diagram</a:t>
             </a:r>
@@ -5561,12 +5734,12 @@
   <p:clrMapOvr>
     <a:masterClrMapping/>
   </p:clrMapOvr>
-  <p:transition xmlns:p14="http://schemas.microsoft.com/office/powerpoint/2010/main" spd="med" advClick="1" p14:dur="1000"/>
+  <p:transition spd="slow"/>
 </p:sld>
 </file>
 
 <file path=ppt/slides/slide19.xml><?xml version="1.0" encoding="utf-8"?>
-<p:sld xmlns:a="http://schemas.openxmlformats.org/drawingml/2006/main" xmlns:r="http://schemas.openxmlformats.org/officeDocument/2006/relationships" xmlns:p="http://schemas.openxmlformats.org/presentationml/2006/main" showMasterSp="1" showMasterPhAnim="1">
+<p:sld xmlns:a="http://schemas.openxmlformats.org/drawingml/2006/main" xmlns:r="http://schemas.openxmlformats.org/officeDocument/2006/relationships" xmlns:p="http://schemas.openxmlformats.org/presentationml/2006/main">
   <p:cSld>
     <p:spTree>
       <p:nvGrpSpPr>
@@ -5585,7 +5758,9 @@
       <p:sp>
         <p:nvSpPr>
           <p:cNvPr id="213" name="Shape 213"/>
-          <p:cNvSpPr/>
+          <p:cNvSpPr>
+            <a:spLocks noGrp="1"/>
+          </p:cNvSpPr>
           <p:nvPr>
             <p:ph type="body" idx="13"/>
           </p:nvPr>
@@ -5616,13 +5791,16 @@
                 <a:sym typeface="Helvetica"/>
               </a:defRPr>
             </a:pPr>
+            <a:endParaRPr/>
           </a:p>
         </p:txBody>
       </p:sp>
       <p:sp>
         <p:nvSpPr>
           <p:cNvPr id="214" name="Shape 214"/>
-          <p:cNvSpPr/>
+          <p:cNvSpPr>
+            <a:spLocks noGrp="1"/>
+          </p:cNvSpPr>
           <p:nvPr>
             <p:ph type="title"/>
           </p:nvPr>
@@ -5633,7 +5811,9 @@
           </a:prstGeom>
         </p:spPr>
         <p:txBody>
-          <a:bodyPr/>
+          <a:bodyPr>
+            <a:normAutofit fontScale="90000"/>
+          </a:bodyPr>
           <a:lstStyle>
             <a:lvl1pPr defTabSz="543305">
               <a:spcBef>
@@ -5643,7 +5823,6 @@
             </a:lvl1pPr>
           </a:lstStyle>
           <a:p>
-            <a:pPr/>
             <a:r>
               <a:t>alloy model 1</a:t>
             </a:r>
@@ -5698,7 +5877,7 @@
           </a:ln>
           <a:extLst>
             <a:ext uri="{C572A759-6A51-4108-AA02-DFA0A04FC94B}">
-              <ma14:wrappingTextBoxFlag xmlns:ma14="http://schemas.microsoft.com/office/mac/drawingml/2011/main" val="1"/>
+              <ma14:wrappingTextBoxFlag xmlns:ma14="http://schemas.microsoft.com/office/mac/drawingml/2011/main" xmlns="" val="1"/>
             </a:ext>
           </a:extLst>
         </p:spPr>
@@ -5708,7 +5887,6 @@
           </a:bodyPr>
           <a:lstStyle/>
           <a:p>
-            <a:pPr/>
             <a:r>
               <a:t>Trip ended with discount</a:t>
             </a:r>
@@ -5720,12 +5898,12 @@
   <p:clrMapOvr>
     <a:masterClrMapping/>
   </p:clrMapOvr>
-  <p:transition xmlns:p14="http://schemas.microsoft.com/office/powerpoint/2010/main" spd="med" advClick="1" p14:dur="1000"/>
+  <p:transition spd="slow"/>
 </p:sld>
 </file>
 
 <file path=ppt/slides/slide2.xml><?xml version="1.0" encoding="utf-8"?>
-<p:sld xmlns:a="http://schemas.openxmlformats.org/drawingml/2006/main" xmlns:r="http://schemas.openxmlformats.org/officeDocument/2006/relationships" xmlns:p="http://schemas.openxmlformats.org/presentationml/2006/main" showMasterSp="1" showMasterPhAnim="1">
+<p:sld xmlns:a="http://schemas.openxmlformats.org/drawingml/2006/main" xmlns:r="http://schemas.openxmlformats.org/officeDocument/2006/relationships" xmlns:p="http://schemas.openxmlformats.org/presentationml/2006/main">
   <p:cSld>
     <p:spTree>
       <p:nvGrpSpPr>
@@ -5744,7 +5922,9 @@
       <p:sp>
         <p:nvSpPr>
           <p:cNvPr id="135" name="Shape 135"/>
-          <p:cNvSpPr/>
+          <p:cNvSpPr>
+            <a:spLocks noGrp="1"/>
+          </p:cNvSpPr>
           <p:nvPr>
             <p:ph type="body" idx="13"/>
           </p:nvPr>
@@ -5775,13 +5955,16 @@
                 <a:sym typeface="Helvetica"/>
               </a:defRPr>
             </a:pPr>
+            <a:endParaRPr/>
           </a:p>
         </p:txBody>
       </p:sp>
       <p:sp>
         <p:nvSpPr>
           <p:cNvPr id="136" name="Shape 136"/>
-          <p:cNvSpPr/>
+          <p:cNvSpPr>
+            <a:spLocks noGrp="1"/>
+          </p:cNvSpPr>
           <p:nvPr>
             <p:ph type="title"/>
           </p:nvPr>
@@ -5792,7 +5975,9 @@
           </a:prstGeom>
         </p:spPr>
         <p:txBody>
-          <a:bodyPr/>
+          <a:bodyPr>
+            <a:normAutofit fontScale="90000"/>
+          </a:bodyPr>
           <a:lstStyle>
             <a:lvl1pPr defTabSz="543305">
               <a:spcBef>
@@ -5802,7 +5987,6 @@
             </a:lvl1pPr>
           </a:lstStyle>
           <a:p>
-            <a:pPr/>
             <a:r>
               <a:t>introduction 1</a:t>
             </a:r>
@@ -5812,7 +5996,9 @@
       <p:sp>
         <p:nvSpPr>
           <p:cNvPr id="137" name="Shape 137"/>
-          <p:cNvSpPr/>
+          <p:cNvSpPr>
+            <a:spLocks noGrp="1"/>
+          </p:cNvSpPr>
           <p:nvPr>
             <p:ph type="body" idx="1"/>
           </p:nvPr>
@@ -5833,7 +6019,16 @@
               <a:defRPr sz="2880"/>
             </a:pPr>
             <a:r>
-              <a:t>The goal of our project is to design and develop a digital management system for car-sharing service. </a:t>
+              <a:rPr dirty="0"/>
+              <a:t>The goal of our project is to design and develop a digital management system for </a:t>
+            </a:r>
+            <a:r>
+              <a:rPr b="1" dirty="0"/>
+              <a:t>car-sharing service</a:t>
+            </a:r>
+            <a:r>
+              <a:rPr dirty="0"/>
+              <a:t>. </a:t>
             </a:r>
           </a:p>
           <a:p>
@@ -5844,7 +6039,16 @@
               <a:defRPr sz="2880"/>
             </a:pPr>
             <a:r>
-              <a:t>This system employs exclusively electric cars.</a:t>
+              <a:rPr dirty="0"/>
+              <a:t>This system employs exclusively </a:t>
+            </a:r>
+            <a:r>
+              <a:rPr b="1" dirty="0"/>
+              <a:t>electric cars</a:t>
+            </a:r>
+            <a:r>
+              <a:rPr dirty="0"/>
+              <a:t>.</a:t>
             </a:r>
           </a:p>
           <a:p>
@@ -5855,8 +6059,22 @@
               <a:defRPr sz="2880"/>
             </a:pPr>
             <a:r>
-              <a:t>The system should provide classic functionality provided by generic car-sharing service, like car’s reservation or payment thought mobile application</a:t>
-            </a:r>
+              <a:rPr dirty="0"/>
+              <a:t>The system should provide classic functionality provided by generic car-sharing service, like car’s </a:t>
+            </a:r>
+            <a:r>
+              <a:rPr b="1" dirty="0"/>
+              <a:t>reservation</a:t>
+            </a:r>
+            <a:r>
+              <a:rPr dirty="0"/>
+              <a:t> or </a:t>
+            </a:r>
+            <a:r>
+              <a:rPr b="1" dirty="0"/>
+              <a:t>payment</a:t>
+            </a:r>
+            <a:endParaRPr dirty="0"/>
           </a:p>
           <a:p>
             <a:pPr marL="422909" indent="-422909" defTabSz="525779">
@@ -5866,7 +6084,44 @@
               <a:defRPr sz="2880"/>
             </a:pPr>
             <a:r>
-              <a:t>User should be able to register to the system himself by providing personal information</a:t>
+              <a:rPr dirty="0"/>
+              <a:t>User </a:t>
+            </a:r>
+            <a:r>
+              <a:rPr lang="it-IT" dirty="0"/>
+              <a:t>can </a:t>
+            </a:r>
+            <a:r>
+              <a:rPr b="1" dirty="0"/>
+              <a:t>register</a:t>
+            </a:r>
+            <a:r>
+              <a:rPr dirty="0"/>
+              <a:t> </a:t>
+            </a:r>
+            <a:r>
+              <a:rPr lang="it-IT" dirty="0"/>
+              <a:t>in</a:t>
+            </a:r>
+            <a:r>
+              <a:rPr dirty="0"/>
+              <a:t>to the system</a:t>
+            </a:r>
+            <a:r>
+              <a:rPr lang="it-IT" dirty="0"/>
+              <a:t> (</a:t>
+            </a:r>
+            <a:r>
+              <a:rPr lang="it-IT" dirty="0" err="1"/>
+              <a:t>through</a:t>
+            </a:r>
+            <a:r>
+              <a:rPr lang="it-IT" dirty="0"/>
+              <a:t> APP or web)</a:t>
+            </a:r>
+            <a:r>
+              <a:rPr dirty="0"/>
+              <a:t> by providing personal information</a:t>
             </a:r>
           </a:p>
           <a:p>
@@ -5877,7 +6132,16 @@
               <a:defRPr sz="2880"/>
             </a:pPr>
             <a:r>
-              <a:t>Through mobile application, registered user should be able to find a car within a certain distance from current location or from a specific address</a:t>
+              <a:rPr dirty="0"/>
+              <a:t>Through mobile application, registered user should be able to </a:t>
+            </a:r>
+            <a:r>
+              <a:rPr b="1" dirty="0"/>
+              <a:t>find a car </a:t>
+            </a:r>
+            <a:r>
+              <a:rPr dirty="0"/>
+              <a:t>within a certain distance from current location or from a specific address</a:t>
             </a:r>
           </a:p>
           <a:p>
@@ -5888,7 +6152,16 @@
               <a:defRPr sz="2880"/>
             </a:pPr>
             <a:r>
-              <a:t>The system provides also the possibility to reserve a single car</a:t>
+              <a:rPr dirty="0"/>
+              <a:t>The system provides also the possibility to </a:t>
+            </a:r>
+            <a:r>
+              <a:rPr b="1" dirty="0"/>
+              <a:t>reserve</a:t>
+            </a:r>
+            <a:r>
+              <a:rPr dirty="0"/>
+              <a:t> a single car</a:t>
             </a:r>
           </a:p>
         </p:txBody>
@@ -5898,12 +6171,12 @@
   <p:clrMapOvr>
     <a:masterClrMapping/>
   </p:clrMapOvr>
-  <p:transition xmlns:p14="http://schemas.microsoft.com/office/powerpoint/2010/main" spd="med" advClick="1" p14:dur="1000"/>
+  <p:transition spd="slow"/>
 </p:sld>
 </file>
 
 <file path=ppt/slides/slide20.xml><?xml version="1.0" encoding="utf-8"?>
-<p:sld xmlns:a="http://schemas.openxmlformats.org/drawingml/2006/main" xmlns:r="http://schemas.openxmlformats.org/officeDocument/2006/relationships" xmlns:p="http://schemas.openxmlformats.org/presentationml/2006/main" showMasterSp="1" showMasterPhAnim="1">
+<p:sld xmlns:a="http://schemas.openxmlformats.org/drawingml/2006/main" xmlns:r="http://schemas.openxmlformats.org/officeDocument/2006/relationships" xmlns:p="http://schemas.openxmlformats.org/presentationml/2006/main">
   <p:cSld>
     <p:spTree>
       <p:nvGrpSpPr>
@@ -5922,7 +6195,9 @@
       <p:sp>
         <p:nvSpPr>
           <p:cNvPr id="218" name="Shape 218"/>
-          <p:cNvSpPr/>
+          <p:cNvSpPr>
+            <a:spLocks noGrp="1"/>
+          </p:cNvSpPr>
           <p:nvPr>
             <p:ph type="body" idx="13"/>
           </p:nvPr>
@@ -5953,13 +6228,16 @@
                 <a:sym typeface="Helvetica"/>
               </a:defRPr>
             </a:pPr>
+            <a:endParaRPr/>
           </a:p>
         </p:txBody>
       </p:sp>
       <p:sp>
         <p:nvSpPr>
           <p:cNvPr id="219" name="Shape 219"/>
-          <p:cNvSpPr/>
+          <p:cNvSpPr>
+            <a:spLocks noGrp="1"/>
+          </p:cNvSpPr>
           <p:nvPr>
             <p:ph type="title"/>
           </p:nvPr>
@@ -5970,7 +6248,9 @@
           </a:prstGeom>
         </p:spPr>
         <p:txBody>
-          <a:bodyPr/>
+          <a:bodyPr>
+            <a:normAutofit fontScale="90000"/>
+          </a:bodyPr>
           <a:lstStyle>
             <a:lvl1pPr defTabSz="543305">
               <a:spcBef>
@@ -5980,7 +6260,6 @@
             </a:lvl1pPr>
           </a:lstStyle>
           <a:p>
-            <a:pPr/>
             <a:r>
               <a:t>alloy model 2</a:t>
             </a:r>
@@ -6035,7 +6314,7 @@
           </a:ln>
           <a:extLst>
             <a:ext uri="{C572A759-6A51-4108-AA02-DFA0A04FC94B}">
-              <ma14:wrappingTextBoxFlag xmlns:ma14="http://schemas.microsoft.com/office/mac/drawingml/2011/main" val="1"/>
+              <ma14:wrappingTextBoxFlag xmlns:ma14="http://schemas.microsoft.com/office/mac/drawingml/2011/main" xmlns="" val="1"/>
             </a:ext>
           </a:extLst>
         </p:spPr>
@@ -6045,7 +6324,6 @@
           </a:bodyPr>
           <a:lstStyle/>
           <a:p>
-            <a:pPr/>
             <a:r>
               <a:t>Reservation waiting</a:t>
             </a:r>
@@ -6057,12 +6335,12 @@
   <p:clrMapOvr>
     <a:masterClrMapping/>
   </p:clrMapOvr>
-  <p:transition xmlns:p14="http://schemas.microsoft.com/office/powerpoint/2010/main" spd="med" advClick="1" p14:dur="1000"/>
+  <p:transition spd="slow"/>
 </p:sld>
 </file>
 
 <file path=ppt/slides/slide3.xml><?xml version="1.0" encoding="utf-8"?>
-<p:sld xmlns:a="http://schemas.openxmlformats.org/drawingml/2006/main" xmlns:r="http://schemas.openxmlformats.org/officeDocument/2006/relationships" xmlns:p="http://schemas.openxmlformats.org/presentationml/2006/main" showMasterSp="1" showMasterPhAnim="1">
+<p:sld xmlns:a="http://schemas.openxmlformats.org/drawingml/2006/main" xmlns:r="http://schemas.openxmlformats.org/officeDocument/2006/relationships" xmlns:p="http://schemas.openxmlformats.org/presentationml/2006/main">
   <p:cSld>
     <p:spTree>
       <p:nvGrpSpPr>
@@ -6081,7 +6359,9 @@
       <p:sp>
         <p:nvSpPr>
           <p:cNvPr id="139" name="Shape 139"/>
-          <p:cNvSpPr/>
+          <p:cNvSpPr>
+            <a:spLocks noGrp="1"/>
+          </p:cNvSpPr>
           <p:nvPr>
             <p:ph type="body" idx="13"/>
           </p:nvPr>
@@ -6112,13 +6392,16 @@
                 <a:sym typeface="Helvetica"/>
               </a:defRPr>
             </a:pPr>
+            <a:endParaRPr/>
           </a:p>
         </p:txBody>
       </p:sp>
       <p:sp>
         <p:nvSpPr>
           <p:cNvPr id="140" name="Shape 140"/>
-          <p:cNvSpPr/>
+          <p:cNvSpPr>
+            <a:spLocks noGrp="1"/>
+          </p:cNvSpPr>
           <p:nvPr>
             <p:ph type="title"/>
           </p:nvPr>
@@ -6129,7 +6412,9 @@
           </a:prstGeom>
         </p:spPr>
         <p:txBody>
-          <a:bodyPr/>
+          <a:bodyPr>
+            <a:normAutofit fontScale="90000"/>
+          </a:bodyPr>
           <a:lstStyle>
             <a:lvl1pPr defTabSz="543305">
               <a:spcBef>
@@ -6139,7 +6424,6 @@
             </a:lvl1pPr>
           </a:lstStyle>
           <a:p>
-            <a:pPr/>
             <a:r>
               <a:t>introduction 2</a:t>
             </a:r>
@@ -6149,7 +6433,9 @@
       <p:sp>
         <p:nvSpPr>
           <p:cNvPr id="141" name="Shape 141"/>
-          <p:cNvSpPr/>
+          <p:cNvSpPr>
+            <a:spLocks noGrp="1"/>
+          </p:cNvSpPr>
           <p:nvPr>
             <p:ph type="body" idx="1"/>
           </p:nvPr>
@@ -6170,7 +6456,24 @@
               <a:defRPr sz="2624"/>
             </a:pPr>
             <a:r>
-              <a:t>Car-sharing system initiate the charging of money as soon as the engine ignites, and the system starts charging the user for a given amount of money per minute</a:t>
+              <a:rPr dirty="0"/>
+              <a:t>Car-sharing system initiate</a:t>
+            </a:r>
+            <a:r>
+              <a:rPr lang="it-IT" dirty="0"/>
+              <a:t>s</a:t>
+            </a:r>
+            <a:r>
+              <a:rPr dirty="0"/>
+              <a:t> the </a:t>
+            </a:r>
+            <a:r>
+              <a:rPr b="1" dirty="0"/>
+              <a:t>charging of money </a:t>
+            </a:r>
+            <a:r>
+              <a:rPr dirty="0"/>
+              <a:t>as soon as the engine ignites, and the system starts charging the user for a given amount of money per minute</a:t>
             </a:r>
           </a:p>
           <a:p>
@@ -6181,7 +6484,16 @@
               <a:defRPr sz="2624"/>
             </a:pPr>
             <a:r>
-              <a:t>The user is notified of the current charges through a screen on the car</a:t>
+              <a:rPr dirty="0"/>
+              <a:t>The user is </a:t>
+            </a:r>
+            <a:r>
+              <a:rPr b="1" dirty="0"/>
+              <a:t>notified</a:t>
+            </a:r>
+            <a:r>
+              <a:rPr dirty="0"/>
+              <a:t> of the current charges through a screen on the car</a:t>
             </a:r>
           </a:p>
           <a:p>
@@ -6192,7 +6504,16 @@
               <a:defRPr sz="2624"/>
             </a:pPr>
             <a:r>
-              <a:t>The system stops charging the user as soon as the car is parked in a safe area and the user exits the car</a:t>
+              <a:rPr dirty="0"/>
+              <a:t>The system </a:t>
+            </a:r>
+            <a:r>
+              <a:rPr b="1" dirty="0"/>
+              <a:t>stops charging </a:t>
+            </a:r>
+            <a:r>
+              <a:rPr dirty="0"/>
+              <a:t>the user as soon as the car is parked in a safe area and the user exits the car</a:t>
             </a:r>
           </a:p>
           <a:p>
@@ -6203,7 +6524,24 @@
               <a:defRPr sz="2624"/>
             </a:pPr>
             <a:r>
-              <a:t>The set of safe areas for parking cars is predefined by the management system, so we can query database to decide if the car is parked in a safe area</a:t>
+              <a:rPr dirty="0"/>
+              <a:t>The set of </a:t>
+            </a:r>
+            <a:r>
+              <a:rPr b="1" dirty="0"/>
+              <a:t>safe areas </a:t>
+            </a:r>
+            <a:r>
+              <a:rPr dirty="0"/>
+              <a:t>for parking cars is </a:t>
+            </a:r>
+            <a:r>
+              <a:rPr b="1" dirty="0"/>
+              <a:t>predefined</a:t>
+            </a:r>
+            <a:r>
+              <a:rPr dirty="0"/>
+              <a:t> by the management system</a:t>
             </a:r>
           </a:p>
           <a:p>
@@ -6214,19 +6552,42 @@
               <a:defRPr sz="2624"/>
             </a:pPr>
             <a:r>
-              <a:t>The system must be able to define certain user’s behavior and apply some discount (or charging) in consequence</a:t>
-            </a:r>
-          </a:p>
-          <a:p>
-            <a:pPr marL="385318" indent="-385318" defTabSz="479044">
-              <a:spcBef>
-                <a:spcPts val="1400"/>
-              </a:spcBef>
-              <a:defRPr sz="2624"/>
-            </a:pPr>
-            <a:r>
-              <a:t>Users will be able to register himself before the first rent, or to register himself with a web application created to improve the comfort of registration </a:t>
-            </a:r>
+              <a:rPr dirty="0"/>
+              <a:t>The system </a:t>
+            </a:r>
+            <a:r>
+              <a:rPr lang="it-IT" dirty="0" err="1"/>
+              <a:t>should</a:t>
+            </a:r>
+            <a:r>
+              <a:rPr lang="it-IT" dirty="0"/>
+              <a:t> </a:t>
+            </a:r>
+            <a:r>
+              <a:rPr lang="it-IT" b="1" dirty="0" err="1"/>
+              <a:t>apply</a:t>
+            </a:r>
+            <a:r>
+              <a:rPr lang="it-IT" b="1" dirty="0"/>
+              <a:t> </a:t>
+            </a:r>
+            <a:r>
+              <a:rPr lang="it-IT" b="1" dirty="0" err="1"/>
+              <a:t>discounts</a:t>
+            </a:r>
+            <a:r>
+              <a:rPr lang="it-IT" b="1" dirty="0"/>
+              <a:t> </a:t>
+            </a:r>
+            <a:r>
+              <a:rPr lang="it-IT" dirty="0"/>
+              <a:t>on the </a:t>
+            </a:r>
+            <a:r>
+              <a:rPr lang="it-IT" dirty="0" err="1"/>
+              <a:t>trips</a:t>
+            </a:r>
+            <a:endParaRPr dirty="0"/>
           </a:p>
         </p:txBody>
       </p:sp>
@@ -6235,12 +6596,12 @@
   <p:clrMapOvr>
     <a:masterClrMapping/>
   </p:clrMapOvr>
-  <p:transition xmlns:p14="http://schemas.microsoft.com/office/powerpoint/2010/main" spd="med" advClick="1" p14:dur="1000"/>
+  <p:transition spd="slow"/>
 </p:sld>
 </file>
 
 <file path=ppt/slides/slide4.xml><?xml version="1.0" encoding="utf-8"?>
-<p:sld xmlns:a="http://schemas.openxmlformats.org/drawingml/2006/main" xmlns:r="http://schemas.openxmlformats.org/officeDocument/2006/relationships" xmlns:p="http://schemas.openxmlformats.org/presentationml/2006/main" showMasterSp="1" showMasterPhAnim="1">
+<p:sld xmlns:a="http://schemas.openxmlformats.org/drawingml/2006/main" xmlns:r="http://schemas.openxmlformats.org/officeDocument/2006/relationships" xmlns:p="http://schemas.openxmlformats.org/presentationml/2006/main">
   <p:cSld>
     <p:spTree>
       <p:nvGrpSpPr>
@@ -6259,7 +6620,9 @@
       <p:sp>
         <p:nvSpPr>
           <p:cNvPr id="143" name="Shape 143"/>
-          <p:cNvSpPr/>
+          <p:cNvSpPr>
+            <a:spLocks noGrp="1"/>
+          </p:cNvSpPr>
           <p:nvPr>
             <p:ph type="body" idx="13"/>
           </p:nvPr>
@@ -6290,13 +6653,16 @@
                 <a:sym typeface="Helvetica"/>
               </a:defRPr>
             </a:pPr>
+            <a:endParaRPr/>
           </a:p>
         </p:txBody>
       </p:sp>
       <p:sp>
         <p:nvSpPr>
           <p:cNvPr id="144" name="Shape 144"/>
-          <p:cNvSpPr/>
+          <p:cNvSpPr>
+            <a:spLocks noGrp="1"/>
+          </p:cNvSpPr>
           <p:nvPr>
             <p:ph type="title"/>
           </p:nvPr>
@@ -6307,7 +6673,9 @@
           </a:prstGeom>
         </p:spPr>
         <p:txBody>
-          <a:bodyPr/>
+          <a:bodyPr>
+            <a:normAutofit fontScale="90000"/>
+          </a:bodyPr>
           <a:lstStyle>
             <a:lvl1pPr defTabSz="543305">
               <a:spcBef>
@@ -6317,7 +6685,6 @@
             </a:lvl1pPr>
           </a:lstStyle>
           <a:p>
-            <a:pPr/>
             <a:r>
               <a:t>Actors</a:t>
             </a:r>
@@ -6327,7 +6694,9 @@
       <p:sp>
         <p:nvSpPr>
           <p:cNvPr id="145" name="Shape 145"/>
-          <p:cNvSpPr/>
+          <p:cNvSpPr>
+            <a:spLocks noGrp="1"/>
+          </p:cNvSpPr>
           <p:nvPr>
             <p:ph type="body" idx="1"/>
           </p:nvPr>
@@ -6341,17 +6710,11 @@
           <a:bodyPr/>
           <a:lstStyle/>
           <a:p>
-            <a:pPr/>
-            <a:r>
-              <a:t>Actors of our system are essentially two, even if the second one is much more important and assume different states according to how he/she is interacting with the system.</a:t>
-            </a:r>
-          </a:p>
-          <a:p>
             <a:pPr lvl="1">
               <a:buChar char="✓"/>
             </a:pPr>
             <a:r>
-              <a:rPr>
+              <a:rPr b="1" dirty="0">
                 <a:latin typeface="Iowan Old Style Bold"/>
                 <a:ea typeface="Iowan Old Style Bold"/>
                 <a:cs typeface="Iowan Old Style Bold"/>
@@ -6360,16 +6723,17 @@
               <a:t>Guest</a:t>
             </a:r>
             <a:r>
+              <a:rPr dirty="0"/>
               <a:t>: a guest is a person who is not registered in the system yet. He cannot use features of the system until he/she sign up. </a:t>
             </a:r>
-            <a:endParaRPr sz="1200"/>
+            <a:endParaRPr sz="1200" dirty="0"/>
           </a:p>
           <a:p>
             <a:pPr lvl="1">
               <a:buChar char="✓"/>
             </a:pPr>
             <a:r>
-              <a:rPr>
+              <a:rPr b="1" dirty="0">
                 <a:latin typeface="Iowan Old Style Bold"/>
                 <a:ea typeface="Iowan Old Style Bold"/>
                 <a:cs typeface="Iowan Old Style Bold"/>
@@ -6378,7 +6742,64 @@
               <a:t>User</a:t>
             </a:r>
             <a:r>
-              <a:t>: a user is a person that has already signed up into the system. When a user logs in, we mean him/her as a LOGGED USER. The logged user can take advantage of every feature of our system, and depending on what his actions are he/she can be a simple user or a driver. </a:t>
+              <a:rPr dirty="0"/>
+              <a:t>: a user is a person that has already </a:t>
+            </a:r>
+            <a:r>
+              <a:rPr b="1" dirty="0"/>
+              <a:t>signed</a:t>
+            </a:r>
+            <a:r>
+              <a:rPr dirty="0"/>
+              <a:t> </a:t>
+            </a:r>
+            <a:r>
+              <a:rPr b="1" dirty="0"/>
+              <a:t>up</a:t>
+            </a:r>
+            <a:r>
+              <a:rPr dirty="0"/>
+              <a:t> into the system. When a user logs in, we </a:t>
+            </a:r>
+            <a:r>
+              <a:rPr lang="it-IT" dirty="0" err="1"/>
+              <a:t>consider</a:t>
+            </a:r>
+            <a:r>
+              <a:rPr dirty="0"/>
+              <a:t> him/her as a LOGGED USER. The logged user can take advantage of every feature</a:t>
+            </a:r>
+            <a:r>
+              <a:rPr lang="it-IT" dirty="0"/>
+              <a:t>s</a:t>
+            </a:r>
+            <a:r>
+              <a:rPr dirty="0"/>
+              <a:t> of our system, and depending on what his actions are he/she can be a </a:t>
+            </a:r>
+            <a:r>
+              <a:rPr b="1" dirty="0"/>
+              <a:t>simple</a:t>
+            </a:r>
+            <a:r>
+              <a:rPr dirty="0"/>
+              <a:t> </a:t>
+            </a:r>
+            <a:r>
+              <a:rPr b="1" dirty="0"/>
+              <a:t>user</a:t>
+            </a:r>
+            <a:r>
+              <a:rPr dirty="0"/>
+              <a:t> or a </a:t>
+            </a:r>
+            <a:r>
+              <a:rPr b="1" dirty="0"/>
+              <a:t>driver</a:t>
+            </a:r>
+            <a:r>
+              <a:rPr dirty="0"/>
+              <a:t>. </a:t>
             </a:r>
           </a:p>
         </p:txBody>
@@ -6388,12 +6809,12 @@
   <p:clrMapOvr>
     <a:masterClrMapping/>
   </p:clrMapOvr>
-  <p:transition xmlns:p14="http://schemas.microsoft.com/office/powerpoint/2010/main" spd="med" advClick="1" p14:dur="1000"/>
+  <p:transition spd="slow"/>
 </p:sld>
 </file>
 
 <file path=ppt/slides/slide5.xml><?xml version="1.0" encoding="utf-8"?>
-<p:sld xmlns:a="http://schemas.openxmlformats.org/drawingml/2006/main" xmlns:r="http://schemas.openxmlformats.org/officeDocument/2006/relationships" xmlns:p="http://schemas.openxmlformats.org/presentationml/2006/main" showMasterSp="1" showMasterPhAnim="1">
+<p:sld xmlns:a="http://schemas.openxmlformats.org/drawingml/2006/main" xmlns:r="http://schemas.openxmlformats.org/officeDocument/2006/relationships" xmlns:p="http://schemas.openxmlformats.org/presentationml/2006/main">
   <p:cSld>
     <p:spTree>
       <p:nvGrpSpPr>
@@ -6412,7 +6833,9 @@
       <p:sp>
         <p:nvSpPr>
           <p:cNvPr id="147" name="Shape 147"/>
-          <p:cNvSpPr/>
+          <p:cNvSpPr>
+            <a:spLocks noGrp="1"/>
+          </p:cNvSpPr>
           <p:nvPr>
             <p:ph type="body" idx="13"/>
           </p:nvPr>
@@ -6443,13 +6866,16 @@
                 <a:sym typeface="Helvetica"/>
               </a:defRPr>
             </a:pPr>
+            <a:endParaRPr/>
           </a:p>
         </p:txBody>
       </p:sp>
       <p:sp>
         <p:nvSpPr>
           <p:cNvPr id="148" name="Shape 148"/>
-          <p:cNvSpPr/>
+          <p:cNvSpPr>
+            <a:spLocks noGrp="1"/>
+          </p:cNvSpPr>
           <p:nvPr>
             <p:ph type="title"/>
           </p:nvPr>
@@ -6460,7 +6886,9 @@
           </a:prstGeom>
         </p:spPr>
         <p:txBody>
-          <a:bodyPr/>
+          <a:bodyPr>
+            <a:normAutofit fontScale="90000"/>
+          </a:bodyPr>
           <a:lstStyle>
             <a:lvl1pPr defTabSz="543305">
               <a:spcBef>
@@ -6470,7 +6898,6 @@
             </a:lvl1pPr>
           </a:lstStyle>
           <a:p>
-            <a:pPr/>
             <a:r>
               <a:t>assumption and dependencies 1</a:t>
             </a:r>
@@ -6480,7 +6907,9 @@
       <p:sp>
         <p:nvSpPr>
           <p:cNvPr id="149" name="Shape 149"/>
-          <p:cNvSpPr/>
+          <p:cNvSpPr>
+            <a:spLocks noGrp="1"/>
+          </p:cNvSpPr>
           <p:nvPr>
             <p:ph type="body" idx="1"/>
           </p:nvPr>
@@ -6501,7 +6930,100 @@
               <a:defRPr sz="2560"/>
             </a:pPr>
             <a:r>
-              <a:t>We deliver the payment management at the end of the trip to an external system that is able to handle this situation, so it can manage also some exceptions that can occur during the payment. For instances the user could not have enough money to conclude the transaction</a:t>
+              <a:rPr lang="it-IT" dirty="0" err="1"/>
+              <a:t>We</a:t>
+            </a:r>
+            <a:r>
+              <a:rPr lang="it-IT" dirty="0"/>
+              <a:t> </a:t>
+            </a:r>
+            <a:r>
+              <a:rPr lang="it-IT" dirty="0" err="1"/>
+              <a:t>deliver</a:t>
+            </a:r>
+            <a:r>
+              <a:rPr lang="it-IT" dirty="0"/>
+              <a:t> </a:t>
+            </a:r>
+            <a:r>
+              <a:rPr lang="it-IT" b="1" dirty="0"/>
+              <a:t>p</a:t>
+            </a:r>
+            <a:r>
+              <a:rPr b="1" dirty="0" err="1"/>
+              <a:t>ayment</a:t>
+            </a:r>
+            <a:r>
+              <a:rPr b="1" dirty="0"/>
+              <a:t> management to an external system</a:t>
+            </a:r>
+            <a:r>
+              <a:rPr lang="it-IT" dirty="0"/>
+              <a:t>, </a:t>
+            </a:r>
+            <a:r>
+              <a:rPr lang="it-IT" dirty="0" err="1"/>
+              <a:t>that</a:t>
+            </a:r>
+            <a:r>
+              <a:rPr lang="it-IT" dirty="0"/>
+              <a:t> </a:t>
+            </a:r>
+            <a:r>
+              <a:rPr lang="it-IT" dirty="0" err="1"/>
+              <a:t>manages</a:t>
+            </a:r>
+            <a:r>
+              <a:rPr lang="it-IT" dirty="0"/>
+              <a:t> </a:t>
+            </a:r>
+            <a:r>
+              <a:rPr lang="it-IT" dirty="0" err="1"/>
+              <a:t>exceptions</a:t>
+            </a:r>
+            <a:r>
+              <a:rPr lang="it-IT" dirty="0"/>
+              <a:t> </a:t>
+            </a:r>
+            <a:r>
+              <a:rPr lang="it-IT" dirty="0" err="1"/>
+              <a:t>such</a:t>
+            </a:r>
+            <a:r>
+              <a:rPr lang="it-IT" dirty="0"/>
+              <a:t> </a:t>
+            </a:r>
+            <a:r>
+              <a:rPr lang="it-IT" dirty="0" err="1"/>
+              <a:t>as</a:t>
+            </a:r>
+            <a:r>
+              <a:rPr lang="it-IT" dirty="0"/>
+              <a:t> user </a:t>
+            </a:r>
+            <a:r>
+              <a:rPr lang="it-IT" dirty="0" err="1"/>
+              <a:t>without</a:t>
+            </a:r>
+            <a:r>
+              <a:rPr lang="it-IT" dirty="0"/>
+              <a:t> </a:t>
+            </a:r>
+            <a:r>
+              <a:rPr lang="it-IT" dirty="0" err="1"/>
+              <a:t>enough</a:t>
+            </a:r>
+            <a:r>
+              <a:rPr lang="it-IT" dirty="0"/>
+              <a:t> money for the </a:t>
+            </a:r>
+            <a:r>
+              <a:rPr lang="it-IT" dirty="0" err="1"/>
+              <a:t>payment</a:t>
+            </a:r>
+            <a:r>
+              <a:rPr lang="it-IT" dirty="0"/>
+              <a:t>.</a:t>
             </a:r>
           </a:p>
           <a:p>
@@ -6512,7 +7034,28 @@
               <a:defRPr sz="2560"/>
             </a:pPr>
             <a:r>
-              <a:t>We assume that the fee is payed as soon as the reservation expires</a:t>
+              <a:rPr dirty="0"/>
+              <a:t>We assume that the </a:t>
+            </a:r>
+            <a:r>
+              <a:rPr b="1" dirty="0"/>
+              <a:t>fee is </a:t>
+            </a:r>
+            <a:r>
+              <a:rPr lang="it-IT" b="1" dirty="0" err="1"/>
+              <a:t>immediately</a:t>
+            </a:r>
+            <a:r>
+              <a:rPr lang="it-IT" b="1" dirty="0"/>
+              <a:t> </a:t>
+            </a:r>
+            <a:r>
+              <a:rPr b="1" dirty="0"/>
+              <a:t>payed </a:t>
+            </a:r>
+            <a:r>
+              <a:rPr dirty="0"/>
+              <a:t>as soon as the reservation expires</a:t>
             </a:r>
           </a:p>
           <a:p>
@@ -6523,7 +7066,52 @@
               <a:defRPr sz="2560"/>
             </a:pPr>
             <a:r>
-              <a:t>The payment of the trip is made as soon as the user leaves the car if he doesn’t select the possibility to plug the car (or if he is not able to do that), while if he chooses this option the payment is postponed of 2 minutes because the system allows him to plug the car. Then if the system, after two minutes, detects that the car is plugged it will apply the discount, otherwise not</a:t>
+              <a:rPr dirty="0"/>
+              <a:t>The </a:t>
+            </a:r>
+            <a:r>
+              <a:rPr b="1" dirty="0"/>
+              <a:t>payment of the trip </a:t>
+            </a:r>
+            <a:r>
+              <a:rPr dirty="0"/>
+              <a:t>is made as soon as the user leaves the car</a:t>
+            </a:r>
+            <a:r>
+              <a:rPr lang="it-IT" dirty="0"/>
+              <a:t>. </a:t>
+            </a:r>
+            <a:r>
+              <a:rPr lang="it-IT" dirty="0" err="1"/>
+              <a:t>It’s</a:t>
+            </a:r>
+            <a:r>
+              <a:rPr lang="it-IT" dirty="0"/>
+              <a:t> </a:t>
+            </a:r>
+            <a:r>
+              <a:rPr lang="it-IT" dirty="0" err="1"/>
+              <a:t>postponed</a:t>
+            </a:r>
+            <a:r>
+              <a:rPr lang="it-IT" dirty="0"/>
+              <a:t> </a:t>
+            </a:r>
+            <a:r>
+              <a:rPr lang="it-IT" dirty="0" err="1"/>
+              <a:t>whether</a:t>
+            </a:r>
+            <a:r>
+              <a:rPr lang="it-IT" dirty="0"/>
+              <a:t> user </a:t>
+            </a:r>
+            <a:r>
+              <a:rPr dirty="0"/>
+              <a:t>select the possibility to plug the car</a:t>
+            </a:r>
+            <a:r>
+              <a:rPr lang="it-IT" dirty="0"/>
+              <a:t>.</a:t>
             </a:r>
           </a:p>
           <a:p>
@@ -6534,7 +7122,24 @@
               <a:defRPr sz="2560"/>
             </a:pPr>
             <a:r>
-              <a:t>Since “the user leaves the car” and “the user is near the car” are ambiguous, we assume that a user is near the car or is leaving it if the distance (calculated from the two GPS) between them is smaller/bigger than a certain amount. </a:t>
+              <a:rPr dirty="0"/>
+              <a:t>Since “the user leaves the car” and “the user is near the car” are ambiguous, we assume that a user is near the car or is leaving it if the </a:t>
+            </a:r>
+            <a:r>
+              <a:rPr b="1" dirty="0"/>
+              <a:t>distance</a:t>
+            </a:r>
+            <a:r>
+              <a:rPr dirty="0"/>
+              <a:t> (calculated from the two </a:t>
+            </a:r>
+            <a:r>
+              <a:rPr b="1" dirty="0"/>
+              <a:t>GPS</a:t>
+            </a:r>
+            <a:r>
+              <a:rPr dirty="0"/>
+              <a:t>) between them is smaller/bigger than a certain amount. </a:t>
             </a:r>
           </a:p>
         </p:txBody>
@@ -6544,12 +7149,12 @@
   <p:clrMapOvr>
     <a:masterClrMapping/>
   </p:clrMapOvr>
-  <p:transition xmlns:p14="http://schemas.microsoft.com/office/powerpoint/2010/main" spd="med" advClick="1" p14:dur="1000"/>
+  <p:transition spd="slow"/>
 </p:sld>
 </file>
 
 <file path=ppt/slides/slide6.xml><?xml version="1.0" encoding="utf-8"?>
-<p:sld xmlns:a="http://schemas.openxmlformats.org/drawingml/2006/main" xmlns:r="http://schemas.openxmlformats.org/officeDocument/2006/relationships" xmlns:p="http://schemas.openxmlformats.org/presentationml/2006/main" showMasterSp="1" showMasterPhAnim="1">
+<p:sld xmlns:a="http://schemas.openxmlformats.org/drawingml/2006/main" xmlns:r="http://schemas.openxmlformats.org/officeDocument/2006/relationships" xmlns:p="http://schemas.openxmlformats.org/presentationml/2006/main">
   <p:cSld>
     <p:spTree>
       <p:nvGrpSpPr>
@@ -6568,7 +7173,9 @@
       <p:sp>
         <p:nvSpPr>
           <p:cNvPr id="151" name="Shape 151"/>
-          <p:cNvSpPr/>
+          <p:cNvSpPr>
+            <a:spLocks noGrp="1"/>
+          </p:cNvSpPr>
           <p:nvPr>
             <p:ph type="body" idx="13"/>
           </p:nvPr>
@@ -6599,13 +7206,16 @@
                 <a:sym typeface="Helvetica"/>
               </a:defRPr>
             </a:pPr>
+            <a:endParaRPr/>
           </a:p>
         </p:txBody>
       </p:sp>
       <p:sp>
         <p:nvSpPr>
           <p:cNvPr id="152" name="Shape 152"/>
-          <p:cNvSpPr/>
+          <p:cNvSpPr>
+            <a:spLocks noGrp="1"/>
+          </p:cNvSpPr>
           <p:nvPr>
             <p:ph type="title"/>
           </p:nvPr>
@@ -6616,7 +7226,9 @@
           </a:prstGeom>
         </p:spPr>
         <p:txBody>
-          <a:bodyPr/>
+          <a:bodyPr>
+            <a:normAutofit fontScale="90000"/>
+          </a:bodyPr>
           <a:lstStyle>
             <a:lvl1pPr defTabSz="543305">
               <a:spcBef>
@@ -6626,7 +7238,6 @@
             </a:lvl1pPr>
           </a:lstStyle>
           <a:p>
-            <a:pPr/>
             <a:r>
               <a:t>assumption and dependencies 2</a:t>
             </a:r>
@@ -6636,7 +7247,9 @@
       <p:sp>
         <p:nvSpPr>
           <p:cNvPr id="153" name="Shape 153"/>
-          <p:cNvSpPr/>
+          <p:cNvSpPr>
+            <a:spLocks noGrp="1"/>
+          </p:cNvSpPr>
           <p:nvPr>
             <p:ph type="body" idx="1"/>
           </p:nvPr>
@@ -6657,9 +7270,57 @@
               <a:defRPr sz="2592"/>
             </a:pPr>
             <a:r>
-              <a:t>We assume that the charging stations are always available and perfectly working. If not, we assume that they are immediately repaired by the employees of the system. </a:t>
-            </a:r>
-            <a:endParaRPr sz="972"/>
+              <a:rPr dirty="0"/>
+              <a:t>We assume that the </a:t>
+            </a:r>
+            <a:r>
+              <a:rPr b="1" dirty="0"/>
+              <a:t>charging</a:t>
+            </a:r>
+            <a:r>
+              <a:rPr dirty="0"/>
+              <a:t> </a:t>
+            </a:r>
+            <a:r>
+              <a:rPr b="1" dirty="0"/>
+              <a:t>stations</a:t>
+            </a:r>
+            <a:r>
+              <a:rPr dirty="0"/>
+              <a:t> are always perfectly </a:t>
+            </a:r>
+            <a:r>
+              <a:rPr b="1" dirty="0"/>
+              <a:t>working</a:t>
+            </a:r>
+            <a:r>
+              <a:rPr lang="it-IT" dirty="0"/>
+              <a:t> or </a:t>
+            </a:r>
+            <a:r>
+              <a:rPr lang="it-IT" dirty="0" err="1"/>
+              <a:t>eventually</a:t>
+            </a:r>
+            <a:r>
+              <a:rPr lang="it-IT" dirty="0"/>
+              <a:t> </a:t>
+            </a:r>
+            <a:r>
+              <a:rPr lang="it-IT" dirty="0" err="1"/>
+              <a:t>immediately</a:t>
+            </a:r>
+            <a:r>
+              <a:rPr lang="it-IT" dirty="0"/>
+              <a:t> </a:t>
+            </a:r>
+            <a:r>
+              <a:rPr lang="it-IT" dirty="0" err="1"/>
+              <a:t>repaired</a:t>
+            </a:r>
+            <a:r>
+              <a:rPr lang="it-IT" dirty="0"/>
+              <a:t>.</a:t>
+            </a:r>
           </a:p>
           <a:p>
             <a:pPr marL="380618" indent="-380618" defTabSz="473201">
@@ -6669,9 +7330,62 @@
               <a:defRPr sz="2592"/>
             </a:pPr>
             <a:r>
-              <a:t>Since we exactly know, thanks to Placemeter, how many people are actually in the car we can apply the 10% discount only to part of trip where the passengers were at least 2. For instances if during the first half of the trip there were 3 passengers on the car and then they were dropped off, so the user finishes the trip on his own, then the discount is applied only to the first half of the trip. </a:t>
-            </a:r>
-            <a:endParaRPr sz="972"/>
+              <a:rPr dirty="0"/>
+              <a:t>Since we exactly know, thanks to </a:t>
+            </a:r>
+            <a:r>
+              <a:rPr dirty="0" err="1"/>
+              <a:t>Placemeter</a:t>
+            </a:r>
+            <a:r>
+              <a:rPr dirty="0"/>
+              <a:t>, how many people are actually in the car we </a:t>
+            </a:r>
+            <a:r>
+              <a:rPr lang="it-IT" dirty="0"/>
+              <a:t>assume </a:t>
+            </a:r>
+            <a:r>
+              <a:rPr lang="it-IT" b="1" dirty="0"/>
+              <a:t>discount</a:t>
+            </a:r>
+            <a:r>
+              <a:rPr lang="it-IT" dirty="0"/>
+              <a:t> of 10%  </a:t>
+            </a:r>
+            <a:r>
+              <a:rPr lang="it-IT" dirty="0" err="1"/>
+              <a:t>will</a:t>
+            </a:r>
+            <a:r>
+              <a:rPr lang="it-IT" dirty="0"/>
+              <a:t> be </a:t>
+            </a:r>
+            <a:r>
+              <a:rPr lang="it-IT" b="1" dirty="0" err="1"/>
+              <a:t>applied</a:t>
+            </a:r>
+            <a:r>
+              <a:rPr lang="it-IT" b="1" dirty="0"/>
+              <a:t> </a:t>
+            </a:r>
+            <a:r>
+              <a:rPr b="1" dirty="0"/>
+              <a:t>only to part of</a:t>
+            </a:r>
+            <a:r>
+              <a:rPr lang="it-IT" b="1" dirty="0"/>
+              <a:t> the</a:t>
+            </a:r>
+            <a:r>
+              <a:rPr b="1" dirty="0"/>
+              <a:t> trip </a:t>
+            </a:r>
+            <a:r>
+              <a:rPr dirty="0"/>
+              <a:t>where the passengers were at least 2. </a:t>
+            </a:r>
+            <a:endParaRPr lang="it-IT" dirty="0"/>
           </a:p>
           <a:p>
             <a:pPr marL="380618" indent="-380618" defTabSz="473201">
@@ -6681,8 +7395,90 @@
               <a:defRPr sz="2592"/>
             </a:pPr>
             <a:r>
-              <a:t>We assume that if one car’s charge is less than 5%, then it encourages the user to stop the trip as soon as possible. As the car is left it won’t be able for others trip until one of the employee of the system take care of bringing it to the nearest charging station and plugging it. So, when the car’s charge will be again upper than a certain percentage it will be available again for the users. </a:t>
-            </a:r>
+              <a:rPr dirty="0"/>
+              <a:t>We assume that if one car’s charge is </a:t>
+            </a:r>
+            <a:r>
+              <a:rPr b="1" dirty="0"/>
+              <a:t>less</a:t>
+            </a:r>
+            <a:r>
+              <a:rPr dirty="0"/>
+              <a:t> than 5%, then it encourages the user to stop the trip as soon as possible. </a:t>
+            </a:r>
+            <a:r>
+              <a:rPr lang="it-IT" dirty="0"/>
+              <a:t>T</a:t>
+            </a:r>
+            <a:r>
+              <a:rPr dirty="0"/>
+              <a:t>he car</a:t>
+            </a:r>
+            <a:r>
+              <a:rPr lang="it-IT" dirty="0"/>
+              <a:t> </a:t>
+            </a:r>
+            <a:r>
+              <a:rPr lang="it-IT" dirty="0" err="1"/>
+              <a:t>is</a:t>
+            </a:r>
+            <a:r>
+              <a:rPr lang="it-IT" dirty="0"/>
+              <a:t> </a:t>
+            </a:r>
+            <a:r>
+              <a:rPr lang="it-IT" b="1" dirty="0" err="1"/>
+              <a:t>charged</a:t>
+            </a:r>
+            <a:r>
+              <a:rPr lang="it-IT" b="1" dirty="0"/>
+              <a:t> by an </a:t>
+            </a:r>
+            <a:r>
+              <a:rPr lang="it-IT" b="1" dirty="0" err="1"/>
+              <a:t>employee</a:t>
+            </a:r>
+            <a:r>
+              <a:rPr lang="it-IT" b="1" dirty="0"/>
+              <a:t> </a:t>
+            </a:r>
+            <a:r>
+              <a:rPr lang="it-IT" dirty="0"/>
+              <a:t>of the system and </a:t>
+            </a:r>
+            <a:r>
+              <a:rPr lang="it-IT" dirty="0" err="1"/>
+              <a:t>then</a:t>
+            </a:r>
+            <a:r>
+              <a:rPr lang="it-IT" dirty="0"/>
+              <a:t> </a:t>
+            </a:r>
+            <a:r>
+              <a:rPr lang="it-IT" dirty="0" err="1"/>
+              <a:t>it’s</a:t>
+            </a:r>
+            <a:r>
+              <a:rPr lang="it-IT" dirty="0"/>
+              <a:t> </a:t>
+            </a:r>
+            <a:r>
+              <a:rPr lang="it-IT" dirty="0" err="1"/>
+              <a:t>available</a:t>
+            </a:r>
+            <a:r>
+              <a:rPr lang="it-IT" dirty="0"/>
+              <a:t> </a:t>
+            </a:r>
+            <a:r>
+              <a:rPr lang="it-IT" dirty="0" err="1"/>
+              <a:t>again</a:t>
+            </a:r>
+            <a:r>
+              <a:rPr lang="it-IT" dirty="0"/>
+              <a:t> for the users.</a:t>
+            </a:r>
+            <a:endParaRPr dirty="0"/>
           </a:p>
         </p:txBody>
       </p:sp>
@@ -6691,12 +7487,12 @@
   <p:clrMapOvr>
     <a:masterClrMapping/>
   </p:clrMapOvr>
-  <p:transition xmlns:p14="http://schemas.microsoft.com/office/powerpoint/2010/main" spd="med" advClick="1" p14:dur="1000"/>
+  <p:transition spd="slow"/>
 </p:sld>
 </file>
 
 <file path=ppt/slides/slide7.xml><?xml version="1.0" encoding="utf-8"?>
-<p:sld xmlns:a="http://schemas.openxmlformats.org/drawingml/2006/main" xmlns:r="http://schemas.openxmlformats.org/officeDocument/2006/relationships" xmlns:p="http://schemas.openxmlformats.org/presentationml/2006/main" showMasterSp="1" showMasterPhAnim="1">
+<p:sld xmlns:a="http://schemas.openxmlformats.org/drawingml/2006/main" xmlns:r="http://schemas.openxmlformats.org/officeDocument/2006/relationships" xmlns:p="http://schemas.openxmlformats.org/presentationml/2006/main">
   <p:cSld>
     <p:spTree>
       <p:nvGrpSpPr>
@@ -6715,7 +7511,9 @@
       <p:sp>
         <p:nvSpPr>
           <p:cNvPr id="155" name="Shape 155"/>
-          <p:cNvSpPr/>
+          <p:cNvSpPr>
+            <a:spLocks noGrp="1"/>
+          </p:cNvSpPr>
           <p:nvPr>
             <p:ph type="body" idx="13"/>
           </p:nvPr>
@@ -6746,13 +7544,16 @@
                 <a:sym typeface="Helvetica"/>
               </a:defRPr>
             </a:pPr>
+            <a:endParaRPr/>
           </a:p>
         </p:txBody>
       </p:sp>
       <p:sp>
         <p:nvSpPr>
           <p:cNvPr id="156" name="Shape 156"/>
-          <p:cNvSpPr/>
+          <p:cNvSpPr>
+            <a:spLocks noGrp="1"/>
+          </p:cNvSpPr>
           <p:nvPr>
             <p:ph type="title"/>
           </p:nvPr>
@@ -6763,7 +7564,9 @@
           </a:prstGeom>
         </p:spPr>
         <p:txBody>
-          <a:bodyPr/>
+          <a:bodyPr>
+            <a:normAutofit fontScale="90000"/>
+          </a:bodyPr>
           <a:lstStyle>
             <a:lvl1pPr defTabSz="543305">
               <a:spcBef>
@@ -6773,7 +7576,6 @@
             </a:lvl1pPr>
           </a:lstStyle>
           <a:p>
-            <a:pPr/>
             <a:r>
               <a:t>Mockups</a:t>
             </a:r>
@@ -6783,7 +7585,9 @@
       <p:sp>
         <p:nvSpPr>
           <p:cNvPr id="157" name="Shape 157"/>
-          <p:cNvSpPr/>
+          <p:cNvSpPr>
+            <a:spLocks noGrp="1"/>
+          </p:cNvSpPr>
           <p:nvPr>
             <p:ph type="body" idx="1"/>
           </p:nvPr>
@@ -6797,7 +7601,6 @@
           <a:bodyPr/>
           <a:lstStyle/>
           <a:p>
-            <a:pPr/>
             <a:r>
               <a:t>Registration and login</a:t>
             </a:r>
@@ -6867,12 +7670,12 @@
   <p:clrMapOvr>
     <a:masterClrMapping/>
   </p:clrMapOvr>
-  <p:transition xmlns:p14="http://schemas.microsoft.com/office/powerpoint/2010/main" spd="med" advClick="1" p14:dur="1000"/>
+  <p:transition spd="slow"/>
 </p:sld>
 </file>
 
 <file path=ppt/slides/slide8.xml><?xml version="1.0" encoding="utf-8"?>
-<p:sld xmlns:a="http://schemas.openxmlformats.org/drawingml/2006/main" xmlns:r="http://schemas.openxmlformats.org/officeDocument/2006/relationships" xmlns:p="http://schemas.openxmlformats.org/presentationml/2006/main" showMasterSp="1" showMasterPhAnim="1">
+<p:sld xmlns:a="http://schemas.openxmlformats.org/drawingml/2006/main" xmlns:r="http://schemas.openxmlformats.org/officeDocument/2006/relationships" xmlns:p="http://schemas.openxmlformats.org/presentationml/2006/main">
   <p:cSld>
     <p:spTree>
       <p:nvGrpSpPr>
@@ -6891,7 +7694,9 @@
       <p:sp>
         <p:nvSpPr>
           <p:cNvPr id="161" name="Shape 161"/>
-          <p:cNvSpPr/>
+          <p:cNvSpPr>
+            <a:spLocks noGrp="1"/>
+          </p:cNvSpPr>
           <p:nvPr>
             <p:ph type="body" idx="13"/>
           </p:nvPr>
@@ -6922,13 +7727,16 @@
                 <a:sym typeface="Helvetica"/>
               </a:defRPr>
             </a:pPr>
+            <a:endParaRPr/>
           </a:p>
         </p:txBody>
       </p:sp>
       <p:sp>
         <p:nvSpPr>
           <p:cNvPr id="162" name="Shape 162"/>
-          <p:cNvSpPr/>
+          <p:cNvSpPr>
+            <a:spLocks noGrp="1"/>
+          </p:cNvSpPr>
           <p:nvPr>
             <p:ph type="title"/>
           </p:nvPr>
@@ -6939,7 +7747,9 @@
           </a:prstGeom>
         </p:spPr>
         <p:txBody>
-          <a:bodyPr/>
+          <a:bodyPr>
+            <a:normAutofit fontScale="90000"/>
+          </a:bodyPr>
           <a:lstStyle>
             <a:lvl1pPr defTabSz="543305">
               <a:spcBef>
@@ -6949,7 +7759,6 @@
             </a:lvl1pPr>
           </a:lstStyle>
           <a:p>
-            <a:pPr/>
             <a:r>
               <a:t>Mockups</a:t>
             </a:r>
@@ -6959,7 +7768,9 @@
       <p:sp>
         <p:nvSpPr>
           <p:cNvPr id="163" name="Shape 163"/>
-          <p:cNvSpPr/>
+          <p:cNvSpPr>
+            <a:spLocks noGrp="1"/>
+          </p:cNvSpPr>
           <p:nvPr>
             <p:ph type="body" idx="1"/>
           </p:nvPr>
@@ -6973,7 +7784,6 @@
           <a:bodyPr/>
           <a:lstStyle/>
           <a:p>
-            <a:pPr/>
             <a:r>
               <a:t>Research a car</a:t>
             </a:r>
@@ -7014,12 +7824,12 @@
   <p:clrMapOvr>
     <a:masterClrMapping/>
   </p:clrMapOvr>
-  <p:transition xmlns:p14="http://schemas.microsoft.com/office/powerpoint/2010/main" spd="med" advClick="1" p14:dur="1000"/>
+  <p:transition spd="slow"/>
 </p:sld>
 </file>
 
 <file path=ppt/slides/slide9.xml><?xml version="1.0" encoding="utf-8"?>
-<p:sld xmlns:a="http://schemas.openxmlformats.org/drawingml/2006/main" xmlns:r="http://schemas.openxmlformats.org/officeDocument/2006/relationships" xmlns:p="http://schemas.openxmlformats.org/presentationml/2006/main" showMasterSp="1" showMasterPhAnim="1">
+<p:sld xmlns:a="http://schemas.openxmlformats.org/drawingml/2006/main" xmlns:r="http://schemas.openxmlformats.org/officeDocument/2006/relationships" xmlns:p="http://schemas.openxmlformats.org/presentationml/2006/main">
   <p:cSld>
     <p:spTree>
       <p:nvGrpSpPr>
@@ -7038,7 +7848,9 @@
       <p:sp>
         <p:nvSpPr>
           <p:cNvPr id="166" name="Shape 166"/>
-          <p:cNvSpPr/>
+          <p:cNvSpPr>
+            <a:spLocks noGrp="1"/>
+          </p:cNvSpPr>
           <p:nvPr>
             <p:ph type="body" idx="13"/>
           </p:nvPr>
@@ -7069,13 +7881,16 @@
                 <a:sym typeface="Helvetica"/>
               </a:defRPr>
             </a:pPr>
+            <a:endParaRPr/>
           </a:p>
         </p:txBody>
       </p:sp>
       <p:sp>
         <p:nvSpPr>
           <p:cNvPr id="167" name="Shape 167"/>
-          <p:cNvSpPr/>
+          <p:cNvSpPr>
+            <a:spLocks noGrp="1"/>
+          </p:cNvSpPr>
           <p:nvPr>
             <p:ph type="title"/>
           </p:nvPr>
@@ -7086,7 +7901,9 @@
           </a:prstGeom>
         </p:spPr>
         <p:txBody>
-          <a:bodyPr/>
+          <a:bodyPr>
+            <a:normAutofit fontScale="90000"/>
+          </a:bodyPr>
           <a:lstStyle>
             <a:lvl1pPr defTabSz="543305">
               <a:spcBef>
@@ -7096,7 +7913,6 @@
             </a:lvl1pPr>
           </a:lstStyle>
           <a:p>
-            <a:pPr/>
             <a:r>
               <a:t>Mockups</a:t>
             </a:r>
@@ -7106,7 +7922,9 @@
       <p:sp>
         <p:nvSpPr>
           <p:cNvPr id="168" name="Shape 168"/>
-          <p:cNvSpPr/>
+          <p:cNvSpPr>
+            <a:spLocks noGrp="1"/>
+          </p:cNvSpPr>
           <p:nvPr>
             <p:ph type="body" idx="1"/>
           </p:nvPr>
@@ -7120,7 +7938,6 @@
           <a:bodyPr/>
           <a:lstStyle/>
           <a:p>
-            <a:pPr/>
             <a:r>
               <a:t>Select a car, view status and reserve it</a:t>
             </a:r>
@@ -7161,12 +7978,12 @@
   <p:clrMapOvr>
     <a:masterClrMapping/>
   </p:clrMapOvr>
-  <p:transition xmlns:p14="http://schemas.microsoft.com/office/powerpoint/2010/main" spd="med" advClick="1" p14:dur="1000"/>
+  <p:transition spd="slow"/>
 </p:sld>
 </file>
 
 <file path=ppt/theme/theme1.xml><?xml version="1.0" encoding="utf-8"?>
-<a:theme xmlns:a="http://schemas.openxmlformats.org/drawingml/2006/main" xmlns:r="http://schemas.openxmlformats.org/officeDocument/2006/relationships" name="New_Template9">
+<a:theme xmlns:a="http://schemas.openxmlformats.org/drawingml/2006/main" name="New_Template9">
   <a:themeElements>
     <a:clrScheme name="New_Template9">
       <a:dk1>
@@ -7369,7 +8186,7 @@
         <a:effectLst/>
         <a:sp3d/>
       </a:spPr>
-      <a:bodyPr rot="0" spcFirstLastPara="1" vertOverflow="overflow" horzOverflow="overflow" vert="horz" wrap="square" lIns="50800" tIns="50800" rIns="50800" bIns="50800" numCol="1" spcCol="38100" rtlCol="0" anchor="ctr" upright="0">
+      <a:bodyPr rot="0" spcFirstLastPara="1" vertOverflow="overflow" horzOverflow="overflow" vert="horz" wrap="square" lIns="50800" tIns="50800" rIns="50800" bIns="50800" numCol="1" spcCol="38100" rtlCol="0" anchor="ctr">
         <a:spAutoFit/>
       </a:bodyPr>
       <a:lstStyle>
@@ -7388,7 +8205,7 @@
           <a:buFontTx/>
           <a:buNone/>
           <a:tabLst/>
-          <a:defRPr b="0" baseline="0" cap="none" i="0" spc="0" strike="noStrike" sz="2400" u="none" kumimoji="0" normalizeH="0">
+          <a:defRPr kumimoji="0" sz="2400" b="0" i="0" u="none" strike="noStrike" cap="none" spc="0" normalizeH="0" baseline="0">
             <a:ln>
               <a:noFill/>
             </a:ln>
@@ -7418,7 +8235,7 @@
           <a:buFontTx/>
           <a:buNone/>
           <a:tabLst/>
-          <a:defRPr b="0" baseline="0" cap="none" i="0" spc="0" strike="noStrike" sz="1800" u="none" kumimoji="0" normalizeH="0">
+          <a:defRPr kumimoji="0" sz="1800" b="0" i="0" u="none" strike="noStrike" cap="none" spc="0" normalizeH="0" baseline="0">
             <a:ln>
               <a:noFill/>
             </a:ln>
@@ -7444,7 +8261,7 @@
           <a:buFontTx/>
           <a:buNone/>
           <a:tabLst/>
-          <a:defRPr b="0" baseline="0" cap="none" i="0" spc="0" strike="noStrike" sz="1800" u="none" kumimoji="0" normalizeH="0">
+          <a:defRPr kumimoji="0" sz="1800" b="0" i="0" u="none" strike="noStrike" cap="none" spc="0" normalizeH="0" baseline="0">
             <a:ln>
               <a:noFill/>
             </a:ln>
@@ -7470,7 +8287,7 @@
           <a:buFontTx/>
           <a:buNone/>
           <a:tabLst/>
-          <a:defRPr b="0" baseline="0" cap="none" i="0" spc="0" strike="noStrike" sz="1800" u="none" kumimoji="0" normalizeH="0">
+          <a:defRPr kumimoji="0" sz="1800" b="0" i="0" u="none" strike="noStrike" cap="none" spc="0" normalizeH="0" baseline="0">
             <a:ln>
               <a:noFill/>
             </a:ln>
@@ -7496,7 +8313,7 @@
           <a:buFontTx/>
           <a:buNone/>
           <a:tabLst/>
-          <a:defRPr b="0" baseline="0" cap="none" i="0" spc="0" strike="noStrike" sz="1800" u="none" kumimoji="0" normalizeH="0">
+          <a:defRPr kumimoji="0" sz="1800" b="0" i="0" u="none" strike="noStrike" cap="none" spc="0" normalizeH="0" baseline="0">
             <a:ln>
               <a:noFill/>
             </a:ln>
@@ -7522,7 +8339,7 @@
           <a:buFontTx/>
           <a:buNone/>
           <a:tabLst/>
-          <a:defRPr b="0" baseline="0" cap="none" i="0" spc="0" strike="noStrike" sz="1800" u="none" kumimoji="0" normalizeH="0">
+          <a:defRPr kumimoji="0" sz="1800" b="0" i="0" u="none" strike="noStrike" cap="none" spc="0" normalizeH="0" baseline="0">
             <a:ln>
               <a:noFill/>
             </a:ln>
@@ -7548,7 +8365,7 @@
           <a:buFontTx/>
           <a:buNone/>
           <a:tabLst/>
-          <a:defRPr b="0" baseline="0" cap="none" i="0" spc="0" strike="noStrike" sz="1800" u="none" kumimoji="0" normalizeH="0">
+          <a:defRPr kumimoji="0" sz="1800" b="0" i="0" u="none" strike="noStrike" cap="none" spc="0" normalizeH="0" baseline="0">
             <a:ln>
               <a:noFill/>
             </a:ln>
@@ -7574,7 +8391,7 @@
           <a:buFontTx/>
           <a:buNone/>
           <a:tabLst/>
-          <a:defRPr b="0" baseline="0" cap="none" i="0" spc="0" strike="noStrike" sz="1800" u="none" kumimoji="0" normalizeH="0">
+          <a:defRPr kumimoji="0" sz="1800" b="0" i="0" u="none" strike="noStrike" cap="none" spc="0" normalizeH="0" baseline="0">
             <a:ln>
               <a:noFill/>
             </a:ln>
@@ -7600,7 +8417,7 @@
           <a:buFontTx/>
           <a:buNone/>
           <a:tabLst/>
-          <a:defRPr b="0" baseline="0" cap="none" i="0" spc="0" strike="noStrike" sz="1800" u="none" kumimoji="0" normalizeH="0">
+          <a:defRPr kumimoji="0" sz="1800" b="0" i="0" u="none" strike="noStrike" cap="none" spc="0" normalizeH="0" baseline="0">
             <a:ln>
               <a:noFill/>
             </a:ln>
@@ -7626,7 +8443,7 @@
           <a:buFontTx/>
           <a:buNone/>
           <a:tabLst/>
-          <a:defRPr b="0" baseline="0" cap="none" i="0" spc="0" strike="noStrike" sz="1800" u="none" kumimoji="0" normalizeH="0">
+          <a:defRPr kumimoji="0" sz="1800" b="0" i="0" u="none" strike="noStrike" cap="none" spc="0" normalizeH="0" baseline="0">
             <a:ln>
               <a:noFill/>
             </a:ln>
@@ -7639,9 +8456,15 @@
         </a:lvl9pPr>
       </a:lstStyle>
       <a:style>
-        <a:lnRef idx="0"/>
-        <a:fillRef idx="0"/>
-        <a:effectRef idx="0"/>
+        <a:lnRef idx="0">
+          <a:scrgbClr r="0" g="0" b="0"/>
+        </a:lnRef>
+        <a:fillRef idx="0">
+          <a:scrgbClr r="0" g="0" b="0"/>
+        </a:fillRef>
+        <a:effectRef idx="0">
+          <a:scrgbClr r="0" g="0" b="0"/>
+        </a:effectRef>
         <a:fontRef idx="none"/>
       </a:style>
     </a:spDef>
@@ -7658,7 +8481,7 @@
         <a:effectLst/>
         <a:sp3d/>
       </a:spPr>
-      <a:bodyPr rot="0" spcFirstLastPara="1" vertOverflow="overflow" horzOverflow="overflow" vert="horz" wrap="square" lIns="91439" tIns="45719" rIns="91439" bIns="45719" numCol="1" spcCol="38100" rtlCol="0" anchor="t" upright="0">
+      <a:bodyPr rot="0" spcFirstLastPara="1" vertOverflow="overflow" horzOverflow="overflow" vert="horz" wrap="square" lIns="91439" tIns="45719" rIns="91439" bIns="45719" numCol="1" spcCol="38100" rtlCol="0" anchor="t">
         <a:noAutofit/>
       </a:bodyPr>
       <a:lstStyle>
@@ -7677,7 +8500,7 @@
           <a:buFontTx/>
           <a:buNone/>
           <a:tabLst/>
-          <a:defRPr b="0" baseline="0" cap="none" i="0" spc="0" strike="noStrike" sz="1800" u="none" kumimoji="0" normalizeH="0">
+          <a:defRPr kumimoji="0" sz="1800" b="0" i="0" u="none" strike="noStrike" cap="none" spc="0" normalizeH="0" baseline="0">
             <a:ln>
               <a:noFill/>
             </a:ln>
@@ -7703,7 +8526,7 @@
           <a:buFontTx/>
           <a:buNone/>
           <a:tabLst/>
-          <a:defRPr b="0" baseline="0" cap="none" i="0" spc="0" strike="noStrike" sz="1800" u="none" kumimoji="0" normalizeH="0">
+          <a:defRPr kumimoji="0" sz="1800" b="0" i="0" u="none" strike="noStrike" cap="none" spc="0" normalizeH="0" baseline="0">
             <a:ln>
               <a:noFill/>
             </a:ln>
@@ -7729,7 +8552,7 @@
           <a:buFontTx/>
           <a:buNone/>
           <a:tabLst/>
-          <a:defRPr b="0" baseline="0" cap="none" i="0" spc="0" strike="noStrike" sz="1800" u="none" kumimoji="0" normalizeH="0">
+          <a:defRPr kumimoji="0" sz="1800" b="0" i="0" u="none" strike="noStrike" cap="none" spc="0" normalizeH="0" baseline="0">
             <a:ln>
               <a:noFill/>
             </a:ln>
@@ -7755,7 +8578,7 @@
           <a:buFontTx/>
           <a:buNone/>
           <a:tabLst/>
-          <a:defRPr b="0" baseline="0" cap="none" i="0" spc="0" strike="noStrike" sz="1800" u="none" kumimoji="0" normalizeH="0">
+          <a:defRPr kumimoji="0" sz="1800" b="0" i="0" u="none" strike="noStrike" cap="none" spc="0" normalizeH="0" baseline="0">
             <a:ln>
               <a:noFill/>
             </a:ln>
@@ -7781,7 +8604,7 @@
           <a:buFontTx/>
           <a:buNone/>
           <a:tabLst/>
-          <a:defRPr b="0" baseline="0" cap="none" i="0" spc="0" strike="noStrike" sz="1800" u="none" kumimoji="0" normalizeH="0">
+          <a:defRPr kumimoji="0" sz="1800" b="0" i="0" u="none" strike="noStrike" cap="none" spc="0" normalizeH="0" baseline="0">
             <a:ln>
               <a:noFill/>
             </a:ln>
@@ -7807,7 +8630,7 @@
           <a:buFontTx/>
           <a:buNone/>
           <a:tabLst/>
-          <a:defRPr b="0" baseline="0" cap="none" i="0" spc="0" strike="noStrike" sz="1800" u="none" kumimoji="0" normalizeH="0">
+          <a:defRPr kumimoji="0" sz="1800" b="0" i="0" u="none" strike="noStrike" cap="none" spc="0" normalizeH="0" baseline="0">
             <a:ln>
               <a:noFill/>
             </a:ln>
@@ -7833,7 +8656,7 @@
           <a:buFontTx/>
           <a:buNone/>
           <a:tabLst/>
-          <a:defRPr b="0" baseline="0" cap="none" i="0" spc="0" strike="noStrike" sz="1800" u="none" kumimoji="0" normalizeH="0">
+          <a:defRPr kumimoji="0" sz="1800" b="0" i="0" u="none" strike="noStrike" cap="none" spc="0" normalizeH="0" baseline="0">
             <a:ln>
               <a:noFill/>
             </a:ln>
@@ -7859,7 +8682,7 @@
           <a:buFontTx/>
           <a:buNone/>
           <a:tabLst/>
-          <a:defRPr b="0" baseline="0" cap="none" i="0" spc="0" strike="noStrike" sz="1800" u="none" kumimoji="0" normalizeH="0">
+          <a:defRPr kumimoji="0" sz="1800" b="0" i="0" u="none" strike="noStrike" cap="none" spc="0" normalizeH="0" baseline="0">
             <a:ln>
               <a:noFill/>
             </a:ln>
@@ -7885,7 +8708,7 @@
           <a:buFontTx/>
           <a:buNone/>
           <a:tabLst/>
-          <a:defRPr b="0" baseline="0" cap="none" i="0" spc="0" strike="noStrike" sz="1800" u="none" kumimoji="0" normalizeH="0">
+          <a:defRPr kumimoji="0" sz="1800" b="0" i="0" u="none" strike="noStrike" cap="none" spc="0" normalizeH="0" baseline="0">
             <a:ln>
               <a:noFill/>
             </a:ln>
@@ -7911,7 +8734,7 @@
           <a:buFontTx/>
           <a:buNone/>
           <a:tabLst/>
-          <a:defRPr b="0" baseline="0" cap="none" i="0" spc="0" strike="noStrike" sz="1800" u="none" kumimoji="0" normalizeH="0">
+          <a:defRPr kumimoji="0" sz="1800" b="0" i="0" u="none" strike="noStrike" cap="none" spc="0" normalizeH="0" baseline="0">
             <a:ln>
               <a:noFill/>
             </a:ln>
@@ -7924,9 +8747,15 @@
         </a:lvl9pPr>
       </a:lstStyle>
       <a:style>
-        <a:lnRef idx="0"/>
-        <a:fillRef idx="0"/>
-        <a:effectRef idx="0"/>
+        <a:lnRef idx="0">
+          <a:scrgbClr r="0" g="0" b="0"/>
+        </a:lnRef>
+        <a:fillRef idx="0">
+          <a:scrgbClr r="0" g="0" b="0"/>
+        </a:fillRef>
+        <a:effectRef idx="0">
+          <a:scrgbClr r="0" g="0" b="0"/>
+        </a:effectRef>
         <a:fontRef idx="none"/>
       </a:style>
     </a:lnDef>
@@ -7940,7 +8769,7 @@
         <a:effectLst/>
         <a:sp3d/>
       </a:spPr>
-      <a:bodyPr rot="0" spcFirstLastPara="1" vertOverflow="overflow" horzOverflow="overflow" vert="horz" wrap="square" lIns="50800" tIns="50800" rIns="50800" bIns="50800" numCol="1" spcCol="38100" rtlCol="0" anchor="ctr" upright="0">
+      <a:bodyPr rot="0" spcFirstLastPara="1" vertOverflow="overflow" horzOverflow="overflow" vert="horz" wrap="square" lIns="50800" tIns="50800" rIns="50800" bIns="50800" numCol="1" spcCol="38100" rtlCol="0" anchor="ctr">
         <a:spAutoFit/>
       </a:bodyPr>
       <a:lstStyle>
@@ -7959,7 +8788,7 @@
           <a:buFontTx/>
           <a:buNone/>
           <a:tabLst/>
-          <a:defRPr b="0" baseline="0" cap="none" i="0" spc="28" strike="noStrike" sz="2800" u="none" kumimoji="0" normalizeH="0">
+          <a:defRPr kumimoji="0" sz="2800" b="0" i="0" u="none" strike="noStrike" cap="none" spc="28" normalizeH="0" baseline="0">
             <a:ln>
               <a:noFill/>
             </a:ln>
@@ -7989,7 +8818,7 @@
           <a:buFontTx/>
           <a:buNone/>
           <a:tabLst/>
-          <a:defRPr b="0" baseline="0" cap="none" i="0" spc="0" strike="noStrike" sz="1800" u="none" kumimoji="0" normalizeH="0">
+          <a:defRPr kumimoji="0" sz="1800" b="0" i="0" u="none" strike="noStrike" cap="none" spc="0" normalizeH="0" baseline="0">
             <a:ln>
               <a:noFill/>
             </a:ln>
@@ -8015,7 +8844,7 @@
           <a:buFontTx/>
           <a:buNone/>
           <a:tabLst/>
-          <a:defRPr b="0" baseline="0" cap="none" i="0" spc="0" strike="noStrike" sz="1800" u="none" kumimoji="0" normalizeH="0">
+          <a:defRPr kumimoji="0" sz="1800" b="0" i="0" u="none" strike="noStrike" cap="none" spc="0" normalizeH="0" baseline="0">
             <a:ln>
               <a:noFill/>
             </a:ln>
@@ -8041,7 +8870,7 @@
           <a:buFontTx/>
           <a:buNone/>
           <a:tabLst/>
-          <a:defRPr b="0" baseline="0" cap="none" i="0" spc="0" strike="noStrike" sz="1800" u="none" kumimoji="0" normalizeH="0">
+          <a:defRPr kumimoji="0" sz="1800" b="0" i="0" u="none" strike="noStrike" cap="none" spc="0" normalizeH="0" baseline="0">
             <a:ln>
               <a:noFill/>
             </a:ln>
@@ -8067,7 +8896,7 @@
           <a:buFontTx/>
           <a:buNone/>
           <a:tabLst/>
-          <a:defRPr b="0" baseline="0" cap="none" i="0" spc="0" strike="noStrike" sz="1800" u="none" kumimoji="0" normalizeH="0">
+          <a:defRPr kumimoji="0" sz="1800" b="0" i="0" u="none" strike="noStrike" cap="none" spc="0" normalizeH="0" baseline="0">
             <a:ln>
               <a:noFill/>
             </a:ln>
@@ -8093,7 +8922,7 @@
           <a:buFontTx/>
           <a:buNone/>
           <a:tabLst/>
-          <a:defRPr b="0" baseline="0" cap="none" i="0" spc="0" strike="noStrike" sz="1800" u="none" kumimoji="0" normalizeH="0">
+          <a:defRPr kumimoji="0" sz="1800" b="0" i="0" u="none" strike="noStrike" cap="none" spc="0" normalizeH="0" baseline="0">
             <a:ln>
               <a:noFill/>
             </a:ln>
@@ -8119,7 +8948,7 @@
           <a:buFontTx/>
           <a:buNone/>
           <a:tabLst/>
-          <a:defRPr b="0" baseline="0" cap="none" i="0" spc="0" strike="noStrike" sz="1800" u="none" kumimoji="0" normalizeH="0">
+          <a:defRPr kumimoji="0" sz="1800" b="0" i="0" u="none" strike="noStrike" cap="none" spc="0" normalizeH="0" baseline="0">
             <a:ln>
               <a:noFill/>
             </a:ln>
@@ -8145,7 +8974,7 @@
           <a:buFontTx/>
           <a:buNone/>
           <a:tabLst/>
-          <a:defRPr b="0" baseline="0" cap="none" i="0" spc="0" strike="noStrike" sz="1800" u="none" kumimoji="0" normalizeH="0">
+          <a:defRPr kumimoji="0" sz="1800" b="0" i="0" u="none" strike="noStrike" cap="none" spc="0" normalizeH="0" baseline="0">
             <a:ln>
               <a:noFill/>
             </a:ln>
@@ -8171,7 +9000,7 @@
           <a:buFontTx/>
           <a:buNone/>
           <a:tabLst/>
-          <a:defRPr b="0" baseline="0" cap="none" i="0" spc="0" strike="noStrike" sz="1800" u="none" kumimoji="0" normalizeH="0">
+          <a:defRPr kumimoji="0" sz="1800" b="0" i="0" u="none" strike="noStrike" cap="none" spc="0" normalizeH="0" baseline="0">
             <a:ln>
               <a:noFill/>
             </a:ln>
@@ -8197,7 +9026,7 @@
           <a:buFontTx/>
           <a:buNone/>
           <a:tabLst/>
-          <a:defRPr b="0" baseline="0" cap="none" i="0" spc="0" strike="noStrike" sz="1800" u="none" kumimoji="0" normalizeH="0">
+          <a:defRPr kumimoji="0" sz="1800" b="0" i="0" u="none" strike="noStrike" cap="none" spc="0" normalizeH="0" baseline="0">
             <a:ln>
               <a:noFill/>
             </a:ln>
@@ -8210,18 +9039,25 @@
         </a:lvl9pPr>
       </a:lstStyle>
       <a:style>
-        <a:lnRef idx="0"/>
-        <a:fillRef idx="0"/>
-        <a:effectRef idx="0"/>
+        <a:lnRef idx="0">
+          <a:scrgbClr r="0" g="0" b="0"/>
+        </a:lnRef>
+        <a:fillRef idx="0">
+          <a:scrgbClr r="0" g="0" b="0"/>
+        </a:fillRef>
+        <a:effectRef idx="0">
+          <a:scrgbClr r="0" g="0" b="0"/>
+        </a:effectRef>
         <a:fontRef idx="none"/>
       </a:style>
     </a:txDef>
   </a:objectDefaults>
+  <a:extraClrSchemeLst/>
 </a:theme>
 </file>
 
 <file path=ppt/theme/theme2.xml><?xml version="1.0" encoding="utf-8"?>
-<a:theme xmlns:a="http://schemas.openxmlformats.org/drawingml/2006/main" xmlns:r="http://schemas.openxmlformats.org/officeDocument/2006/relationships" name="New_Template9">
+<a:theme xmlns:a="http://schemas.openxmlformats.org/drawingml/2006/main" name="New_Template9">
   <a:themeElements>
     <a:clrScheme name="New_Template9">
       <a:dk1>
@@ -8424,7 +9260,7 @@
         <a:effectLst/>
         <a:sp3d/>
       </a:spPr>
-      <a:bodyPr rot="0" spcFirstLastPara="1" vertOverflow="overflow" horzOverflow="overflow" vert="horz" wrap="square" lIns="50800" tIns="50800" rIns="50800" bIns="50800" numCol="1" spcCol="38100" rtlCol="0" anchor="ctr" upright="0">
+      <a:bodyPr rot="0" spcFirstLastPara="1" vertOverflow="overflow" horzOverflow="overflow" vert="horz" wrap="square" lIns="50800" tIns="50800" rIns="50800" bIns="50800" numCol="1" spcCol="38100" rtlCol="0" anchor="ctr">
         <a:spAutoFit/>
       </a:bodyPr>
       <a:lstStyle>
@@ -8443,7 +9279,7 @@
           <a:buFontTx/>
           <a:buNone/>
           <a:tabLst/>
-          <a:defRPr b="0" baseline="0" cap="none" i="0" spc="0" strike="noStrike" sz="2400" u="none" kumimoji="0" normalizeH="0">
+          <a:defRPr kumimoji="0" sz="2400" b="0" i="0" u="none" strike="noStrike" cap="none" spc="0" normalizeH="0" baseline="0">
             <a:ln>
               <a:noFill/>
             </a:ln>
@@ -8473,7 +9309,7 @@
           <a:buFontTx/>
           <a:buNone/>
           <a:tabLst/>
-          <a:defRPr b="0" baseline="0" cap="none" i="0" spc="0" strike="noStrike" sz="1800" u="none" kumimoji="0" normalizeH="0">
+          <a:defRPr kumimoji="0" sz="1800" b="0" i="0" u="none" strike="noStrike" cap="none" spc="0" normalizeH="0" baseline="0">
             <a:ln>
               <a:noFill/>
             </a:ln>
@@ -8499,7 +9335,7 @@
           <a:buFontTx/>
           <a:buNone/>
           <a:tabLst/>
-          <a:defRPr b="0" baseline="0" cap="none" i="0" spc="0" strike="noStrike" sz="1800" u="none" kumimoji="0" normalizeH="0">
+          <a:defRPr kumimoji="0" sz="1800" b="0" i="0" u="none" strike="noStrike" cap="none" spc="0" normalizeH="0" baseline="0">
             <a:ln>
               <a:noFill/>
             </a:ln>
@@ -8525,7 +9361,7 @@
           <a:buFontTx/>
           <a:buNone/>
           <a:tabLst/>
-          <a:defRPr b="0" baseline="0" cap="none" i="0" spc="0" strike="noStrike" sz="1800" u="none" kumimoji="0" normalizeH="0">
+          <a:defRPr kumimoji="0" sz="1800" b="0" i="0" u="none" strike="noStrike" cap="none" spc="0" normalizeH="0" baseline="0">
             <a:ln>
               <a:noFill/>
             </a:ln>
@@ -8551,7 +9387,7 @@
           <a:buFontTx/>
           <a:buNone/>
           <a:tabLst/>
-          <a:defRPr b="0" baseline="0" cap="none" i="0" spc="0" strike="noStrike" sz="1800" u="none" kumimoji="0" normalizeH="0">
+          <a:defRPr kumimoji="0" sz="1800" b="0" i="0" u="none" strike="noStrike" cap="none" spc="0" normalizeH="0" baseline="0">
             <a:ln>
               <a:noFill/>
             </a:ln>
@@ -8577,7 +9413,7 @@
           <a:buFontTx/>
           <a:buNone/>
           <a:tabLst/>
-          <a:defRPr b="0" baseline="0" cap="none" i="0" spc="0" strike="noStrike" sz="1800" u="none" kumimoji="0" normalizeH="0">
+          <a:defRPr kumimoji="0" sz="1800" b="0" i="0" u="none" strike="noStrike" cap="none" spc="0" normalizeH="0" baseline="0">
             <a:ln>
               <a:noFill/>
             </a:ln>
@@ -8603,7 +9439,7 @@
           <a:buFontTx/>
           <a:buNone/>
           <a:tabLst/>
-          <a:defRPr b="0" baseline="0" cap="none" i="0" spc="0" strike="noStrike" sz="1800" u="none" kumimoji="0" normalizeH="0">
+          <a:defRPr kumimoji="0" sz="1800" b="0" i="0" u="none" strike="noStrike" cap="none" spc="0" normalizeH="0" baseline="0">
             <a:ln>
               <a:noFill/>
             </a:ln>
@@ -8629,7 +9465,7 @@
           <a:buFontTx/>
           <a:buNone/>
           <a:tabLst/>
-          <a:defRPr b="0" baseline="0" cap="none" i="0" spc="0" strike="noStrike" sz="1800" u="none" kumimoji="0" normalizeH="0">
+          <a:defRPr kumimoji="0" sz="1800" b="0" i="0" u="none" strike="noStrike" cap="none" spc="0" normalizeH="0" baseline="0">
             <a:ln>
               <a:noFill/>
             </a:ln>
@@ -8655,7 +9491,7 @@
           <a:buFontTx/>
           <a:buNone/>
           <a:tabLst/>
-          <a:defRPr b="0" baseline="0" cap="none" i="0" spc="0" strike="noStrike" sz="1800" u="none" kumimoji="0" normalizeH="0">
+          <a:defRPr kumimoji="0" sz="1800" b="0" i="0" u="none" strike="noStrike" cap="none" spc="0" normalizeH="0" baseline="0">
             <a:ln>
               <a:noFill/>
             </a:ln>
@@ -8681,7 +9517,7 @@
           <a:buFontTx/>
           <a:buNone/>
           <a:tabLst/>
-          <a:defRPr b="0" baseline="0" cap="none" i="0" spc="0" strike="noStrike" sz="1800" u="none" kumimoji="0" normalizeH="0">
+          <a:defRPr kumimoji="0" sz="1800" b="0" i="0" u="none" strike="noStrike" cap="none" spc="0" normalizeH="0" baseline="0">
             <a:ln>
               <a:noFill/>
             </a:ln>
@@ -8694,9 +9530,15 @@
         </a:lvl9pPr>
       </a:lstStyle>
       <a:style>
-        <a:lnRef idx="0"/>
-        <a:fillRef idx="0"/>
-        <a:effectRef idx="0"/>
+        <a:lnRef idx="0">
+          <a:scrgbClr r="0" g="0" b="0"/>
+        </a:lnRef>
+        <a:fillRef idx="0">
+          <a:scrgbClr r="0" g="0" b="0"/>
+        </a:fillRef>
+        <a:effectRef idx="0">
+          <a:scrgbClr r="0" g="0" b="0"/>
+        </a:effectRef>
         <a:fontRef idx="none"/>
       </a:style>
     </a:spDef>
@@ -8713,7 +9555,7 @@
         <a:effectLst/>
         <a:sp3d/>
       </a:spPr>
-      <a:bodyPr rot="0" spcFirstLastPara="1" vertOverflow="overflow" horzOverflow="overflow" vert="horz" wrap="square" lIns="91439" tIns="45719" rIns="91439" bIns="45719" numCol="1" spcCol="38100" rtlCol="0" anchor="t" upright="0">
+      <a:bodyPr rot="0" spcFirstLastPara="1" vertOverflow="overflow" horzOverflow="overflow" vert="horz" wrap="square" lIns="91439" tIns="45719" rIns="91439" bIns="45719" numCol="1" spcCol="38100" rtlCol="0" anchor="t">
         <a:noAutofit/>
       </a:bodyPr>
       <a:lstStyle>
@@ -8732,7 +9574,7 @@
           <a:buFontTx/>
           <a:buNone/>
           <a:tabLst/>
-          <a:defRPr b="0" baseline="0" cap="none" i="0" spc="0" strike="noStrike" sz="1800" u="none" kumimoji="0" normalizeH="0">
+          <a:defRPr kumimoji="0" sz="1800" b="0" i="0" u="none" strike="noStrike" cap="none" spc="0" normalizeH="0" baseline="0">
             <a:ln>
               <a:noFill/>
             </a:ln>
@@ -8758,7 +9600,7 @@
           <a:buFontTx/>
           <a:buNone/>
           <a:tabLst/>
-          <a:defRPr b="0" baseline="0" cap="none" i="0" spc="0" strike="noStrike" sz="1800" u="none" kumimoji="0" normalizeH="0">
+          <a:defRPr kumimoji="0" sz="1800" b="0" i="0" u="none" strike="noStrike" cap="none" spc="0" normalizeH="0" baseline="0">
             <a:ln>
               <a:noFill/>
             </a:ln>
@@ -8784,7 +9626,7 @@
           <a:buFontTx/>
           <a:buNone/>
           <a:tabLst/>
-          <a:defRPr b="0" baseline="0" cap="none" i="0" spc="0" strike="noStrike" sz="1800" u="none" kumimoji="0" normalizeH="0">
+          <a:defRPr kumimoji="0" sz="1800" b="0" i="0" u="none" strike="noStrike" cap="none" spc="0" normalizeH="0" baseline="0">
             <a:ln>
               <a:noFill/>
             </a:ln>
@@ -8810,7 +9652,7 @@
           <a:buFontTx/>
           <a:buNone/>
           <a:tabLst/>
-          <a:defRPr b="0" baseline="0" cap="none" i="0" spc="0" strike="noStrike" sz="1800" u="none" kumimoji="0" normalizeH="0">
+          <a:defRPr kumimoji="0" sz="1800" b="0" i="0" u="none" strike="noStrike" cap="none" spc="0" normalizeH="0" baseline="0">
             <a:ln>
               <a:noFill/>
             </a:ln>
@@ -8836,7 +9678,7 @@
           <a:buFontTx/>
           <a:buNone/>
           <a:tabLst/>
-          <a:defRPr b="0" baseline="0" cap="none" i="0" spc="0" strike="noStrike" sz="1800" u="none" kumimoji="0" normalizeH="0">
+          <a:defRPr kumimoji="0" sz="1800" b="0" i="0" u="none" strike="noStrike" cap="none" spc="0" normalizeH="0" baseline="0">
             <a:ln>
               <a:noFill/>
             </a:ln>
@@ -8862,7 +9704,7 @@
           <a:buFontTx/>
           <a:buNone/>
           <a:tabLst/>
-          <a:defRPr b="0" baseline="0" cap="none" i="0" spc="0" strike="noStrike" sz="1800" u="none" kumimoji="0" normalizeH="0">
+          <a:defRPr kumimoji="0" sz="1800" b="0" i="0" u="none" strike="noStrike" cap="none" spc="0" normalizeH="0" baseline="0">
             <a:ln>
               <a:noFill/>
             </a:ln>
@@ -8888,7 +9730,7 @@
           <a:buFontTx/>
           <a:buNone/>
           <a:tabLst/>
-          <a:defRPr b="0" baseline="0" cap="none" i="0" spc="0" strike="noStrike" sz="1800" u="none" kumimoji="0" normalizeH="0">
+          <a:defRPr kumimoji="0" sz="1800" b="0" i="0" u="none" strike="noStrike" cap="none" spc="0" normalizeH="0" baseline="0">
             <a:ln>
               <a:noFill/>
             </a:ln>
@@ -8914,7 +9756,7 @@
           <a:buFontTx/>
           <a:buNone/>
           <a:tabLst/>
-          <a:defRPr b="0" baseline="0" cap="none" i="0" spc="0" strike="noStrike" sz="1800" u="none" kumimoji="0" normalizeH="0">
+          <a:defRPr kumimoji="0" sz="1800" b="0" i="0" u="none" strike="noStrike" cap="none" spc="0" normalizeH="0" baseline="0">
             <a:ln>
               <a:noFill/>
             </a:ln>
@@ -8940,7 +9782,7 @@
           <a:buFontTx/>
           <a:buNone/>
           <a:tabLst/>
-          <a:defRPr b="0" baseline="0" cap="none" i="0" spc="0" strike="noStrike" sz="1800" u="none" kumimoji="0" normalizeH="0">
+          <a:defRPr kumimoji="0" sz="1800" b="0" i="0" u="none" strike="noStrike" cap="none" spc="0" normalizeH="0" baseline="0">
             <a:ln>
               <a:noFill/>
             </a:ln>
@@ -8966,7 +9808,7 @@
           <a:buFontTx/>
           <a:buNone/>
           <a:tabLst/>
-          <a:defRPr b="0" baseline="0" cap="none" i="0" spc="0" strike="noStrike" sz="1800" u="none" kumimoji="0" normalizeH="0">
+          <a:defRPr kumimoji="0" sz="1800" b="0" i="0" u="none" strike="noStrike" cap="none" spc="0" normalizeH="0" baseline="0">
             <a:ln>
               <a:noFill/>
             </a:ln>
@@ -8979,9 +9821,15 @@
         </a:lvl9pPr>
       </a:lstStyle>
       <a:style>
-        <a:lnRef idx="0"/>
-        <a:fillRef idx="0"/>
-        <a:effectRef idx="0"/>
+        <a:lnRef idx="0">
+          <a:scrgbClr r="0" g="0" b="0"/>
+        </a:lnRef>
+        <a:fillRef idx="0">
+          <a:scrgbClr r="0" g="0" b="0"/>
+        </a:fillRef>
+        <a:effectRef idx="0">
+          <a:scrgbClr r="0" g="0" b="0"/>
+        </a:effectRef>
         <a:fontRef idx="none"/>
       </a:style>
     </a:lnDef>
@@ -8995,7 +9843,7 @@
         <a:effectLst/>
         <a:sp3d/>
       </a:spPr>
-      <a:bodyPr rot="0" spcFirstLastPara="1" vertOverflow="overflow" horzOverflow="overflow" vert="horz" wrap="square" lIns="50800" tIns="50800" rIns="50800" bIns="50800" numCol="1" spcCol="38100" rtlCol="0" anchor="ctr" upright="0">
+      <a:bodyPr rot="0" spcFirstLastPara="1" vertOverflow="overflow" horzOverflow="overflow" vert="horz" wrap="square" lIns="50800" tIns="50800" rIns="50800" bIns="50800" numCol="1" spcCol="38100" rtlCol="0" anchor="ctr">
         <a:spAutoFit/>
       </a:bodyPr>
       <a:lstStyle>
@@ -9014,7 +9862,7 @@
           <a:buFontTx/>
           <a:buNone/>
           <a:tabLst/>
-          <a:defRPr b="0" baseline="0" cap="none" i="0" spc="28" strike="noStrike" sz="2800" u="none" kumimoji="0" normalizeH="0">
+          <a:defRPr kumimoji="0" sz="2800" b="0" i="0" u="none" strike="noStrike" cap="none" spc="28" normalizeH="0" baseline="0">
             <a:ln>
               <a:noFill/>
             </a:ln>
@@ -9044,7 +9892,7 @@
           <a:buFontTx/>
           <a:buNone/>
           <a:tabLst/>
-          <a:defRPr b="0" baseline="0" cap="none" i="0" spc="0" strike="noStrike" sz="1800" u="none" kumimoji="0" normalizeH="0">
+          <a:defRPr kumimoji="0" sz="1800" b="0" i="0" u="none" strike="noStrike" cap="none" spc="0" normalizeH="0" baseline="0">
             <a:ln>
               <a:noFill/>
             </a:ln>
@@ -9070,7 +9918,7 @@
           <a:buFontTx/>
           <a:buNone/>
           <a:tabLst/>
-          <a:defRPr b="0" baseline="0" cap="none" i="0" spc="0" strike="noStrike" sz="1800" u="none" kumimoji="0" normalizeH="0">
+          <a:defRPr kumimoji="0" sz="1800" b="0" i="0" u="none" strike="noStrike" cap="none" spc="0" normalizeH="0" baseline="0">
             <a:ln>
               <a:noFill/>
             </a:ln>
@@ -9096,7 +9944,7 @@
           <a:buFontTx/>
           <a:buNone/>
           <a:tabLst/>
-          <a:defRPr b="0" baseline="0" cap="none" i="0" spc="0" strike="noStrike" sz="1800" u="none" kumimoji="0" normalizeH="0">
+          <a:defRPr kumimoji="0" sz="1800" b="0" i="0" u="none" strike="noStrike" cap="none" spc="0" normalizeH="0" baseline="0">
             <a:ln>
               <a:noFill/>
             </a:ln>
@@ -9122,7 +9970,7 @@
           <a:buFontTx/>
           <a:buNone/>
           <a:tabLst/>
-          <a:defRPr b="0" baseline="0" cap="none" i="0" spc="0" strike="noStrike" sz="1800" u="none" kumimoji="0" normalizeH="0">
+          <a:defRPr kumimoji="0" sz="1800" b="0" i="0" u="none" strike="noStrike" cap="none" spc="0" normalizeH="0" baseline="0">
             <a:ln>
               <a:noFill/>
             </a:ln>
@@ -9148,7 +9996,7 @@
           <a:buFontTx/>
           <a:buNone/>
           <a:tabLst/>
-          <a:defRPr b="0" baseline="0" cap="none" i="0" spc="0" strike="noStrike" sz="1800" u="none" kumimoji="0" normalizeH="0">
+          <a:defRPr kumimoji="0" sz="1800" b="0" i="0" u="none" strike="noStrike" cap="none" spc="0" normalizeH="0" baseline="0">
             <a:ln>
               <a:noFill/>
             </a:ln>
@@ -9174,7 +10022,7 @@
           <a:buFontTx/>
           <a:buNone/>
           <a:tabLst/>
-          <a:defRPr b="0" baseline="0" cap="none" i="0" spc="0" strike="noStrike" sz="1800" u="none" kumimoji="0" normalizeH="0">
+          <a:defRPr kumimoji="0" sz="1800" b="0" i="0" u="none" strike="noStrike" cap="none" spc="0" normalizeH="0" baseline="0">
             <a:ln>
               <a:noFill/>
             </a:ln>
@@ -9200,7 +10048,7 @@
           <a:buFontTx/>
           <a:buNone/>
           <a:tabLst/>
-          <a:defRPr b="0" baseline="0" cap="none" i="0" spc="0" strike="noStrike" sz="1800" u="none" kumimoji="0" normalizeH="0">
+          <a:defRPr kumimoji="0" sz="1800" b="0" i="0" u="none" strike="noStrike" cap="none" spc="0" normalizeH="0" baseline="0">
             <a:ln>
               <a:noFill/>
             </a:ln>
@@ -9226,7 +10074,7 @@
           <a:buFontTx/>
           <a:buNone/>
           <a:tabLst/>
-          <a:defRPr b="0" baseline="0" cap="none" i="0" spc="0" strike="noStrike" sz="1800" u="none" kumimoji="0" normalizeH="0">
+          <a:defRPr kumimoji="0" sz="1800" b="0" i="0" u="none" strike="noStrike" cap="none" spc="0" normalizeH="0" baseline="0">
             <a:ln>
               <a:noFill/>
             </a:ln>
@@ -9252,7 +10100,7 @@
           <a:buFontTx/>
           <a:buNone/>
           <a:tabLst/>
-          <a:defRPr b="0" baseline="0" cap="none" i="0" spc="0" strike="noStrike" sz="1800" u="none" kumimoji="0" normalizeH="0">
+          <a:defRPr kumimoji="0" sz="1800" b="0" i="0" u="none" strike="noStrike" cap="none" spc="0" normalizeH="0" baseline="0">
             <a:ln>
               <a:noFill/>
             </a:ln>
@@ -9265,12 +10113,19 @@
         </a:lvl9pPr>
       </a:lstStyle>
       <a:style>
-        <a:lnRef idx="0"/>
-        <a:fillRef idx="0"/>
-        <a:effectRef idx="0"/>
+        <a:lnRef idx="0">
+          <a:scrgbClr r="0" g="0" b="0"/>
+        </a:lnRef>
+        <a:fillRef idx="0">
+          <a:scrgbClr r="0" g="0" b="0"/>
+        </a:fillRef>
+        <a:effectRef idx="0">
+          <a:scrgbClr r="0" g="0" b="0"/>
+        </a:effectRef>
         <a:fontRef idx="none"/>
       </a:style>
     </a:txDef>
   </a:objectDefaults>
+  <a:extraClrSchemeLst/>
 </a:theme>
 </file>
</xml_diff>